<commit_message>
added more background to project; updated JSOES description
</commit_message>
<xml_diff>
--- a/docs/model_dag.pptx
+++ b/docs/model_dag.pptx
@@ -2974,419 +2974,6 @@
       </p:grpSpPr>
       <p:sp>
         <p:nvSpPr>
-          <p:cNvPr id="88" name="Right Arrow 87">
-            <a:extLst>
-              <a:ext uri="{FF2B5EF4-FFF2-40B4-BE49-F238E27FC236}">
-                <a16:creationId xmlns:a16="http://schemas.microsoft.com/office/drawing/2014/main" id="{355156F7-BAF8-3E4E-A473-56B523096F3F}"/>
-              </a:ext>
-            </a:extLst>
-          </p:cNvPr>
-          <p:cNvSpPr/>
-          <p:nvPr/>
-        </p:nvSpPr>
-        <p:spPr>
-          <a:xfrm rot="17750133">
-            <a:off x="3391874" y="6208719"/>
-            <a:ext cx="3108960" cy="211866"/>
-          </a:xfrm>
-          <a:prstGeom prst="rightArrow">
-            <a:avLst/>
-          </a:prstGeom>
-          <a:solidFill>
-            <a:schemeClr val="accent3"/>
-          </a:solidFill>
-          <a:ln w="12700">
-            <a:solidFill>
-              <a:schemeClr val="tx1"/>
-            </a:solidFill>
-          </a:ln>
-        </p:spPr>
-        <p:style>
-          <a:lnRef idx="2">
-            <a:schemeClr val="accent1">
-              <a:shade val="50000"/>
-            </a:schemeClr>
-          </a:lnRef>
-          <a:fillRef idx="1">
-            <a:schemeClr val="accent1"/>
-          </a:fillRef>
-          <a:effectRef idx="0">
-            <a:schemeClr val="accent1"/>
-          </a:effectRef>
-          <a:fontRef idx="minor">
-            <a:schemeClr val="lt1"/>
-          </a:fontRef>
-        </p:style>
-        <p:txBody>
-          <a:bodyPr rot="0" spcFirstLastPara="0" vertOverflow="overflow" horzOverflow="overflow" vert="horz" wrap="square" lIns="91440" tIns="45720" rIns="91440" bIns="45720" numCol="1" spcCol="0" rtlCol="0" fromWordArt="0" anchor="ctr" anchorCtr="0" forceAA="0" compatLnSpc="1">
-            <a:prstTxWarp prst="textNoShape">
-              <a:avLst/>
-            </a:prstTxWarp>
-            <a:noAutofit/>
-          </a:bodyPr>
-          <a:lstStyle/>
-          <a:p>
-            <a:pPr algn="ctr"/>
-            <a:endParaRPr lang="en-US" sz="1200"/>
-          </a:p>
-        </p:txBody>
-      </p:sp>
-      <p:sp>
-        <p:nvSpPr>
-          <p:cNvPr id="87" name="Right Arrow 86">
-            <a:extLst>
-              <a:ext uri="{FF2B5EF4-FFF2-40B4-BE49-F238E27FC236}">
-                <a16:creationId xmlns:a16="http://schemas.microsoft.com/office/drawing/2014/main" id="{2578B04A-0375-4A49-9E10-1C34DCC56B8D}"/>
-              </a:ext>
-            </a:extLst>
-          </p:cNvPr>
-          <p:cNvSpPr/>
-          <p:nvPr/>
-        </p:nvSpPr>
-        <p:spPr>
-          <a:xfrm rot="17255455">
-            <a:off x="3473253" y="6484591"/>
-            <a:ext cx="3657600" cy="211866"/>
-          </a:xfrm>
-          <a:prstGeom prst="rightArrow">
-            <a:avLst/>
-          </a:prstGeom>
-          <a:solidFill>
-            <a:schemeClr val="accent3"/>
-          </a:solidFill>
-          <a:ln w="12700">
-            <a:solidFill>
-              <a:schemeClr val="tx1"/>
-            </a:solidFill>
-          </a:ln>
-        </p:spPr>
-        <p:style>
-          <a:lnRef idx="2">
-            <a:schemeClr val="accent1">
-              <a:shade val="50000"/>
-            </a:schemeClr>
-          </a:lnRef>
-          <a:fillRef idx="1">
-            <a:schemeClr val="accent1"/>
-          </a:fillRef>
-          <a:effectRef idx="0">
-            <a:schemeClr val="accent1"/>
-          </a:effectRef>
-          <a:fontRef idx="minor">
-            <a:schemeClr val="lt1"/>
-          </a:fontRef>
-        </p:style>
-        <p:txBody>
-          <a:bodyPr rot="0" spcFirstLastPara="0" vertOverflow="overflow" horzOverflow="overflow" vert="horz" wrap="square" lIns="91440" tIns="45720" rIns="91440" bIns="45720" numCol="1" spcCol="0" rtlCol="0" fromWordArt="0" anchor="ctr" anchorCtr="0" forceAA="0" compatLnSpc="1">
-            <a:prstTxWarp prst="textNoShape">
-              <a:avLst/>
-            </a:prstTxWarp>
-            <a:noAutofit/>
-          </a:bodyPr>
-          <a:lstStyle/>
-          <a:p>
-            <a:pPr algn="ctr"/>
-            <a:endParaRPr lang="en-US" sz="1200"/>
-          </a:p>
-        </p:txBody>
-      </p:sp>
-      <p:sp>
-        <p:nvSpPr>
-          <p:cNvPr id="83" name="Right Arrow 82">
-            <a:extLst>
-              <a:ext uri="{FF2B5EF4-FFF2-40B4-BE49-F238E27FC236}">
-                <a16:creationId xmlns:a16="http://schemas.microsoft.com/office/drawing/2014/main" id="{9B7E0699-28CD-514D-AF0A-4F86773DA107}"/>
-              </a:ext>
-            </a:extLst>
-          </p:cNvPr>
-          <p:cNvSpPr/>
-          <p:nvPr/>
-        </p:nvSpPr>
-        <p:spPr>
-          <a:xfrm rot="14632784">
-            <a:off x="1112447" y="5773838"/>
-            <a:ext cx="2103120" cy="211866"/>
-          </a:xfrm>
-          <a:prstGeom prst="rightArrow">
-            <a:avLst/>
-          </a:prstGeom>
-          <a:solidFill>
-            <a:schemeClr val="accent3"/>
-          </a:solidFill>
-          <a:ln w="12700">
-            <a:solidFill>
-              <a:schemeClr val="tx1"/>
-            </a:solidFill>
-          </a:ln>
-        </p:spPr>
-        <p:style>
-          <a:lnRef idx="2">
-            <a:schemeClr val="accent1">
-              <a:shade val="50000"/>
-            </a:schemeClr>
-          </a:lnRef>
-          <a:fillRef idx="1">
-            <a:schemeClr val="accent1"/>
-          </a:fillRef>
-          <a:effectRef idx="0">
-            <a:schemeClr val="accent1"/>
-          </a:effectRef>
-          <a:fontRef idx="minor">
-            <a:schemeClr val="lt1"/>
-          </a:fontRef>
-        </p:style>
-        <p:txBody>
-          <a:bodyPr rot="0" spcFirstLastPara="0" vertOverflow="overflow" horzOverflow="overflow" vert="horz" wrap="square" lIns="91440" tIns="45720" rIns="91440" bIns="45720" numCol="1" spcCol="0" rtlCol="0" fromWordArt="0" anchor="ctr" anchorCtr="0" forceAA="0" compatLnSpc="1">
-            <a:prstTxWarp prst="textNoShape">
-              <a:avLst/>
-            </a:prstTxWarp>
-            <a:noAutofit/>
-          </a:bodyPr>
-          <a:lstStyle/>
-          <a:p>
-            <a:pPr algn="ctr"/>
-            <a:endParaRPr lang="en-US" sz="1200"/>
-          </a:p>
-        </p:txBody>
-      </p:sp>
-      <p:sp>
-        <p:nvSpPr>
-          <p:cNvPr id="82" name="Right Arrow 81">
-            <a:extLst>
-              <a:ext uri="{FF2B5EF4-FFF2-40B4-BE49-F238E27FC236}">
-                <a16:creationId xmlns:a16="http://schemas.microsoft.com/office/drawing/2014/main" id="{FE10741C-8284-574D-B741-956224BA4E8B}"/>
-              </a:ext>
-            </a:extLst>
-          </p:cNvPr>
-          <p:cNvSpPr/>
-          <p:nvPr/>
-        </p:nvSpPr>
-        <p:spPr>
-          <a:xfrm rot="14632784">
-            <a:off x="408395" y="6273607"/>
-            <a:ext cx="3200400" cy="211866"/>
-          </a:xfrm>
-          <a:prstGeom prst="rightArrow">
-            <a:avLst/>
-          </a:prstGeom>
-          <a:solidFill>
-            <a:schemeClr val="accent3"/>
-          </a:solidFill>
-          <a:ln w="12700">
-            <a:solidFill>
-              <a:schemeClr val="tx1"/>
-            </a:solidFill>
-          </a:ln>
-        </p:spPr>
-        <p:style>
-          <a:lnRef idx="2">
-            <a:schemeClr val="accent1">
-              <a:shade val="50000"/>
-            </a:schemeClr>
-          </a:lnRef>
-          <a:fillRef idx="1">
-            <a:schemeClr val="accent1"/>
-          </a:fillRef>
-          <a:effectRef idx="0">
-            <a:schemeClr val="accent1"/>
-          </a:effectRef>
-          <a:fontRef idx="minor">
-            <a:schemeClr val="lt1"/>
-          </a:fontRef>
-        </p:style>
-        <p:txBody>
-          <a:bodyPr rot="0" spcFirstLastPara="0" vertOverflow="overflow" horzOverflow="overflow" vert="horz" wrap="square" lIns="91440" tIns="45720" rIns="91440" bIns="45720" numCol="1" spcCol="0" rtlCol="0" fromWordArt="0" anchor="ctr" anchorCtr="0" forceAA="0" compatLnSpc="1">
-            <a:prstTxWarp prst="textNoShape">
-              <a:avLst/>
-            </a:prstTxWarp>
-            <a:noAutofit/>
-          </a:bodyPr>
-          <a:lstStyle/>
-          <a:p>
-            <a:pPr algn="ctr"/>
-            <a:endParaRPr lang="en-US" sz="1200"/>
-          </a:p>
-        </p:txBody>
-      </p:sp>
-      <p:sp>
-        <p:nvSpPr>
-          <p:cNvPr id="81" name="Right Arrow 80">
-            <a:extLst>
-              <a:ext uri="{FF2B5EF4-FFF2-40B4-BE49-F238E27FC236}">
-                <a16:creationId xmlns:a16="http://schemas.microsoft.com/office/drawing/2014/main" id="{2F598ABA-8EC8-F94F-B84C-F0D84949DF10}"/>
-              </a:ext>
-            </a:extLst>
-          </p:cNvPr>
-          <p:cNvSpPr/>
-          <p:nvPr/>
-        </p:nvSpPr>
-        <p:spPr>
-          <a:xfrm rot="14632784">
-            <a:off x="-150884" y="6479737"/>
-            <a:ext cx="3657600" cy="211866"/>
-          </a:xfrm>
-          <a:prstGeom prst="rightArrow">
-            <a:avLst/>
-          </a:prstGeom>
-          <a:solidFill>
-            <a:schemeClr val="accent3"/>
-          </a:solidFill>
-          <a:ln w="12700">
-            <a:solidFill>
-              <a:schemeClr val="tx1"/>
-            </a:solidFill>
-          </a:ln>
-        </p:spPr>
-        <p:style>
-          <a:lnRef idx="2">
-            <a:schemeClr val="accent1">
-              <a:shade val="50000"/>
-            </a:schemeClr>
-          </a:lnRef>
-          <a:fillRef idx="1">
-            <a:schemeClr val="accent1"/>
-          </a:fillRef>
-          <a:effectRef idx="0">
-            <a:schemeClr val="accent1"/>
-          </a:effectRef>
-          <a:fontRef idx="minor">
-            <a:schemeClr val="lt1"/>
-          </a:fontRef>
-        </p:style>
-        <p:txBody>
-          <a:bodyPr rot="0" spcFirstLastPara="0" vertOverflow="overflow" horzOverflow="overflow" vert="horz" wrap="square" lIns="91440" tIns="45720" rIns="91440" bIns="45720" numCol="1" spcCol="0" rtlCol="0" fromWordArt="0" anchor="ctr" anchorCtr="0" forceAA="0" compatLnSpc="1">
-            <a:prstTxWarp prst="textNoShape">
-              <a:avLst/>
-            </a:prstTxWarp>
-            <a:noAutofit/>
-          </a:bodyPr>
-          <a:lstStyle/>
-          <a:p>
-            <a:pPr algn="ctr"/>
-            <a:endParaRPr lang="en-US" sz="1200"/>
-          </a:p>
-        </p:txBody>
-      </p:sp>
-      <p:sp>
-        <p:nvSpPr>
-          <p:cNvPr id="80" name="Right Arrow 79">
-            <a:extLst>
-              <a:ext uri="{FF2B5EF4-FFF2-40B4-BE49-F238E27FC236}">
-                <a16:creationId xmlns:a16="http://schemas.microsoft.com/office/drawing/2014/main" id="{12351E1E-A8FC-E141-83F9-258C831A63F3}"/>
-              </a:ext>
-            </a:extLst>
-          </p:cNvPr>
-          <p:cNvSpPr/>
-          <p:nvPr/>
-        </p:nvSpPr>
-        <p:spPr>
-          <a:xfrm rot="16200000">
-            <a:off x="2542632" y="6880689"/>
-            <a:ext cx="2542032" cy="211866"/>
-          </a:xfrm>
-          <a:prstGeom prst="rightArrow">
-            <a:avLst/>
-          </a:prstGeom>
-          <a:solidFill>
-            <a:schemeClr val="accent3"/>
-          </a:solidFill>
-          <a:ln w="12700">
-            <a:solidFill>
-              <a:schemeClr val="tx1"/>
-            </a:solidFill>
-          </a:ln>
-        </p:spPr>
-        <p:style>
-          <a:lnRef idx="2">
-            <a:schemeClr val="accent1">
-              <a:shade val="50000"/>
-            </a:schemeClr>
-          </a:lnRef>
-          <a:fillRef idx="1">
-            <a:schemeClr val="accent1"/>
-          </a:fillRef>
-          <a:effectRef idx="0">
-            <a:schemeClr val="accent1"/>
-          </a:effectRef>
-          <a:fontRef idx="minor">
-            <a:schemeClr val="lt1"/>
-          </a:fontRef>
-        </p:style>
-        <p:txBody>
-          <a:bodyPr rot="0" spcFirstLastPara="0" vertOverflow="overflow" horzOverflow="overflow" vert="horz" wrap="square" lIns="91440" tIns="45720" rIns="91440" bIns="45720" numCol="1" spcCol="0" rtlCol="0" fromWordArt="0" anchor="ctr" anchorCtr="0" forceAA="0" compatLnSpc="1">
-            <a:prstTxWarp prst="textNoShape">
-              <a:avLst/>
-            </a:prstTxWarp>
-            <a:noAutofit/>
-          </a:bodyPr>
-          <a:lstStyle/>
-          <a:p>
-            <a:pPr algn="ctr"/>
-            <a:endParaRPr lang="en-US" sz="1200"/>
-          </a:p>
-        </p:txBody>
-      </p:sp>
-      <p:sp>
-        <p:nvSpPr>
-          <p:cNvPr id="79" name="Right Arrow 78">
-            <a:extLst>
-              <a:ext uri="{FF2B5EF4-FFF2-40B4-BE49-F238E27FC236}">
-                <a16:creationId xmlns:a16="http://schemas.microsoft.com/office/drawing/2014/main" id="{17977C6B-6EC7-8745-90D3-82394C0A0EC1}"/>
-              </a:ext>
-            </a:extLst>
-          </p:cNvPr>
-          <p:cNvSpPr/>
-          <p:nvPr/>
-        </p:nvSpPr>
-        <p:spPr>
-          <a:xfrm rot="16200000">
-            <a:off x="2752672" y="6400637"/>
-            <a:ext cx="1554480" cy="211866"/>
-          </a:xfrm>
-          <a:prstGeom prst="rightArrow">
-            <a:avLst/>
-          </a:prstGeom>
-          <a:solidFill>
-            <a:schemeClr val="accent3"/>
-          </a:solidFill>
-          <a:ln w="12700">
-            <a:solidFill>
-              <a:schemeClr val="tx1"/>
-            </a:solidFill>
-          </a:ln>
-        </p:spPr>
-        <p:style>
-          <a:lnRef idx="2">
-            <a:schemeClr val="accent1">
-              <a:shade val="50000"/>
-            </a:schemeClr>
-          </a:lnRef>
-          <a:fillRef idx="1">
-            <a:schemeClr val="accent1"/>
-          </a:fillRef>
-          <a:effectRef idx="0">
-            <a:schemeClr val="accent1"/>
-          </a:effectRef>
-          <a:fontRef idx="minor">
-            <a:schemeClr val="lt1"/>
-          </a:fontRef>
-        </p:style>
-        <p:txBody>
-          <a:bodyPr rot="0" spcFirstLastPara="0" vertOverflow="overflow" horzOverflow="overflow" vert="horz" wrap="square" lIns="91440" tIns="45720" rIns="91440" bIns="45720" numCol="1" spcCol="0" rtlCol="0" fromWordArt="0" anchor="ctr" anchorCtr="0" forceAA="0" compatLnSpc="1">
-            <a:prstTxWarp prst="textNoShape">
-              <a:avLst/>
-            </a:prstTxWarp>
-            <a:noAutofit/>
-          </a:bodyPr>
-          <a:lstStyle/>
-          <a:p>
-            <a:pPr algn="ctr"/>
-            <a:endParaRPr lang="en-US" sz="1200"/>
-          </a:p>
-        </p:txBody>
-      </p:sp>
-      <p:sp>
-        <p:nvSpPr>
           <p:cNvPr id="24" name="TextBox 23">
             <a:extLst>
               <a:ext uri="{FF2B5EF4-FFF2-40B4-BE49-F238E27FC236}">
@@ -3998,68 +3585,6 @@
       </p:sp>
       <p:sp>
         <p:nvSpPr>
-          <p:cNvPr id="61" name="TextBox 60">
-            <a:extLst>
-              <a:ext uri="{FF2B5EF4-FFF2-40B4-BE49-F238E27FC236}">
-                <a16:creationId xmlns:a16="http://schemas.microsoft.com/office/drawing/2014/main" id="{8D357A99-1767-3346-894A-80CDBBF5B9C2}"/>
-              </a:ext>
-            </a:extLst>
-          </p:cNvPr>
-          <p:cNvSpPr txBox="1"/>
-          <p:nvPr/>
-        </p:nvSpPr>
-        <p:spPr>
-          <a:xfrm>
-            <a:off x="5378" y="20323"/>
-            <a:ext cx="1405110" cy="1200329"/>
-          </a:xfrm>
-          <a:prstGeom prst="rect">
-            <a:avLst/>
-          </a:prstGeom>
-          <a:noFill/>
-          <a:ln w="3175">
-            <a:noFill/>
-          </a:ln>
-        </p:spPr>
-        <p:txBody>
-          <a:bodyPr wrap="square" rtlCol="0">
-            <a:spAutoFit/>
-          </a:bodyPr>
-          <a:lstStyle/>
-          <a:p>
-            <a:r>
-              <a:rPr lang="en-US" sz="1200" dirty="0"/>
-              <a:t>Predation</a:t>
-            </a:r>
-          </a:p>
-          <a:p>
-            <a:endParaRPr lang="en-US" sz="1200" dirty="0"/>
-          </a:p>
-          <a:p>
-            <a:r>
-              <a:rPr lang="en-US" sz="1200" dirty="0"/>
-              <a:t>Competition</a:t>
-            </a:r>
-          </a:p>
-          <a:p>
-            <a:endParaRPr lang="en-US" sz="1200" dirty="0"/>
-          </a:p>
-          <a:p>
-            <a:r>
-              <a:rPr lang="en-US" sz="1200" dirty="0"/>
-              <a:t>External </a:t>
-            </a:r>
-          </a:p>
-          <a:p>
-            <a:r>
-              <a:rPr lang="en-US" sz="1200" dirty="0"/>
-              <a:t>forcing</a:t>
-            </a:r>
-          </a:p>
-        </p:txBody>
-      </p:sp>
-      <p:sp>
-        <p:nvSpPr>
           <p:cNvPr id="62" name="Right Arrow 61">
             <a:extLst>
               <a:ext uri="{FF2B5EF4-FFF2-40B4-BE49-F238E27FC236}">
@@ -4119,124 +3644,6 @@
       </p:sp>
       <p:sp>
         <p:nvSpPr>
-          <p:cNvPr id="63" name="Right Arrow 62">
-            <a:extLst>
-              <a:ext uri="{FF2B5EF4-FFF2-40B4-BE49-F238E27FC236}">
-                <a16:creationId xmlns:a16="http://schemas.microsoft.com/office/drawing/2014/main" id="{1CC00511-4D0C-4440-9AA0-FB061F226383}"/>
-              </a:ext>
-            </a:extLst>
-          </p:cNvPr>
-          <p:cNvSpPr/>
-          <p:nvPr/>
-        </p:nvSpPr>
-        <p:spPr>
-          <a:xfrm rot="16200000">
-            <a:off x="1604209" y="3470280"/>
-            <a:ext cx="640080" cy="211866"/>
-          </a:xfrm>
-          <a:prstGeom prst="rightArrow">
-            <a:avLst/>
-          </a:prstGeom>
-          <a:solidFill>
-            <a:schemeClr val="accent3"/>
-          </a:solidFill>
-          <a:ln w="12700">
-            <a:solidFill>
-              <a:schemeClr val="tx1"/>
-            </a:solidFill>
-          </a:ln>
-        </p:spPr>
-        <p:style>
-          <a:lnRef idx="2">
-            <a:schemeClr val="accent1">
-              <a:shade val="50000"/>
-            </a:schemeClr>
-          </a:lnRef>
-          <a:fillRef idx="1">
-            <a:schemeClr val="accent1"/>
-          </a:fillRef>
-          <a:effectRef idx="0">
-            <a:schemeClr val="accent1"/>
-          </a:effectRef>
-          <a:fontRef idx="minor">
-            <a:schemeClr val="lt1"/>
-          </a:fontRef>
-        </p:style>
-        <p:txBody>
-          <a:bodyPr rot="0" spcFirstLastPara="0" vertOverflow="overflow" horzOverflow="overflow" vert="horz" wrap="square" lIns="91440" tIns="45720" rIns="91440" bIns="45720" numCol="1" spcCol="0" rtlCol="0" fromWordArt="0" anchor="ctr" anchorCtr="0" forceAA="0" compatLnSpc="1">
-            <a:prstTxWarp prst="textNoShape">
-              <a:avLst/>
-            </a:prstTxWarp>
-            <a:noAutofit/>
-          </a:bodyPr>
-          <a:lstStyle/>
-          <a:p>
-            <a:pPr algn="ctr"/>
-            <a:endParaRPr lang="en-US" sz="1200"/>
-          </a:p>
-        </p:txBody>
-      </p:sp>
-      <p:sp>
-        <p:nvSpPr>
-          <p:cNvPr id="64" name="Right Arrow 63">
-            <a:extLst>
-              <a:ext uri="{FF2B5EF4-FFF2-40B4-BE49-F238E27FC236}">
-                <a16:creationId xmlns:a16="http://schemas.microsoft.com/office/drawing/2014/main" id="{1816D768-4892-8F45-922F-434A0984C099}"/>
-              </a:ext>
-            </a:extLst>
-          </p:cNvPr>
-          <p:cNvSpPr/>
-          <p:nvPr/>
-        </p:nvSpPr>
-        <p:spPr>
-          <a:xfrm rot="8909829" flipH="1">
-            <a:off x="2220856" y="3490102"/>
-            <a:ext cx="1600200" cy="211866"/>
-          </a:xfrm>
-          <a:prstGeom prst="rightArrow">
-            <a:avLst/>
-          </a:prstGeom>
-          <a:solidFill>
-            <a:schemeClr val="accent3"/>
-          </a:solidFill>
-          <a:ln w="12700">
-            <a:solidFill>
-              <a:schemeClr val="tx1"/>
-            </a:solidFill>
-          </a:ln>
-        </p:spPr>
-        <p:style>
-          <a:lnRef idx="2">
-            <a:schemeClr val="accent1">
-              <a:shade val="50000"/>
-            </a:schemeClr>
-          </a:lnRef>
-          <a:fillRef idx="1">
-            <a:schemeClr val="accent1"/>
-          </a:fillRef>
-          <a:effectRef idx="0">
-            <a:schemeClr val="accent1"/>
-          </a:effectRef>
-          <a:fontRef idx="minor">
-            <a:schemeClr val="lt1"/>
-          </a:fontRef>
-        </p:style>
-        <p:txBody>
-          <a:bodyPr rot="0" spcFirstLastPara="0" vertOverflow="overflow" horzOverflow="overflow" vert="horz" wrap="square" lIns="91440" tIns="45720" rIns="91440" bIns="45720" numCol="1" spcCol="0" rtlCol="0" fromWordArt="0" anchor="ctr" anchorCtr="0" forceAA="0" compatLnSpc="1">
-            <a:prstTxWarp prst="textNoShape">
-              <a:avLst/>
-            </a:prstTxWarp>
-            <a:noAutofit/>
-          </a:bodyPr>
-          <a:lstStyle/>
-          <a:p>
-            <a:pPr algn="ctr"/>
-            <a:endParaRPr lang="en-US" sz="1200"/>
-          </a:p>
-        </p:txBody>
-      </p:sp>
-      <p:sp>
-        <p:nvSpPr>
           <p:cNvPr id="65" name="Right Arrow 64">
             <a:extLst>
               <a:ext uri="{FF2B5EF4-FFF2-40B4-BE49-F238E27FC236}">
@@ -4296,236 +3703,6 @@
       </p:sp>
       <p:sp>
         <p:nvSpPr>
-          <p:cNvPr id="3" name="Left-Right Arrow 2">
-            <a:extLst>
-              <a:ext uri="{FF2B5EF4-FFF2-40B4-BE49-F238E27FC236}">
-                <a16:creationId xmlns:a16="http://schemas.microsoft.com/office/drawing/2014/main" id="{DF27F525-EDCD-864C-9720-3A7507E40B99}"/>
-              </a:ext>
-            </a:extLst>
-          </p:cNvPr>
-          <p:cNvSpPr/>
-          <p:nvPr/>
-        </p:nvSpPr>
-        <p:spPr>
-          <a:xfrm rot="19826438">
-            <a:off x="2265332" y="4423653"/>
-            <a:ext cx="522097" cy="220476"/>
-          </a:xfrm>
-          <a:prstGeom prst="leftRightArrow">
-            <a:avLst/>
-          </a:prstGeom>
-          <a:solidFill>
-            <a:srgbClr val="0070C0"/>
-          </a:solidFill>
-          <a:ln>
-            <a:solidFill>
-              <a:schemeClr val="accent5">
-                <a:lumMod val="50000"/>
-              </a:schemeClr>
-            </a:solidFill>
-          </a:ln>
-        </p:spPr>
-        <p:style>
-          <a:lnRef idx="2">
-            <a:schemeClr val="accent1">
-              <a:shade val="50000"/>
-            </a:schemeClr>
-          </a:lnRef>
-          <a:fillRef idx="1">
-            <a:schemeClr val="accent1"/>
-          </a:fillRef>
-          <a:effectRef idx="0">
-            <a:schemeClr val="accent1"/>
-          </a:effectRef>
-          <a:fontRef idx="minor">
-            <a:schemeClr val="lt1"/>
-          </a:fontRef>
-        </p:style>
-        <p:txBody>
-          <a:bodyPr rtlCol="0" anchor="ctr"/>
-          <a:lstStyle/>
-          <a:p>
-            <a:pPr algn="ctr"/>
-            <a:endParaRPr lang="en-US"/>
-          </a:p>
-        </p:txBody>
-      </p:sp>
-      <p:sp>
-        <p:nvSpPr>
-          <p:cNvPr id="66" name="Right Arrow 65">
-            <a:extLst>
-              <a:ext uri="{FF2B5EF4-FFF2-40B4-BE49-F238E27FC236}">
-                <a16:creationId xmlns:a16="http://schemas.microsoft.com/office/drawing/2014/main" id="{9007ABC9-C87A-4344-8B06-28020FB675DE}"/>
-              </a:ext>
-            </a:extLst>
-          </p:cNvPr>
-          <p:cNvSpPr/>
-          <p:nvPr/>
-        </p:nvSpPr>
-        <p:spPr>
-          <a:xfrm>
-            <a:off x="980380" y="19650"/>
-            <a:ext cx="457200" cy="211866"/>
-          </a:xfrm>
-          <a:prstGeom prst="rightArrow">
-            <a:avLst/>
-          </a:prstGeom>
-          <a:solidFill>
-            <a:schemeClr val="accent3"/>
-          </a:solidFill>
-          <a:ln w="12700">
-            <a:solidFill>
-              <a:schemeClr val="tx1"/>
-            </a:solidFill>
-          </a:ln>
-        </p:spPr>
-        <p:style>
-          <a:lnRef idx="2">
-            <a:schemeClr val="accent1">
-              <a:shade val="50000"/>
-            </a:schemeClr>
-          </a:lnRef>
-          <a:fillRef idx="1">
-            <a:schemeClr val="accent1"/>
-          </a:fillRef>
-          <a:effectRef idx="0">
-            <a:schemeClr val="accent1"/>
-          </a:effectRef>
-          <a:fontRef idx="minor">
-            <a:schemeClr val="lt1"/>
-          </a:fontRef>
-        </p:style>
-        <p:txBody>
-          <a:bodyPr rot="0" spcFirstLastPara="0" vertOverflow="overflow" horzOverflow="overflow" vert="horz" wrap="square" lIns="91440" tIns="45720" rIns="91440" bIns="45720" numCol="1" spcCol="0" rtlCol="0" fromWordArt="0" anchor="ctr" anchorCtr="0" forceAA="0" compatLnSpc="1">
-            <a:prstTxWarp prst="textNoShape">
-              <a:avLst/>
-            </a:prstTxWarp>
-            <a:noAutofit/>
-          </a:bodyPr>
-          <a:lstStyle/>
-          <a:p>
-            <a:pPr algn="ctr"/>
-            <a:endParaRPr lang="en-US" sz="1200"/>
-          </a:p>
-        </p:txBody>
-      </p:sp>
-      <p:sp>
-        <p:nvSpPr>
-          <p:cNvPr id="67" name="Left-Right Arrow 66">
-            <a:extLst>
-              <a:ext uri="{FF2B5EF4-FFF2-40B4-BE49-F238E27FC236}">
-                <a16:creationId xmlns:a16="http://schemas.microsoft.com/office/drawing/2014/main" id="{31BC5CCC-F2CB-E74E-A534-964406044BB1}"/>
-              </a:ext>
-            </a:extLst>
-          </p:cNvPr>
-          <p:cNvSpPr/>
-          <p:nvPr/>
-        </p:nvSpPr>
-        <p:spPr>
-          <a:xfrm>
-            <a:off x="915483" y="417580"/>
-            <a:ext cx="522097" cy="220476"/>
-          </a:xfrm>
-          <a:prstGeom prst="leftRightArrow">
-            <a:avLst/>
-          </a:prstGeom>
-          <a:solidFill>
-            <a:srgbClr val="0070C0"/>
-          </a:solidFill>
-          <a:ln>
-            <a:solidFill>
-              <a:schemeClr val="accent5">
-                <a:lumMod val="50000"/>
-              </a:schemeClr>
-            </a:solidFill>
-          </a:ln>
-        </p:spPr>
-        <p:style>
-          <a:lnRef idx="2">
-            <a:schemeClr val="accent1">
-              <a:shade val="50000"/>
-            </a:schemeClr>
-          </a:lnRef>
-          <a:fillRef idx="1">
-            <a:schemeClr val="accent1"/>
-          </a:fillRef>
-          <a:effectRef idx="0">
-            <a:schemeClr val="accent1"/>
-          </a:effectRef>
-          <a:fontRef idx="minor">
-            <a:schemeClr val="lt1"/>
-          </a:fontRef>
-        </p:style>
-        <p:txBody>
-          <a:bodyPr rtlCol="0" anchor="ctr"/>
-          <a:lstStyle/>
-          <a:p>
-            <a:pPr algn="ctr"/>
-            <a:endParaRPr lang="en-US"/>
-          </a:p>
-        </p:txBody>
-      </p:sp>
-      <p:sp>
-        <p:nvSpPr>
-          <p:cNvPr id="68" name="Right Arrow 67">
-            <a:extLst>
-              <a:ext uri="{FF2B5EF4-FFF2-40B4-BE49-F238E27FC236}">
-                <a16:creationId xmlns:a16="http://schemas.microsoft.com/office/drawing/2014/main" id="{49651CC2-F667-9B44-B3EE-CD8E3DD0CBE3}"/>
-              </a:ext>
-            </a:extLst>
-          </p:cNvPr>
-          <p:cNvSpPr/>
-          <p:nvPr/>
-        </p:nvSpPr>
-        <p:spPr>
-          <a:xfrm>
-            <a:off x="980380" y="897976"/>
-            <a:ext cx="457200" cy="211866"/>
-          </a:xfrm>
-          <a:prstGeom prst="rightArrow">
-            <a:avLst/>
-          </a:prstGeom>
-          <a:solidFill>
-            <a:srgbClr val="C00000"/>
-          </a:solidFill>
-          <a:ln w="12700">
-            <a:solidFill>
-              <a:schemeClr val="tx1"/>
-            </a:solidFill>
-          </a:ln>
-        </p:spPr>
-        <p:style>
-          <a:lnRef idx="2">
-            <a:schemeClr val="accent1">
-              <a:shade val="50000"/>
-            </a:schemeClr>
-          </a:lnRef>
-          <a:fillRef idx="1">
-            <a:schemeClr val="accent1"/>
-          </a:fillRef>
-          <a:effectRef idx="0">
-            <a:schemeClr val="accent1"/>
-          </a:effectRef>
-          <a:fontRef idx="minor">
-            <a:schemeClr val="lt1"/>
-          </a:fontRef>
-        </p:style>
-        <p:txBody>
-          <a:bodyPr rot="0" spcFirstLastPara="0" vertOverflow="overflow" horzOverflow="overflow" vert="horz" wrap="square" lIns="91440" tIns="45720" rIns="91440" bIns="45720" numCol="1" spcCol="0" rtlCol="0" fromWordArt="0" anchor="ctr" anchorCtr="0" forceAA="0" compatLnSpc="1">
-            <a:prstTxWarp prst="textNoShape">
-              <a:avLst/>
-            </a:prstTxWarp>
-            <a:noAutofit/>
-          </a:bodyPr>
-          <a:lstStyle/>
-          <a:p>
-            <a:pPr algn="ctr"/>
-            <a:endParaRPr lang="en-US" sz="1200"/>
-          </a:p>
-        </p:txBody>
-      </p:sp>
-      <p:sp>
-        <p:nvSpPr>
           <p:cNvPr id="69" name="Right Arrow 68">
             <a:extLst>
               <a:ext uri="{FF2B5EF4-FFF2-40B4-BE49-F238E27FC236}">
@@ -4746,65 +3923,6 @@
       </p:sp>
       <p:sp>
         <p:nvSpPr>
-          <p:cNvPr id="74" name="Right Arrow 73">
-            <a:extLst>
-              <a:ext uri="{FF2B5EF4-FFF2-40B4-BE49-F238E27FC236}">
-                <a16:creationId xmlns:a16="http://schemas.microsoft.com/office/drawing/2014/main" id="{4ECEE4D9-F3B6-944A-AE71-65469B6ADF20}"/>
-              </a:ext>
-            </a:extLst>
-          </p:cNvPr>
-          <p:cNvSpPr/>
-          <p:nvPr/>
-        </p:nvSpPr>
-        <p:spPr>
-          <a:xfrm rot="16200000">
-            <a:off x="1768788" y="5137947"/>
-            <a:ext cx="640080" cy="211866"/>
-          </a:xfrm>
-          <a:prstGeom prst="rightArrow">
-            <a:avLst/>
-          </a:prstGeom>
-          <a:solidFill>
-            <a:schemeClr val="accent3"/>
-          </a:solidFill>
-          <a:ln w="12700">
-            <a:solidFill>
-              <a:schemeClr val="tx1"/>
-            </a:solidFill>
-          </a:ln>
-        </p:spPr>
-        <p:style>
-          <a:lnRef idx="2">
-            <a:schemeClr val="accent1">
-              <a:shade val="50000"/>
-            </a:schemeClr>
-          </a:lnRef>
-          <a:fillRef idx="1">
-            <a:schemeClr val="accent1"/>
-          </a:fillRef>
-          <a:effectRef idx="0">
-            <a:schemeClr val="accent1"/>
-          </a:effectRef>
-          <a:fontRef idx="minor">
-            <a:schemeClr val="lt1"/>
-          </a:fontRef>
-        </p:style>
-        <p:txBody>
-          <a:bodyPr rot="0" spcFirstLastPara="0" vertOverflow="overflow" horzOverflow="overflow" vert="horz" wrap="square" lIns="91440" tIns="45720" rIns="91440" bIns="45720" numCol="1" spcCol="0" rtlCol="0" fromWordArt="0" anchor="ctr" anchorCtr="0" forceAA="0" compatLnSpc="1">
-            <a:prstTxWarp prst="textNoShape">
-              <a:avLst/>
-            </a:prstTxWarp>
-            <a:noAutofit/>
-          </a:bodyPr>
-          <a:lstStyle/>
-          <a:p>
-            <a:pPr algn="ctr"/>
-            <a:endParaRPr lang="en-US" sz="1200"/>
-          </a:p>
-        </p:txBody>
-      </p:sp>
-      <p:sp>
-        <p:nvSpPr>
           <p:cNvPr id="75" name="Right Arrow 74">
             <a:extLst>
               <a:ext uri="{FF2B5EF4-FFF2-40B4-BE49-F238E27FC236}">
@@ -4878,301 +3996,6 @@
           <a:xfrm rot="12216103">
             <a:off x="4283380" y="4306483"/>
             <a:ext cx="687232" cy="211866"/>
-          </a:xfrm>
-          <a:prstGeom prst="rightArrow">
-            <a:avLst/>
-          </a:prstGeom>
-          <a:solidFill>
-            <a:schemeClr val="accent3"/>
-          </a:solidFill>
-          <a:ln w="12700">
-            <a:solidFill>
-              <a:schemeClr val="tx1"/>
-            </a:solidFill>
-          </a:ln>
-        </p:spPr>
-        <p:style>
-          <a:lnRef idx="2">
-            <a:schemeClr val="accent1">
-              <a:shade val="50000"/>
-            </a:schemeClr>
-          </a:lnRef>
-          <a:fillRef idx="1">
-            <a:schemeClr val="accent1"/>
-          </a:fillRef>
-          <a:effectRef idx="0">
-            <a:schemeClr val="accent1"/>
-          </a:effectRef>
-          <a:fontRef idx="minor">
-            <a:schemeClr val="lt1"/>
-          </a:fontRef>
-        </p:style>
-        <p:txBody>
-          <a:bodyPr rot="0" spcFirstLastPara="0" vertOverflow="overflow" horzOverflow="overflow" vert="horz" wrap="square" lIns="91440" tIns="45720" rIns="91440" bIns="45720" numCol="1" spcCol="0" rtlCol="0" fromWordArt="0" anchor="ctr" anchorCtr="0" forceAA="0" compatLnSpc="1">
-            <a:prstTxWarp prst="textNoShape">
-              <a:avLst/>
-            </a:prstTxWarp>
-            <a:noAutofit/>
-          </a:bodyPr>
-          <a:lstStyle/>
-          <a:p>
-            <a:pPr algn="ctr"/>
-            <a:endParaRPr lang="en-US" sz="1200"/>
-          </a:p>
-        </p:txBody>
-      </p:sp>
-      <p:sp>
-        <p:nvSpPr>
-          <p:cNvPr id="77" name="Right Arrow 76">
-            <a:extLst>
-              <a:ext uri="{FF2B5EF4-FFF2-40B4-BE49-F238E27FC236}">
-                <a16:creationId xmlns:a16="http://schemas.microsoft.com/office/drawing/2014/main" id="{A27D4CF8-DA3F-BD4E-89F7-80CC6DB043F2}"/>
-              </a:ext>
-            </a:extLst>
-          </p:cNvPr>
-          <p:cNvSpPr/>
-          <p:nvPr/>
-        </p:nvSpPr>
-        <p:spPr>
-          <a:xfrm rot="16200000">
-            <a:off x="2926136" y="5923679"/>
-            <a:ext cx="640080" cy="211866"/>
-          </a:xfrm>
-          <a:prstGeom prst="rightArrow">
-            <a:avLst/>
-          </a:prstGeom>
-          <a:solidFill>
-            <a:schemeClr val="accent3"/>
-          </a:solidFill>
-          <a:ln w="12700">
-            <a:solidFill>
-              <a:schemeClr val="tx1"/>
-            </a:solidFill>
-          </a:ln>
-        </p:spPr>
-        <p:style>
-          <a:lnRef idx="2">
-            <a:schemeClr val="accent1">
-              <a:shade val="50000"/>
-            </a:schemeClr>
-          </a:lnRef>
-          <a:fillRef idx="1">
-            <a:schemeClr val="accent1"/>
-          </a:fillRef>
-          <a:effectRef idx="0">
-            <a:schemeClr val="accent1"/>
-          </a:effectRef>
-          <a:fontRef idx="minor">
-            <a:schemeClr val="lt1"/>
-          </a:fontRef>
-        </p:style>
-        <p:txBody>
-          <a:bodyPr rot="0" spcFirstLastPara="0" vertOverflow="overflow" horzOverflow="overflow" vert="horz" wrap="square" lIns="91440" tIns="45720" rIns="91440" bIns="45720" numCol="1" spcCol="0" rtlCol="0" fromWordArt="0" anchor="ctr" anchorCtr="0" forceAA="0" compatLnSpc="1">
-            <a:prstTxWarp prst="textNoShape">
-              <a:avLst/>
-            </a:prstTxWarp>
-            <a:noAutofit/>
-          </a:bodyPr>
-          <a:lstStyle/>
-          <a:p>
-            <a:pPr algn="ctr"/>
-            <a:endParaRPr lang="en-US" sz="1200"/>
-          </a:p>
-        </p:txBody>
-      </p:sp>
-      <p:sp>
-        <p:nvSpPr>
-          <p:cNvPr id="78" name="Right Arrow 77">
-            <a:extLst>
-              <a:ext uri="{FF2B5EF4-FFF2-40B4-BE49-F238E27FC236}">
-                <a16:creationId xmlns:a16="http://schemas.microsoft.com/office/drawing/2014/main" id="{F91D16E0-BD53-2244-BA91-571D327688AB}"/>
-              </a:ext>
-            </a:extLst>
-          </p:cNvPr>
-          <p:cNvSpPr/>
-          <p:nvPr/>
-        </p:nvSpPr>
-        <p:spPr>
-          <a:xfrm rot="12879335">
-            <a:off x="2267040" y="4991828"/>
-            <a:ext cx="687232" cy="211866"/>
-          </a:xfrm>
-          <a:prstGeom prst="rightArrow">
-            <a:avLst/>
-          </a:prstGeom>
-          <a:solidFill>
-            <a:schemeClr val="accent3"/>
-          </a:solidFill>
-          <a:ln w="12700">
-            <a:solidFill>
-              <a:schemeClr val="tx1"/>
-            </a:solidFill>
-          </a:ln>
-        </p:spPr>
-        <p:style>
-          <a:lnRef idx="2">
-            <a:schemeClr val="accent1">
-              <a:shade val="50000"/>
-            </a:schemeClr>
-          </a:lnRef>
-          <a:fillRef idx="1">
-            <a:schemeClr val="accent1"/>
-          </a:fillRef>
-          <a:effectRef idx="0">
-            <a:schemeClr val="accent1"/>
-          </a:effectRef>
-          <a:fontRef idx="minor">
-            <a:schemeClr val="lt1"/>
-          </a:fontRef>
-        </p:style>
-        <p:txBody>
-          <a:bodyPr rot="0" spcFirstLastPara="0" vertOverflow="overflow" horzOverflow="overflow" vert="horz" wrap="square" lIns="91440" tIns="45720" rIns="91440" bIns="45720" numCol="1" spcCol="0" rtlCol="0" fromWordArt="0" anchor="ctr" anchorCtr="0" forceAA="0" compatLnSpc="1">
-            <a:prstTxWarp prst="textNoShape">
-              <a:avLst/>
-            </a:prstTxWarp>
-            <a:noAutofit/>
-          </a:bodyPr>
-          <a:lstStyle/>
-          <a:p>
-            <a:pPr algn="ctr"/>
-            <a:endParaRPr lang="en-US" sz="1200"/>
-          </a:p>
-        </p:txBody>
-      </p:sp>
-      <p:sp>
-        <p:nvSpPr>
-          <p:cNvPr id="84" name="Right Arrow 83">
-            <a:extLst>
-              <a:ext uri="{FF2B5EF4-FFF2-40B4-BE49-F238E27FC236}">
-                <a16:creationId xmlns:a16="http://schemas.microsoft.com/office/drawing/2014/main" id="{05899772-67B5-164A-8F7E-43B83D7FF8DE}"/>
-              </a:ext>
-            </a:extLst>
-          </p:cNvPr>
-          <p:cNvSpPr/>
-          <p:nvPr/>
-        </p:nvSpPr>
-        <p:spPr>
-          <a:xfrm rot="17760000">
-            <a:off x="4035088" y="5965737"/>
-            <a:ext cx="640080" cy="211866"/>
-          </a:xfrm>
-          <a:prstGeom prst="rightArrow">
-            <a:avLst/>
-          </a:prstGeom>
-          <a:solidFill>
-            <a:schemeClr val="accent3"/>
-          </a:solidFill>
-          <a:ln w="12700">
-            <a:solidFill>
-              <a:schemeClr val="tx1"/>
-            </a:solidFill>
-          </a:ln>
-        </p:spPr>
-        <p:style>
-          <a:lnRef idx="2">
-            <a:schemeClr val="accent1">
-              <a:shade val="50000"/>
-            </a:schemeClr>
-          </a:lnRef>
-          <a:fillRef idx="1">
-            <a:schemeClr val="accent1"/>
-          </a:fillRef>
-          <a:effectRef idx="0">
-            <a:schemeClr val="accent1"/>
-          </a:effectRef>
-          <a:fontRef idx="minor">
-            <a:schemeClr val="lt1"/>
-          </a:fontRef>
-        </p:style>
-        <p:txBody>
-          <a:bodyPr rot="0" spcFirstLastPara="0" vertOverflow="overflow" horzOverflow="overflow" vert="horz" wrap="square" lIns="91440" tIns="45720" rIns="91440" bIns="45720" numCol="1" spcCol="0" rtlCol="0" fromWordArt="0" anchor="ctr" anchorCtr="0" forceAA="0" compatLnSpc="1">
-            <a:prstTxWarp prst="textNoShape">
-              <a:avLst/>
-            </a:prstTxWarp>
-            <a:noAutofit/>
-          </a:bodyPr>
-          <a:lstStyle/>
-          <a:p>
-            <a:pPr algn="ctr"/>
-            <a:endParaRPr lang="en-US" sz="1200"/>
-          </a:p>
-        </p:txBody>
-      </p:sp>
-      <p:sp>
-        <p:nvSpPr>
-          <p:cNvPr id="85" name="Right Arrow 84">
-            <a:extLst>
-              <a:ext uri="{FF2B5EF4-FFF2-40B4-BE49-F238E27FC236}">
-                <a16:creationId xmlns:a16="http://schemas.microsoft.com/office/drawing/2014/main" id="{DD071F56-01F9-F247-AB57-15ECAF063D62}"/>
-              </a:ext>
-            </a:extLst>
-          </p:cNvPr>
-          <p:cNvSpPr/>
-          <p:nvPr/>
-        </p:nvSpPr>
-        <p:spPr>
-          <a:xfrm rot="17760000">
-            <a:off x="3792247" y="6454191"/>
-            <a:ext cx="1645920" cy="211866"/>
-          </a:xfrm>
-          <a:prstGeom prst="rightArrow">
-            <a:avLst/>
-          </a:prstGeom>
-          <a:solidFill>
-            <a:schemeClr val="accent3"/>
-          </a:solidFill>
-          <a:ln w="12700">
-            <a:solidFill>
-              <a:schemeClr val="tx1"/>
-            </a:solidFill>
-          </a:ln>
-        </p:spPr>
-        <p:style>
-          <a:lnRef idx="2">
-            <a:schemeClr val="accent1">
-              <a:shade val="50000"/>
-            </a:schemeClr>
-          </a:lnRef>
-          <a:fillRef idx="1">
-            <a:schemeClr val="accent1"/>
-          </a:fillRef>
-          <a:effectRef idx="0">
-            <a:schemeClr val="accent1"/>
-          </a:effectRef>
-          <a:fontRef idx="minor">
-            <a:schemeClr val="lt1"/>
-          </a:fontRef>
-        </p:style>
-        <p:txBody>
-          <a:bodyPr rot="0" spcFirstLastPara="0" vertOverflow="overflow" horzOverflow="overflow" vert="horz" wrap="square" lIns="91440" tIns="45720" rIns="91440" bIns="45720" numCol="1" spcCol="0" rtlCol="0" fromWordArt="0" anchor="ctr" anchorCtr="0" forceAA="0" compatLnSpc="1">
-            <a:prstTxWarp prst="textNoShape">
-              <a:avLst/>
-            </a:prstTxWarp>
-            <a:noAutofit/>
-          </a:bodyPr>
-          <a:lstStyle/>
-          <a:p>
-            <a:pPr algn="ctr"/>
-            <a:endParaRPr lang="en-US" sz="1200"/>
-          </a:p>
-        </p:txBody>
-      </p:sp>
-      <p:sp>
-        <p:nvSpPr>
-          <p:cNvPr id="86" name="Right Arrow 85">
-            <a:extLst>
-              <a:ext uri="{FF2B5EF4-FFF2-40B4-BE49-F238E27FC236}">
-                <a16:creationId xmlns:a16="http://schemas.microsoft.com/office/drawing/2014/main" id="{E29DEC01-53DB-8A41-A9E3-0A58329A1B49}"/>
-              </a:ext>
-            </a:extLst>
-          </p:cNvPr>
-          <p:cNvSpPr/>
-          <p:nvPr/>
-        </p:nvSpPr>
-        <p:spPr>
-          <a:xfrm rot="17760000">
-            <a:off x="3471200" y="6944830"/>
-            <a:ext cx="2743200" cy="211866"/>
           </a:xfrm>
           <a:prstGeom prst="rightArrow">
             <a:avLst/>
@@ -5298,7 +4121,7 @@
         </p:nvSpPr>
         <p:spPr>
           <a:xfrm rot="17255455">
-            <a:off x="3239998" y="6465119"/>
+            <a:off x="3824198" y="6610736"/>
             <a:ext cx="3566160" cy="211866"/>
           </a:xfrm>
           <a:prstGeom prst="rightArrow">
@@ -5357,7 +4180,7 @@
         </p:nvSpPr>
         <p:spPr>
           <a:xfrm rot="17255455">
-            <a:off x="3473253" y="6484591"/>
+            <a:off x="4057453" y="6630208"/>
             <a:ext cx="3657600" cy="211866"/>
           </a:xfrm>
           <a:prstGeom prst="rightArrow">
@@ -5416,7 +4239,7 @@
         </p:nvSpPr>
         <p:spPr>
           <a:xfrm rot="14632784">
-            <a:off x="1112447" y="5773838"/>
+            <a:off x="1696647" y="5919455"/>
             <a:ext cx="2103120" cy="211866"/>
           </a:xfrm>
           <a:prstGeom prst="rightArrow">
@@ -5475,7 +4298,7 @@
         </p:nvSpPr>
         <p:spPr>
           <a:xfrm rot="14632784">
-            <a:off x="408395" y="6273607"/>
+            <a:off x="992595" y="6419224"/>
             <a:ext cx="3200400" cy="211866"/>
           </a:xfrm>
           <a:prstGeom prst="rightArrow">
@@ -5534,7 +4357,7 @@
         </p:nvSpPr>
         <p:spPr>
           <a:xfrm rot="14632784">
-            <a:off x="-150884" y="6479737"/>
+            <a:off x="433316" y="6625354"/>
             <a:ext cx="3657600" cy="211866"/>
           </a:xfrm>
           <a:prstGeom prst="rightArrow">
@@ -5593,7 +4416,7 @@
         </p:nvSpPr>
         <p:spPr>
           <a:xfrm rot="16200000">
-            <a:off x="2542632" y="6880689"/>
+            <a:off x="3126832" y="7026306"/>
             <a:ext cx="2542032" cy="211866"/>
           </a:xfrm>
           <a:prstGeom prst="rightArrow">
@@ -5652,7 +4475,7 @@
         </p:nvSpPr>
         <p:spPr>
           <a:xfrm rot="16200000">
-            <a:off x="2752672" y="6400637"/>
+            <a:off x="3336872" y="6546254"/>
             <a:ext cx="1554480" cy="211866"/>
           </a:xfrm>
           <a:prstGeom prst="rightArrow">
@@ -5711,7 +4534,7 @@
         </p:nvSpPr>
         <p:spPr>
           <a:xfrm>
-            <a:off x="2993144" y="5187993"/>
+            <a:off x="3577344" y="5333610"/>
             <a:ext cx="1039463" cy="461665"/>
           </a:xfrm>
           <a:prstGeom prst="rect">
@@ -5761,7 +4584,7 @@
         </p:nvSpPr>
         <p:spPr>
           <a:xfrm>
-            <a:off x="1437580" y="5648923"/>
+            <a:off x="2021780" y="5794540"/>
             <a:ext cx="1155310" cy="646331"/>
           </a:xfrm>
           <a:prstGeom prst="rect">
@@ -5811,7 +4634,7 @@
         </p:nvSpPr>
         <p:spPr>
           <a:xfrm>
-            <a:off x="702797" y="4043083"/>
+            <a:off x="1286997" y="4188700"/>
             <a:ext cx="1537136" cy="830997"/>
           </a:xfrm>
           <a:prstGeom prst="rect">
@@ -5861,7 +4684,7 @@
         </p:nvSpPr>
         <p:spPr>
           <a:xfrm>
-            <a:off x="2810321" y="3941164"/>
+            <a:off x="3394521" y="4086781"/>
             <a:ext cx="1405110" cy="461665"/>
           </a:xfrm>
           <a:prstGeom prst="rect">
@@ -5913,7 +4736,7 @@
         </p:nvSpPr>
         <p:spPr>
           <a:xfrm>
-            <a:off x="2369394" y="8349970"/>
+            <a:off x="2953594" y="8495587"/>
             <a:ext cx="2261564" cy="461665"/>
           </a:xfrm>
           <a:prstGeom prst="rect">
@@ -5963,7 +4786,7 @@
         </p:nvSpPr>
         <p:spPr>
           <a:xfrm>
-            <a:off x="2852171" y="7358932"/>
+            <a:off x="3436371" y="7504549"/>
             <a:ext cx="1321411" cy="646331"/>
           </a:xfrm>
           <a:prstGeom prst="rect">
@@ -6013,7 +4836,7 @@
         </p:nvSpPr>
         <p:spPr>
           <a:xfrm>
-            <a:off x="4173582" y="5095659"/>
+            <a:off x="4757782" y="5241276"/>
             <a:ext cx="1405110" cy="646331"/>
           </a:xfrm>
           <a:prstGeom prst="rect">
@@ -6063,7 +4886,7 @@
         </p:nvSpPr>
         <p:spPr>
           <a:xfrm rot="14028170">
-            <a:off x="2508554" y="3430243"/>
+            <a:off x="3092754" y="3575860"/>
             <a:ext cx="687232" cy="211866"/>
           </a:xfrm>
           <a:prstGeom prst="rightArrow">
@@ -6122,7 +4945,7 @@
         </p:nvSpPr>
         <p:spPr>
           <a:xfrm>
-            <a:off x="2705460" y="6443576"/>
+            <a:off x="3289660" y="6589193"/>
             <a:ext cx="1503928" cy="646331"/>
           </a:xfrm>
           <a:prstGeom prst="rect">
@@ -6172,7 +4995,7 @@
         </p:nvSpPr>
         <p:spPr>
           <a:xfrm>
-            <a:off x="3745785" y="2646278"/>
+            <a:off x="4329985" y="2791895"/>
             <a:ext cx="1405110" cy="461665"/>
           </a:xfrm>
           <a:prstGeom prst="rect">
@@ -6222,7 +5045,7 @@
         </p:nvSpPr>
         <p:spPr>
           <a:xfrm>
-            <a:off x="1557113" y="2349646"/>
+            <a:off x="2141313" y="2495263"/>
             <a:ext cx="1624561" cy="830997"/>
           </a:xfrm>
           <a:prstGeom prst="rect">
@@ -6272,7 +5095,7 @@
         </p:nvSpPr>
         <p:spPr>
           <a:xfrm>
-            <a:off x="5018803" y="4341167"/>
+            <a:off x="5603003" y="4486784"/>
             <a:ext cx="1039463" cy="461665"/>
           </a:xfrm>
           <a:prstGeom prst="rect">
@@ -6322,7 +5145,7 @@
         </p:nvSpPr>
         <p:spPr>
           <a:xfrm>
-            <a:off x="5378" y="20323"/>
+            <a:off x="127592" y="2495936"/>
             <a:ext cx="1405110" cy="1200329"/>
           </a:xfrm>
           <a:prstGeom prst="rect">
@@ -6384,7 +5207,7 @@
         </p:nvSpPr>
         <p:spPr>
           <a:xfrm rot="7571830" flipH="1">
-            <a:off x="3735714" y="3392144"/>
+            <a:off x="4319914" y="3537761"/>
             <a:ext cx="687232" cy="211866"/>
           </a:xfrm>
           <a:prstGeom prst="rightArrow">
@@ -6443,7 +5266,7 @@
         </p:nvSpPr>
         <p:spPr>
           <a:xfrm rot="16200000">
-            <a:off x="1604209" y="3470280"/>
+            <a:off x="2188409" y="3615897"/>
             <a:ext cx="640080" cy="211866"/>
           </a:xfrm>
           <a:prstGeom prst="rightArrow">
@@ -6502,7 +5325,7 @@
         </p:nvSpPr>
         <p:spPr>
           <a:xfrm rot="8909829" flipH="1">
-            <a:off x="2220856" y="3490102"/>
+            <a:off x="2805056" y="3635719"/>
             <a:ext cx="1600200" cy="211866"/>
           </a:xfrm>
           <a:prstGeom prst="rightArrow">
@@ -6561,7 +5384,7 @@
         </p:nvSpPr>
         <p:spPr>
           <a:xfrm rot="20447920">
-            <a:off x="2296527" y="4135682"/>
+            <a:off x="2880727" y="4281299"/>
             <a:ext cx="457200" cy="211866"/>
           </a:xfrm>
           <a:prstGeom prst="rightArrow">
@@ -6620,7 +5443,7 @@
         </p:nvSpPr>
         <p:spPr>
           <a:xfrm rot="19826438">
-            <a:off x="2265332" y="4423653"/>
+            <a:off x="2849532" y="4569270"/>
             <a:ext cx="522097" cy="220476"/>
           </a:xfrm>
           <a:prstGeom prst="leftRightArrow">
@@ -6676,7 +5499,7 @@
         </p:nvSpPr>
         <p:spPr>
           <a:xfrm>
-            <a:off x="980380" y="19650"/>
+            <a:off x="1102594" y="2495263"/>
             <a:ext cx="457200" cy="211866"/>
           </a:xfrm>
           <a:prstGeom prst="rightArrow">
@@ -6735,7 +5558,7 @@
         </p:nvSpPr>
         <p:spPr>
           <a:xfrm>
-            <a:off x="915483" y="417580"/>
+            <a:off x="1037697" y="2893193"/>
             <a:ext cx="522097" cy="220476"/>
           </a:xfrm>
           <a:prstGeom prst="leftRightArrow">
@@ -6791,7 +5614,7 @@
         </p:nvSpPr>
         <p:spPr>
           <a:xfrm>
-            <a:off x="980380" y="897976"/>
+            <a:off x="1102594" y="3373589"/>
             <a:ext cx="457200" cy="211866"/>
           </a:xfrm>
           <a:prstGeom prst="rightArrow">
@@ -6850,7 +5673,7 @@
         </p:nvSpPr>
         <p:spPr>
           <a:xfrm>
-            <a:off x="1830705" y="8487569"/>
+            <a:off x="2414905" y="8633186"/>
             <a:ext cx="457200" cy="211866"/>
           </a:xfrm>
           <a:prstGeom prst="rightArrow">
@@ -6909,7 +5732,7 @@
         </p:nvSpPr>
         <p:spPr>
           <a:xfrm>
-            <a:off x="725097" y="8455002"/>
+            <a:off x="1309297" y="8600619"/>
             <a:ext cx="1039463" cy="276999"/>
           </a:xfrm>
           <a:prstGeom prst="rect">
@@ -6952,7 +5775,7 @@
         </p:nvSpPr>
         <p:spPr>
           <a:xfrm rot="16200000">
-            <a:off x="3192836" y="4689968"/>
+            <a:off x="3777036" y="4835585"/>
             <a:ext cx="640080" cy="211866"/>
           </a:xfrm>
           <a:prstGeom prst="rightArrow">
@@ -7011,7 +5834,7 @@
         </p:nvSpPr>
         <p:spPr>
           <a:xfrm rot="14028170">
-            <a:off x="3994965" y="4636751"/>
+            <a:off x="4579165" y="4782368"/>
             <a:ext cx="687232" cy="211866"/>
           </a:xfrm>
           <a:prstGeom prst="rightArrow">
@@ -7070,7 +5893,7 @@
         </p:nvSpPr>
         <p:spPr>
           <a:xfrm rot="16200000">
-            <a:off x="1768788" y="5137947"/>
+            <a:off x="2352988" y="5283564"/>
             <a:ext cx="640080" cy="211866"/>
           </a:xfrm>
           <a:prstGeom prst="rightArrow">
@@ -7129,7 +5952,7 @@
         </p:nvSpPr>
         <p:spPr>
           <a:xfrm rot="7571830" flipH="1">
-            <a:off x="2043654" y="4909330"/>
+            <a:off x="2627854" y="5054947"/>
             <a:ext cx="1325880" cy="211866"/>
           </a:xfrm>
           <a:prstGeom prst="rightArrow">
@@ -7188,7 +6011,7 @@
         </p:nvSpPr>
         <p:spPr>
           <a:xfrm rot="12216103">
-            <a:off x="4283380" y="4306483"/>
+            <a:off x="4867580" y="4452100"/>
             <a:ext cx="687232" cy="211866"/>
           </a:xfrm>
           <a:prstGeom prst="rightArrow">
@@ -7247,7 +6070,7 @@
         </p:nvSpPr>
         <p:spPr>
           <a:xfrm rot="16200000">
-            <a:off x="2926136" y="5923679"/>
+            <a:off x="3510336" y="6069296"/>
             <a:ext cx="640080" cy="211866"/>
           </a:xfrm>
           <a:prstGeom prst="rightArrow">
@@ -7306,7 +6129,7 @@
         </p:nvSpPr>
         <p:spPr>
           <a:xfrm rot="12879335">
-            <a:off x="2267040" y="4991828"/>
+            <a:off x="2851240" y="5137445"/>
             <a:ext cx="687232" cy="211866"/>
           </a:xfrm>
           <a:prstGeom prst="rightArrow">
@@ -7365,7 +6188,7 @@
         </p:nvSpPr>
         <p:spPr>
           <a:xfrm rot="17760000">
-            <a:off x="4035088" y="5965737"/>
+            <a:off x="4619288" y="6111354"/>
             <a:ext cx="640080" cy="211866"/>
           </a:xfrm>
           <a:prstGeom prst="rightArrow">
@@ -7424,7 +6247,7 @@
         </p:nvSpPr>
         <p:spPr>
           <a:xfrm rot="17760000">
-            <a:off x="3792247" y="6454191"/>
+            <a:off x="4376447" y="6599808"/>
             <a:ext cx="1645920" cy="211866"/>
           </a:xfrm>
           <a:prstGeom prst="rightArrow">
@@ -7483,7 +6306,7 @@
         </p:nvSpPr>
         <p:spPr>
           <a:xfrm rot="17760000">
-            <a:off x="3471200" y="6944830"/>
+            <a:off x="4055400" y="7090447"/>
             <a:ext cx="2743200" cy="211866"/>
           </a:xfrm>
           <a:prstGeom prst="rightArrow">

</xml_diff>

<commit_message>
added DAG and food web to website
</commit_message>
<xml_diff>
--- a/docs/model_dag.pptx
+++ b/docs/model_dag.pptx
@@ -7,6 +7,8 @@
   <p:sldIdLst>
     <p:sldId id="263" r:id="rId2"/>
     <p:sldId id="264" r:id="rId3"/>
+    <p:sldId id="265" r:id="rId4"/>
+    <p:sldId id="267" r:id="rId5"/>
   </p:sldIdLst>
   <p:sldSz cx="6858000" cy="9144000" type="screen4x3"/>
   <p:notesSz cx="6858000" cy="9144000"/>
@@ -244,7 +246,7 @@
           <a:p>
             <a:fld id="{4E348793-E847-104E-A4BF-895FFE80E6AE}" type="datetimeFigureOut">
               <a:rPr lang="en-US" smtClean="0"/>
-              <a:t>1/9/25</a:t>
+              <a:t>1/15/25</a:t>
             </a:fld>
             <a:endParaRPr lang="en-US"/>
           </a:p>
@@ -414,7 +416,7 @@
           <a:p>
             <a:fld id="{4E348793-E847-104E-A4BF-895FFE80E6AE}" type="datetimeFigureOut">
               <a:rPr lang="en-US" smtClean="0"/>
-              <a:t>1/9/25</a:t>
+              <a:t>1/15/25</a:t>
             </a:fld>
             <a:endParaRPr lang="en-US"/>
           </a:p>
@@ -594,7 +596,7 @@
           <a:p>
             <a:fld id="{4E348793-E847-104E-A4BF-895FFE80E6AE}" type="datetimeFigureOut">
               <a:rPr lang="en-US" smtClean="0"/>
-              <a:t>1/9/25</a:t>
+              <a:t>1/15/25</a:t>
             </a:fld>
             <a:endParaRPr lang="en-US"/>
           </a:p>
@@ -764,7 +766,7 @@
           <a:p>
             <a:fld id="{4E348793-E847-104E-A4BF-895FFE80E6AE}" type="datetimeFigureOut">
               <a:rPr lang="en-US" smtClean="0"/>
-              <a:t>1/9/25</a:t>
+              <a:t>1/15/25</a:t>
             </a:fld>
             <a:endParaRPr lang="en-US"/>
           </a:p>
@@ -1008,7 +1010,7 @@
           <a:p>
             <a:fld id="{4E348793-E847-104E-A4BF-895FFE80E6AE}" type="datetimeFigureOut">
               <a:rPr lang="en-US" smtClean="0"/>
-              <a:t>1/9/25</a:t>
+              <a:t>1/15/25</a:t>
             </a:fld>
             <a:endParaRPr lang="en-US"/>
           </a:p>
@@ -1240,7 +1242,7 @@
           <a:p>
             <a:fld id="{4E348793-E847-104E-A4BF-895FFE80E6AE}" type="datetimeFigureOut">
               <a:rPr lang="en-US" smtClean="0"/>
-              <a:t>1/9/25</a:t>
+              <a:t>1/15/25</a:t>
             </a:fld>
             <a:endParaRPr lang="en-US"/>
           </a:p>
@@ -1607,7 +1609,7 @@
           <a:p>
             <a:fld id="{4E348793-E847-104E-A4BF-895FFE80E6AE}" type="datetimeFigureOut">
               <a:rPr lang="en-US" smtClean="0"/>
-              <a:t>1/9/25</a:t>
+              <a:t>1/15/25</a:t>
             </a:fld>
             <a:endParaRPr lang="en-US"/>
           </a:p>
@@ -1725,7 +1727,7 @@
           <a:p>
             <a:fld id="{4E348793-E847-104E-A4BF-895FFE80E6AE}" type="datetimeFigureOut">
               <a:rPr lang="en-US" smtClean="0"/>
-              <a:t>1/9/25</a:t>
+              <a:t>1/15/25</a:t>
             </a:fld>
             <a:endParaRPr lang="en-US"/>
           </a:p>
@@ -1820,7 +1822,7 @@
           <a:p>
             <a:fld id="{4E348793-E847-104E-A4BF-895FFE80E6AE}" type="datetimeFigureOut">
               <a:rPr lang="en-US" smtClean="0"/>
-              <a:t>1/9/25</a:t>
+              <a:t>1/15/25</a:t>
             </a:fld>
             <a:endParaRPr lang="en-US"/>
           </a:p>
@@ -2097,7 +2099,7 @@
           <a:p>
             <a:fld id="{4E348793-E847-104E-A4BF-895FFE80E6AE}" type="datetimeFigureOut">
               <a:rPr lang="en-US" smtClean="0"/>
-              <a:t>1/9/25</a:t>
+              <a:t>1/15/25</a:t>
             </a:fld>
             <a:endParaRPr lang="en-US"/>
           </a:p>
@@ -2354,7 +2356,7 @@
           <a:p>
             <a:fld id="{4E348793-E847-104E-A4BF-895FFE80E6AE}" type="datetimeFigureOut">
               <a:rPr lang="en-US" smtClean="0"/>
-              <a:t>1/9/25</a:t>
+              <a:t>1/15/25</a:t>
             </a:fld>
             <a:endParaRPr lang="en-US"/>
           </a:p>
@@ -2567,7 +2569,7 @@
           <a:p>
             <a:fld id="{4E348793-E847-104E-A4BF-895FFE80E6AE}" type="datetimeFigureOut">
               <a:rPr lang="en-US" smtClean="0"/>
-              <a:t>1/9/25</a:t>
+              <a:t>1/15/25</a:t>
             </a:fld>
             <a:endParaRPr lang="en-US"/>
           </a:p>
@@ -4787,7 +4789,7 @@
         <p:spPr>
           <a:xfrm>
             <a:off x="3436371" y="7504549"/>
-            <a:ext cx="1321411" cy="646331"/>
+            <a:ext cx="1417539" cy="461665"/>
           </a:xfrm>
           <a:prstGeom prst="rect">
             <a:avLst/>
@@ -4817,7 +4819,7 @@
             <a:pPr algn="ctr"/>
             <a:r>
               <a:rPr lang="en-US" sz="1200" b="1" dirty="0"/>
-              <a:t>Micro-zooplankton</a:t>
+              <a:t>Microzooplankton</a:t>
             </a:r>
           </a:p>
         </p:txBody>
@@ -4946,7 +4948,7 @@
         <p:spPr>
           <a:xfrm>
             <a:off x="3289660" y="6589193"/>
-            <a:ext cx="1503928" cy="646331"/>
+            <a:ext cx="1503928" cy="830997"/>
           </a:xfrm>
           <a:prstGeom prst="rect">
             <a:avLst/>
@@ -4976,7 +4978,7 @@
             <a:pPr algn="ctr"/>
             <a:r>
               <a:rPr lang="en-US" sz="1200" b="1" dirty="0"/>
-              <a:t>Large zooplankton (copepods)</a:t>
+              <a:t>Large zooplankton (copepods, decapod larvae)</a:t>
             </a:r>
           </a:p>
         </p:txBody>
@@ -6393,6 +6395,4053 @@
     <p:extLst>
       <p:ext uri="{BB962C8B-B14F-4D97-AF65-F5344CB8AC3E}">
         <p14:creationId xmlns:p14="http://schemas.microsoft.com/office/powerpoint/2010/main" val="1429449569"/>
+      </p:ext>
+    </p:extLst>
+  </p:cSld>
+  <p:clrMapOvr>
+    <a:masterClrMapping/>
+  </p:clrMapOvr>
+</p:sld>
+</file>
+
+<file path=ppt/slides/slide3.xml><?xml version="1.0" encoding="utf-8"?>
+<p:sld xmlns:a="http://schemas.openxmlformats.org/drawingml/2006/main" xmlns:r="http://schemas.openxmlformats.org/officeDocument/2006/relationships" xmlns:p="http://schemas.openxmlformats.org/presentationml/2006/main">
+  <p:cSld>
+    <p:spTree>
+      <p:nvGrpSpPr>
+        <p:cNvPr id="1" name=""/>
+        <p:cNvGrpSpPr/>
+        <p:nvPr/>
+      </p:nvGrpSpPr>
+      <p:grpSpPr>
+        <a:xfrm>
+          <a:off x="0" y="0"/>
+          <a:ext cx="0" cy="0"/>
+          <a:chOff x="0" y="0"/>
+          <a:chExt cx="0" cy="0"/>
+        </a:xfrm>
+      </p:grpSpPr>
+      <p:sp>
+        <p:nvSpPr>
+          <p:cNvPr id="48" name="Right Arrow 47">
+            <a:extLst>
+              <a:ext uri="{FF2B5EF4-FFF2-40B4-BE49-F238E27FC236}">
+                <a16:creationId xmlns:a16="http://schemas.microsoft.com/office/drawing/2014/main" id="{C4EA9794-F22E-AD44-987C-159B87E2612F}"/>
+              </a:ext>
+            </a:extLst>
+          </p:cNvPr>
+          <p:cNvSpPr/>
+          <p:nvPr/>
+        </p:nvSpPr>
+        <p:spPr>
+          <a:xfrm rot="9068587" flipH="1">
+            <a:off x="2705965" y="7045875"/>
+            <a:ext cx="1232763" cy="204610"/>
+          </a:xfrm>
+          <a:prstGeom prst="rightArrow">
+            <a:avLst/>
+          </a:prstGeom>
+          <a:solidFill>
+            <a:schemeClr val="accent3"/>
+          </a:solidFill>
+          <a:ln w="12700">
+            <a:solidFill>
+              <a:schemeClr val="tx1"/>
+            </a:solidFill>
+          </a:ln>
+        </p:spPr>
+        <p:style>
+          <a:lnRef idx="2">
+            <a:schemeClr val="accent1">
+              <a:shade val="50000"/>
+            </a:schemeClr>
+          </a:lnRef>
+          <a:fillRef idx="1">
+            <a:schemeClr val="accent1"/>
+          </a:fillRef>
+          <a:effectRef idx="0">
+            <a:schemeClr val="accent1"/>
+          </a:effectRef>
+          <a:fontRef idx="minor">
+            <a:schemeClr val="lt1"/>
+          </a:fontRef>
+        </p:style>
+        <p:txBody>
+          <a:bodyPr rot="0" spcFirstLastPara="0" vertOverflow="overflow" horzOverflow="overflow" vert="horz" wrap="square" lIns="91440" tIns="45720" rIns="91440" bIns="45720" numCol="1" spcCol="0" rtlCol="0" fromWordArt="0" anchor="ctr" anchorCtr="0" forceAA="0" compatLnSpc="1">
+            <a:prstTxWarp prst="textNoShape">
+              <a:avLst/>
+            </a:prstTxWarp>
+            <a:noAutofit/>
+          </a:bodyPr>
+          <a:lstStyle/>
+          <a:p>
+            <a:pPr algn="ctr"/>
+            <a:endParaRPr lang="en-US" sz="1200"/>
+          </a:p>
+        </p:txBody>
+      </p:sp>
+      <p:sp>
+        <p:nvSpPr>
+          <p:cNvPr id="83" name="Right Arrow 82">
+            <a:extLst>
+              <a:ext uri="{FF2B5EF4-FFF2-40B4-BE49-F238E27FC236}">
+                <a16:creationId xmlns:a16="http://schemas.microsoft.com/office/drawing/2014/main" id="{9B7E0699-28CD-514D-AF0A-4F86773DA107}"/>
+              </a:ext>
+            </a:extLst>
+          </p:cNvPr>
+          <p:cNvSpPr/>
+          <p:nvPr/>
+        </p:nvSpPr>
+        <p:spPr>
+          <a:xfrm rot="14632784">
+            <a:off x="1035536" y="7311302"/>
+            <a:ext cx="2103120" cy="211866"/>
+          </a:xfrm>
+          <a:prstGeom prst="rightArrow">
+            <a:avLst/>
+          </a:prstGeom>
+          <a:solidFill>
+            <a:schemeClr val="accent3"/>
+          </a:solidFill>
+          <a:ln w="12700">
+            <a:solidFill>
+              <a:schemeClr val="tx1"/>
+            </a:solidFill>
+          </a:ln>
+        </p:spPr>
+        <p:style>
+          <a:lnRef idx="2">
+            <a:schemeClr val="accent1">
+              <a:shade val="50000"/>
+            </a:schemeClr>
+          </a:lnRef>
+          <a:fillRef idx="1">
+            <a:schemeClr val="accent1"/>
+          </a:fillRef>
+          <a:effectRef idx="0">
+            <a:schemeClr val="accent1"/>
+          </a:effectRef>
+          <a:fontRef idx="minor">
+            <a:schemeClr val="lt1"/>
+          </a:fontRef>
+        </p:style>
+        <p:txBody>
+          <a:bodyPr rot="0" spcFirstLastPara="0" vertOverflow="overflow" horzOverflow="overflow" vert="horz" wrap="square" lIns="91440" tIns="45720" rIns="91440" bIns="45720" numCol="1" spcCol="0" rtlCol="0" fromWordArt="0" anchor="ctr" anchorCtr="0" forceAA="0" compatLnSpc="1">
+            <a:prstTxWarp prst="textNoShape">
+              <a:avLst/>
+            </a:prstTxWarp>
+            <a:noAutofit/>
+          </a:bodyPr>
+          <a:lstStyle/>
+          <a:p>
+            <a:pPr algn="ctr"/>
+            <a:endParaRPr lang="en-US" sz="1200"/>
+          </a:p>
+        </p:txBody>
+      </p:sp>
+      <p:sp>
+        <p:nvSpPr>
+          <p:cNvPr id="82" name="Right Arrow 81">
+            <a:extLst>
+              <a:ext uri="{FF2B5EF4-FFF2-40B4-BE49-F238E27FC236}">
+                <a16:creationId xmlns:a16="http://schemas.microsoft.com/office/drawing/2014/main" id="{FE10741C-8284-574D-B741-956224BA4E8B}"/>
+              </a:ext>
+            </a:extLst>
+          </p:cNvPr>
+          <p:cNvSpPr/>
+          <p:nvPr/>
+        </p:nvSpPr>
+        <p:spPr>
+          <a:xfrm rot="12641627">
+            <a:off x="2206658" y="5535512"/>
+            <a:ext cx="2117493" cy="186247"/>
+          </a:xfrm>
+          <a:prstGeom prst="rightArrow">
+            <a:avLst/>
+          </a:prstGeom>
+          <a:solidFill>
+            <a:schemeClr val="accent3"/>
+          </a:solidFill>
+          <a:ln w="12700">
+            <a:solidFill>
+              <a:schemeClr val="tx1"/>
+            </a:solidFill>
+          </a:ln>
+        </p:spPr>
+        <p:style>
+          <a:lnRef idx="2">
+            <a:schemeClr val="accent1">
+              <a:shade val="50000"/>
+            </a:schemeClr>
+          </a:lnRef>
+          <a:fillRef idx="1">
+            <a:schemeClr val="accent1"/>
+          </a:fillRef>
+          <a:effectRef idx="0">
+            <a:schemeClr val="accent1"/>
+          </a:effectRef>
+          <a:fontRef idx="minor">
+            <a:schemeClr val="lt1"/>
+          </a:fontRef>
+        </p:style>
+        <p:txBody>
+          <a:bodyPr rot="0" spcFirstLastPara="0" vertOverflow="overflow" horzOverflow="overflow" vert="horz" wrap="square" lIns="91440" tIns="45720" rIns="91440" bIns="45720" numCol="1" spcCol="0" rtlCol="0" fromWordArt="0" anchor="ctr" anchorCtr="0" forceAA="0" compatLnSpc="1">
+            <a:prstTxWarp prst="textNoShape">
+              <a:avLst/>
+            </a:prstTxWarp>
+            <a:noAutofit/>
+          </a:bodyPr>
+          <a:lstStyle/>
+          <a:p>
+            <a:pPr algn="ctr"/>
+            <a:endParaRPr lang="en-US" sz="1200"/>
+          </a:p>
+        </p:txBody>
+      </p:sp>
+      <p:sp>
+        <p:nvSpPr>
+          <p:cNvPr id="80" name="Right Arrow 79">
+            <a:extLst>
+              <a:ext uri="{FF2B5EF4-FFF2-40B4-BE49-F238E27FC236}">
+                <a16:creationId xmlns:a16="http://schemas.microsoft.com/office/drawing/2014/main" id="{12351E1E-A8FC-E141-83F9-258C831A63F3}"/>
+              </a:ext>
+            </a:extLst>
+          </p:cNvPr>
+          <p:cNvSpPr/>
+          <p:nvPr/>
+        </p:nvSpPr>
+        <p:spPr>
+          <a:xfrm rot="16200000">
+            <a:off x="4528918" y="6917746"/>
+            <a:ext cx="2878024" cy="212980"/>
+          </a:xfrm>
+          <a:prstGeom prst="rightArrow">
+            <a:avLst/>
+          </a:prstGeom>
+          <a:solidFill>
+            <a:schemeClr val="accent3"/>
+          </a:solidFill>
+          <a:ln w="12700">
+            <a:solidFill>
+              <a:schemeClr val="tx1"/>
+            </a:solidFill>
+          </a:ln>
+        </p:spPr>
+        <p:style>
+          <a:lnRef idx="2">
+            <a:schemeClr val="accent1">
+              <a:shade val="50000"/>
+            </a:schemeClr>
+          </a:lnRef>
+          <a:fillRef idx="1">
+            <a:schemeClr val="accent1"/>
+          </a:fillRef>
+          <a:effectRef idx="0">
+            <a:schemeClr val="accent1"/>
+          </a:effectRef>
+          <a:fontRef idx="minor">
+            <a:schemeClr val="lt1"/>
+          </a:fontRef>
+        </p:style>
+        <p:txBody>
+          <a:bodyPr rot="0" spcFirstLastPara="0" vertOverflow="overflow" horzOverflow="overflow" vert="horz" wrap="square" lIns="91440" tIns="45720" rIns="91440" bIns="45720" numCol="1" spcCol="0" rtlCol="0" fromWordArt="0" anchor="ctr" anchorCtr="0" forceAA="0" compatLnSpc="1">
+            <a:prstTxWarp prst="textNoShape">
+              <a:avLst/>
+            </a:prstTxWarp>
+            <a:noAutofit/>
+          </a:bodyPr>
+          <a:lstStyle/>
+          <a:p>
+            <a:pPr algn="ctr"/>
+            <a:endParaRPr lang="en-US" sz="1200"/>
+          </a:p>
+        </p:txBody>
+      </p:sp>
+      <p:sp>
+        <p:nvSpPr>
+          <p:cNvPr id="24" name="TextBox 23">
+            <a:extLst>
+              <a:ext uri="{FF2B5EF4-FFF2-40B4-BE49-F238E27FC236}">
+                <a16:creationId xmlns:a16="http://schemas.microsoft.com/office/drawing/2014/main" id="{C596AE59-4439-A646-9E86-C94852357121}"/>
+              </a:ext>
+            </a:extLst>
+          </p:cNvPr>
+          <p:cNvSpPr txBox="1"/>
+          <p:nvPr/>
+        </p:nvSpPr>
+        <p:spPr>
+          <a:xfrm>
+            <a:off x="2589594" y="6584568"/>
+            <a:ext cx="1039463" cy="461665"/>
+          </a:xfrm>
+          <a:prstGeom prst="rect">
+            <a:avLst/>
+          </a:prstGeom>
+          <a:solidFill>
+            <a:schemeClr val="bg1"/>
+          </a:solidFill>
+          <a:ln w="3175">
+            <a:solidFill>
+              <a:schemeClr val="tx1"/>
+            </a:solidFill>
+          </a:ln>
+        </p:spPr>
+        <p:txBody>
+          <a:bodyPr wrap="square" rtlCol="0">
+            <a:spAutoFit/>
+          </a:bodyPr>
+          <a:lstStyle/>
+          <a:p>
+            <a:pPr algn="ctr"/>
+            <a:r>
+              <a:rPr lang="en-US" sz="1200" i="1" dirty="0"/>
+              <a:t>Hake, PRS</a:t>
+            </a:r>
+          </a:p>
+          <a:p>
+            <a:pPr algn="ctr"/>
+            <a:r>
+              <a:rPr lang="en-US" sz="1200" b="1" dirty="0"/>
+              <a:t>Euphausiids</a:t>
+            </a:r>
+          </a:p>
+        </p:txBody>
+      </p:sp>
+      <p:sp>
+        <p:nvSpPr>
+          <p:cNvPr id="26" name="TextBox 25">
+            <a:extLst>
+              <a:ext uri="{FF2B5EF4-FFF2-40B4-BE49-F238E27FC236}">
+                <a16:creationId xmlns:a16="http://schemas.microsoft.com/office/drawing/2014/main" id="{DA765DA4-22C9-054C-9840-3938512C82C6}"/>
+              </a:ext>
+            </a:extLst>
+          </p:cNvPr>
+          <p:cNvSpPr txBox="1"/>
+          <p:nvPr/>
+        </p:nvSpPr>
+        <p:spPr>
+          <a:xfrm>
+            <a:off x="764905" y="5743656"/>
+            <a:ext cx="1155310" cy="646331"/>
+          </a:xfrm>
+          <a:prstGeom prst="rect">
+            <a:avLst/>
+          </a:prstGeom>
+          <a:solidFill>
+            <a:schemeClr val="bg1"/>
+          </a:solidFill>
+          <a:ln w="3175">
+            <a:solidFill>
+              <a:schemeClr val="tx1"/>
+            </a:solidFill>
+          </a:ln>
+        </p:spPr>
+        <p:txBody>
+          <a:bodyPr wrap="square" rtlCol="0">
+            <a:spAutoFit/>
+          </a:bodyPr>
+          <a:lstStyle/>
+          <a:p>
+            <a:pPr algn="ctr"/>
+            <a:r>
+              <a:rPr lang="en-US" sz="1200" i="1" dirty="0"/>
+              <a:t>JSOES, PRS</a:t>
+            </a:r>
+          </a:p>
+          <a:p>
+            <a:pPr algn="ctr"/>
+            <a:r>
+              <a:rPr lang="en-US" sz="1200" b="1" dirty="0"/>
+              <a:t>Gelatinous zooplankton</a:t>
+            </a:r>
+          </a:p>
+        </p:txBody>
+      </p:sp>
+      <p:sp>
+        <p:nvSpPr>
+          <p:cNvPr id="28" name="TextBox 27">
+            <a:extLst>
+              <a:ext uri="{FF2B5EF4-FFF2-40B4-BE49-F238E27FC236}">
+                <a16:creationId xmlns:a16="http://schemas.microsoft.com/office/drawing/2014/main" id="{188A1222-267D-514E-BDC8-1E2C165B807C}"/>
+              </a:ext>
+            </a:extLst>
+          </p:cNvPr>
+          <p:cNvSpPr txBox="1"/>
+          <p:nvPr/>
+        </p:nvSpPr>
+        <p:spPr>
+          <a:xfrm>
+            <a:off x="1286997" y="4188700"/>
+            <a:ext cx="1537136" cy="830997"/>
+          </a:xfrm>
+          <a:prstGeom prst="rect">
+            <a:avLst/>
+          </a:prstGeom>
+          <a:solidFill>
+            <a:schemeClr val="bg1"/>
+          </a:solidFill>
+          <a:ln w="3175">
+            <a:solidFill>
+              <a:schemeClr val="tx1"/>
+            </a:solidFill>
+          </a:ln>
+        </p:spPr>
+        <p:txBody>
+          <a:bodyPr wrap="square" rtlCol="0">
+            <a:spAutoFit/>
+          </a:bodyPr>
+          <a:lstStyle/>
+          <a:p>
+            <a:pPr algn="ctr"/>
+            <a:r>
+              <a:rPr lang="en-US" sz="1200" i="1" dirty="0"/>
+              <a:t>CCES, PRS/PWCC</a:t>
+            </a:r>
+          </a:p>
+          <a:p>
+            <a:pPr algn="ctr"/>
+            <a:r>
+              <a:rPr lang="en-US" sz="1200" b="1" dirty="0"/>
+              <a:t>Forage fishes (anchovy, sardine, herring, smelt, shad)</a:t>
+            </a:r>
+          </a:p>
+        </p:txBody>
+      </p:sp>
+      <p:sp>
+        <p:nvSpPr>
+          <p:cNvPr id="32" name="TextBox 31">
+            <a:extLst>
+              <a:ext uri="{FF2B5EF4-FFF2-40B4-BE49-F238E27FC236}">
+                <a16:creationId xmlns:a16="http://schemas.microsoft.com/office/drawing/2014/main" id="{1777F9CE-A489-984F-A723-3795520C155A}"/>
+              </a:ext>
+            </a:extLst>
+          </p:cNvPr>
+          <p:cNvSpPr txBox="1"/>
+          <p:nvPr/>
+        </p:nvSpPr>
+        <p:spPr>
+          <a:xfrm>
+            <a:off x="3394521" y="4086781"/>
+            <a:ext cx="1405110" cy="461665"/>
+          </a:xfrm>
+          <a:prstGeom prst="rect">
+            <a:avLst/>
+          </a:prstGeom>
+          <a:solidFill>
+            <a:schemeClr val="bg1"/>
+          </a:solidFill>
+          <a:ln w="38100">
+            <a:solidFill>
+              <a:schemeClr val="accent1"/>
+            </a:solidFill>
+          </a:ln>
+        </p:spPr>
+        <p:txBody>
+          <a:bodyPr wrap="square" rtlCol="0">
+            <a:spAutoFit/>
+          </a:bodyPr>
+          <a:lstStyle/>
+          <a:p>
+            <a:pPr algn="ctr"/>
+            <a:r>
+              <a:rPr lang="en-US" sz="1200" i="1" dirty="0"/>
+              <a:t>JSOES</a:t>
+            </a:r>
+          </a:p>
+          <a:p>
+            <a:pPr algn="ctr"/>
+            <a:r>
+              <a:rPr lang="en-US" sz="1200" b="1" dirty="0"/>
+              <a:t>Juvenile salmon</a:t>
+            </a:r>
+          </a:p>
+        </p:txBody>
+      </p:sp>
+      <p:sp>
+        <p:nvSpPr>
+          <p:cNvPr id="33" name="TextBox 32">
+            <a:extLst>
+              <a:ext uri="{FF2B5EF4-FFF2-40B4-BE49-F238E27FC236}">
+                <a16:creationId xmlns:a16="http://schemas.microsoft.com/office/drawing/2014/main" id="{DCC3BA31-A6DD-6240-8246-073FB28E107A}"/>
+              </a:ext>
+            </a:extLst>
+          </p:cNvPr>
+          <p:cNvSpPr txBox="1"/>
+          <p:nvPr/>
+        </p:nvSpPr>
+        <p:spPr>
+          <a:xfrm>
+            <a:off x="1829361" y="8495587"/>
+            <a:ext cx="4294121" cy="461665"/>
+          </a:xfrm>
+          <a:prstGeom prst="rect">
+            <a:avLst/>
+          </a:prstGeom>
+          <a:solidFill>
+            <a:schemeClr val="bg1"/>
+          </a:solidFill>
+          <a:ln w="3175">
+            <a:solidFill>
+              <a:schemeClr val="tx1"/>
+            </a:solidFill>
+          </a:ln>
+        </p:spPr>
+        <p:txBody>
+          <a:bodyPr wrap="square" rtlCol="0">
+            <a:spAutoFit/>
+          </a:bodyPr>
+          <a:lstStyle/>
+          <a:p>
+            <a:pPr algn="ctr"/>
+            <a:r>
+              <a:rPr lang="en-US" sz="1200" i="1" dirty="0"/>
+              <a:t>JSOES, PRS, Satellite</a:t>
+            </a:r>
+          </a:p>
+          <a:p>
+            <a:pPr algn="ctr"/>
+            <a:r>
+              <a:rPr lang="en-US" sz="1200" b="1" dirty="0"/>
+              <a:t>Phytoplankton</a:t>
+            </a:r>
+          </a:p>
+        </p:txBody>
+      </p:sp>
+      <p:sp>
+        <p:nvSpPr>
+          <p:cNvPr id="34" name="TextBox 33">
+            <a:extLst>
+              <a:ext uri="{FF2B5EF4-FFF2-40B4-BE49-F238E27FC236}">
+                <a16:creationId xmlns:a16="http://schemas.microsoft.com/office/drawing/2014/main" id="{B5BA6848-C665-DE4D-ACB0-0F5CF79C3E45}"/>
+              </a:ext>
+            </a:extLst>
+          </p:cNvPr>
+          <p:cNvSpPr txBox="1"/>
+          <p:nvPr/>
+        </p:nvSpPr>
+        <p:spPr>
+          <a:xfrm>
+            <a:off x="1298745" y="7494205"/>
+            <a:ext cx="1417539" cy="461665"/>
+          </a:xfrm>
+          <a:prstGeom prst="rect">
+            <a:avLst/>
+          </a:prstGeom>
+          <a:solidFill>
+            <a:schemeClr val="bg1"/>
+          </a:solidFill>
+          <a:ln w="3175">
+            <a:solidFill>
+              <a:schemeClr val="tx1"/>
+            </a:solidFill>
+          </a:ln>
+        </p:spPr>
+        <p:txBody>
+          <a:bodyPr wrap="square" rtlCol="0">
+            <a:spAutoFit/>
+          </a:bodyPr>
+          <a:lstStyle/>
+          <a:p>
+            <a:pPr algn="ctr"/>
+            <a:r>
+              <a:rPr lang="en-US" sz="1200" i="1" dirty="0"/>
+              <a:t>None</a:t>
+            </a:r>
+          </a:p>
+          <a:p>
+            <a:pPr algn="ctr"/>
+            <a:r>
+              <a:rPr lang="en-US" sz="1200" b="1" dirty="0"/>
+              <a:t>Microzooplankton</a:t>
+            </a:r>
+          </a:p>
+        </p:txBody>
+      </p:sp>
+      <p:sp>
+        <p:nvSpPr>
+          <p:cNvPr id="37" name="TextBox 36">
+            <a:extLst>
+              <a:ext uri="{FF2B5EF4-FFF2-40B4-BE49-F238E27FC236}">
+                <a16:creationId xmlns:a16="http://schemas.microsoft.com/office/drawing/2014/main" id="{99AACD76-CF12-0E4D-BDA9-9FD2149CE98B}"/>
+              </a:ext>
+            </a:extLst>
+          </p:cNvPr>
+          <p:cNvSpPr txBox="1"/>
+          <p:nvPr/>
+        </p:nvSpPr>
+        <p:spPr>
+          <a:xfrm>
+            <a:off x="5204644" y="4897484"/>
+            <a:ext cx="1405110" cy="646331"/>
+          </a:xfrm>
+          <a:prstGeom prst="rect">
+            <a:avLst/>
+          </a:prstGeom>
+          <a:solidFill>
+            <a:schemeClr val="bg1"/>
+          </a:solidFill>
+          <a:ln w="3175">
+            <a:solidFill>
+              <a:schemeClr val="tx1"/>
+            </a:solidFill>
+          </a:ln>
+        </p:spPr>
+        <p:txBody>
+          <a:bodyPr wrap="square" rtlCol="0">
+            <a:spAutoFit/>
+          </a:bodyPr>
+          <a:lstStyle/>
+          <a:p>
+            <a:pPr algn="ctr"/>
+            <a:r>
+              <a:rPr lang="en-US" sz="1200" i="1" dirty="0"/>
+              <a:t>PRS</a:t>
+            </a:r>
+          </a:p>
+          <a:p>
+            <a:pPr algn="ctr"/>
+            <a:r>
+              <a:rPr lang="en-US" sz="1200" b="1" dirty="0"/>
+              <a:t>Larval/juvenile rockfishes</a:t>
+            </a:r>
+          </a:p>
+        </p:txBody>
+      </p:sp>
+      <p:sp>
+        <p:nvSpPr>
+          <p:cNvPr id="39" name="Right Arrow 38">
+            <a:extLst>
+              <a:ext uri="{FF2B5EF4-FFF2-40B4-BE49-F238E27FC236}">
+                <a16:creationId xmlns:a16="http://schemas.microsoft.com/office/drawing/2014/main" id="{AF431993-D95B-0240-8810-DD035BB83ACA}"/>
+              </a:ext>
+            </a:extLst>
+          </p:cNvPr>
+          <p:cNvSpPr/>
+          <p:nvPr/>
+        </p:nvSpPr>
+        <p:spPr>
+          <a:xfrm rot="14028170">
+            <a:off x="3092754" y="3575860"/>
+            <a:ext cx="687232" cy="211866"/>
+          </a:xfrm>
+          <a:prstGeom prst="rightArrow">
+            <a:avLst/>
+          </a:prstGeom>
+          <a:solidFill>
+            <a:schemeClr val="accent3"/>
+          </a:solidFill>
+          <a:ln w="12700">
+            <a:solidFill>
+              <a:schemeClr val="tx1"/>
+            </a:solidFill>
+          </a:ln>
+        </p:spPr>
+        <p:style>
+          <a:lnRef idx="2">
+            <a:schemeClr val="accent1">
+              <a:shade val="50000"/>
+            </a:schemeClr>
+          </a:lnRef>
+          <a:fillRef idx="1">
+            <a:schemeClr val="accent1"/>
+          </a:fillRef>
+          <a:effectRef idx="0">
+            <a:schemeClr val="accent1"/>
+          </a:effectRef>
+          <a:fontRef idx="minor">
+            <a:schemeClr val="lt1"/>
+          </a:fontRef>
+        </p:style>
+        <p:txBody>
+          <a:bodyPr rot="0" spcFirstLastPara="0" vertOverflow="overflow" horzOverflow="overflow" vert="horz" wrap="square" lIns="91440" tIns="45720" rIns="91440" bIns="45720" numCol="1" spcCol="0" rtlCol="0" fromWordArt="0" anchor="ctr" anchorCtr="0" forceAA="0" compatLnSpc="1">
+            <a:prstTxWarp prst="textNoShape">
+              <a:avLst/>
+            </a:prstTxWarp>
+            <a:noAutofit/>
+          </a:bodyPr>
+          <a:lstStyle/>
+          <a:p>
+            <a:pPr algn="ctr"/>
+            <a:endParaRPr lang="en-US" sz="1200"/>
+          </a:p>
+        </p:txBody>
+      </p:sp>
+      <p:sp>
+        <p:nvSpPr>
+          <p:cNvPr id="44" name="TextBox 43">
+            <a:extLst>
+              <a:ext uri="{FF2B5EF4-FFF2-40B4-BE49-F238E27FC236}">
+                <a16:creationId xmlns:a16="http://schemas.microsoft.com/office/drawing/2014/main" id="{447FFE11-9B69-F242-A549-48E10DD57D47}"/>
+              </a:ext>
+            </a:extLst>
+          </p:cNvPr>
+          <p:cNvSpPr txBox="1"/>
+          <p:nvPr/>
+        </p:nvSpPr>
+        <p:spPr>
+          <a:xfrm>
+            <a:off x="3911566" y="6230386"/>
+            <a:ext cx="1503928" cy="830997"/>
+          </a:xfrm>
+          <a:prstGeom prst="rect">
+            <a:avLst/>
+          </a:prstGeom>
+          <a:solidFill>
+            <a:schemeClr val="bg1"/>
+          </a:solidFill>
+          <a:ln w="3175">
+            <a:solidFill>
+              <a:schemeClr val="tx1"/>
+            </a:solidFill>
+          </a:ln>
+        </p:spPr>
+        <p:txBody>
+          <a:bodyPr wrap="square" rtlCol="0">
+            <a:spAutoFit/>
+          </a:bodyPr>
+          <a:lstStyle/>
+          <a:p>
+            <a:pPr algn="ctr"/>
+            <a:r>
+              <a:rPr lang="en-US" sz="1200" i="1" dirty="0"/>
+              <a:t>JSOES, PRS</a:t>
+            </a:r>
+          </a:p>
+          <a:p>
+            <a:pPr algn="ctr"/>
+            <a:r>
+              <a:rPr lang="en-US" sz="1200" b="1" dirty="0"/>
+              <a:t>Large zooplankton (copepods, decapod larvae)</a:t>
+            </a:r>
+          </a:p>
+        </p:txBody>
+      </p:sp>
+      <p:sp>
+        <p:nvSpPr>
+          <p:cNvPr id="46" name="TextBox 45">
+            <a:extLst>
+              <a:ext uri="{FF2B5EF4-FFF2-40B4-BE49-F238E27FC236}">
+                <a16:creationId xmlns:a16="http://schemas.microsoft.com/office/drawing/2014/main" id="{5561BB60-F056-2343-9450-00BB1A1460CB}"/>
+              </a:ext>
+            </a:extLst>
+          </p:cNvPr>
+          <p:cNvSpPr txBox="1"/>
+          <p:nvPr/>
+        </p:nvSpPr>
+        <p:spPr>
+          <a:xfrm>
+            <a:off x="4329985" y="2791895"/>
+            <a:ext cx="1405110" cy="461665"/>
+          </a:xfrm>
+          <a:prstGeom prst="rect">
+            <a:avLst/>
+          </a:prstGeom>
+          <a:solidFill>
+            <a:schemeClr val="bg1"/>
+          </a:solidFill>
+          <a:ln w="3175">
+            <a:solidFill>
+              <a:schemeClr val="tx1"/>
+            </a:solidFill>
+          </a:ln>
+        </p:spPr>
+        <p:txBody>
+          <a:bodyPr wrap="square" rtlCol="0">
+            <a:spAutoFit/>
+          </a:bodyPr>
+          <a:lstStyle/>
+          <a:p>
+            <a:pPr algn="ctr"/>
+            <a:r>
+              <a:rPr lang="en-US" sz="1200" i="1" dirty="0"/>
+              <a:t>JSOES</a:t>
+            </a:r>
+          </a:p>
+          <a:p>
+            <a:pPr algn="ctr"/>
+            <a:r>
+              <a:rPr lang="en-US" sz="1200" b="1" dirty="0"/>
+              <a:t>Seabirds</a:t>
+            </a:r>
+          </a:p>
+        </p:txBody>
+      </p:sp>
+      <p:sp>
+        <p:nvSpPr>
+          <p:cNvPr id="51" name="TextBox 50">
+            <a:extLst>
+              <a:ext uri="{FF2B5EF4-FFF2-40B4-BE49-F238E27FC236}">
+                <a16:creationId xmlns:a16="http://schemas.microsoft.com/office/drawing/2014/main" id="{2E69B930-FE17-374E-B302-B72B0C80F165}"/>
+              </a:ext>
+            </a:extLst>
+          </p:cNvPr>
+          <p:cNvSpPr txBox="1"/>
+          <p:nvPr/>
+        </p:nvSpPr>
+        <p:spPr>
+          <a:xfrm>
+            <a:off x="2141313" y="2495263"/>
+            <a:ext cx="1624561" cy="830997"/>
+          </a:xfrm>
+          <a:prstGeom prst="rect">
+            <a:avLst/>
+          </a:prstGeom>
+          <a:solidFill>
+            <a:schemeClr val="bg1"/>
+          </a:solidFill>
+          <a:ln w="3175">
+            <a:solidFill>
+              <a:schemeClr val="tx1"/>
+            </a:solidFill>
+          </a:ln>
+        </p:spPr>
+        <p:txBody>
+          <a:bodyPr wrap="square" rtlCol="0">
+            <a:spAutoFit/>
+          </a:bodyPr>
+          <a:lstStyle/>
+          <a:p>
+            <a:pPr algn="ctr"/>
+            <a:r>
+              <a:rPr lang="en-US" sz="1200" i="1" dirty="0"/>
+              <a:t>Hake, CCES</a:t>
+            </a:r>
+          </a:p>
+          <a:p>
+            <a:pPr algn="ctr"/>
+            <a:r>
+              <a:rPr lang="en-US" sz="1200" b="1" dirty="0"/>
+              <a:t>Piscivorous fishes (hake, chub mackerel, jack mackerel)</a:t>
+            </a:r>
+          </a:p>
+        </p:txBody>
+      </p:sp>
+      <p:sp>
+        <p:nvSpPr>
+          <p:cNvPr id="62" name="Right Arrow 61">
+            <a:extLst>
+              <a:ext uri="{FF2B5EF4-FFF2-40B4-BE49-F238E27FC236}">
+                <a16:creationId xmlns:a16="http://schemas.microsoft.com/office/drawing/2014/main" id="{A538D0FB-F124-5449-9E25-ADBAB3F5ED68}"/>
+              </a:ext>
+            </a:extLst>
+          </p:cNvPr>
+          <p:cNvSpPr/>
+          <p:nvPr/>
+        </p:nvSpPr>
+        <p:spPr>
+          <a:xfrm rot="7571830" flipH="1">
+            <a:off x="4319914" y="3537761"/>
+            <a:ext cx="687232" cy="211866"/>
+          </a:xfrm>
+          <a:prstGeom prst="rightArrow">
+            <a:avLst/>
+          </a:prstGeom>
+          <a:solidFill>
+            <a:schemeClr val="accent3"/>
+          </a:solidFill>
+          <a:ln w="12700">
+            <a:solidFill>
+              <a:schemeClr val="tx1"/>
+            </a:solidFill>
+          </a:ln>
+        </p:spPr>
+        <p:style>
+          <a:lnRef idx="2">
+            <a:schemeClr val="accent1">
+              <a:shade val="50000"/>
+            </a:schemeClr>
+          </a:lnRef>
+          <a:fillRef idx="1">
+            <a:schemeClr val="accent1"/>
+          </a:fillRef>
+          <a:effectRef idx="0">
+            <a:schemeClr val="accent1"/>
+          </a:effectRef>
+          <a:fontRef idx="minor">
+            <a:schemeClr val="lt1"/>
+          </a:fontRef>
+        </p:style>
+        <p:txBody>
+          <a:bodyPr rot="0" spcFirstLastPara="0" vertOverflow="overflow" horzOverflow="overflow" vert="horz" wrap="square" lIns="91440" tIns="45720" rIns="91440" bIns="45720" numCol="1" spcCol="0" rtlCol="0" fromWordArt="0" anchor="ctr" anchorCtr="0" forceAA="0" compatLnSpc="1">
+            <a:prstTxWarp prst="textNoShape">
+              <a:avLst/>
+            </a:prstTxWarp>
+            <a:noAutofit/>
+          </a:bodyPr>
+          <a:lstStyle/>
+          <a:p>
+            <a:pPr algn="ctr"/>
+            <a:endParaRPr lang="en-US" sz="1200"/>
+          </a:p>
+        </p:txBody>
+      </p:sp>
+      <p:sp>
+        <p:nvSpPr>
+          <p:cNvPr id="63" name="Right Arrow 62">
+            <a:extLst>
+              <a:ext uri="{FF2B5EF4-FFF2-40B4-BE49-F238E27FC236}">
+                <a16:creationId xmlns:a16="http://schemas.microsoft.com/office/drawing/2014/main" id="{1CC00511-4D0C-4440-9AA0-FB061F226383}"/>
+              </a:ext>
+            </a:extLst>
+          </p:cNvPr>
+          <p:cNvSpPr/>
+          <p:nvPr/>
+        </p:nvSpPr>
+        <p:spPr>
+          <a:xfrm rot="16200000">
+            <a:off x="2188409" y="3615897"/>
+            <a:ext cx="640080" cy="211866"/>
+          </a:xfrm>
+          <a:prstGeom prst="rightArrow">
+            <a:avLst/>
+          </a:prstGeom>
+          <a:solidFill>
+            <a:schemeClr val="accent3"/>
+          </a:solidFill>
+          <a:ln w="12700">
+            <a:solidFill>
+              <a:schemeClr val="tx1"/>
+            </a:solidFill>
+          </a:ln>
+        </p:spPr>
+        <p:style>
+          <a:lnRef idx="2">
+            <a:schemeClr val="accent1">
+              <a:shade val="50000"/>
+            </a:schemeClr>
+          </a:lnRef>
+          <a:fillRef idx="1">
+            <a:schemeClr val="accent1"/>
+          </a:fillRef>
+          <a:effectRef idx="0">
+            <a:schemeClr val="accent1"/>
+          </a:effectRef>
+          <a:fontRef idx="minor">
+            <a:schemeClr val="lt1"/>
+          </a:fontRef>
+        </p:style>
+        <p:txBody>
+          <a:bodyPr rot="0" spcFirstLastPara="0" vertOverflow="overflow" horzOverflow="overflow" vert="horz" wrap="square" lIns="91440" tIns="45720" rIns="91440" bIns="45720" numCol="1" spcCol="0" rtlCol="0" fromWordArt="0" anchor="ctr" anchorCtr="0" forceAA="0" compatLnSpc="1">
+            <a:prstTxWarp prst="textNoShape">
+              <a:avLst/>
+            </a:prstTxWarp>
+            <a:noAutofit/>
+          </a:bodyPr>
+          <a:lstStyle/>
+          <a:p>
+            <a:pPr algn="ctr"/>
+            <a:endParaRPr lang="en-US" sz="1200"/>
+          </a:p>
+        </p:txBody>
+      </p:sp>
+      <p:sp>
+        <p:nvSpPr>
+          <p:cNvPr id="64" name="Right Arrow 63">
+            <a:extLst>
+              <a:ext uri="{FF2B5EF4-FFF2-40B4-BE49-F238E27FC236}">
+                <a16:creationId xmlns:a16="http://schemas.microsoft.com/office/drawing/2014/main" id="{1816D768-4892-8F45-922F-434A0984C099}"/>
+              </a:ext>
+            </a:extLst>
+          </p:cNvPr>
+          <p:cNvSpPr/>
+          <p:nvPr/>
+        </p:nvSpPr>
+        <p:spPr>
+          <a:xfrm rot="8909829" flipH="1">
+            <a:off x="2805056" y="3635719"/>
+            <a:ext cx="1600200" cy="211866"/>
+          </a:xfrm>
+          <a:prstGeom prst="rightArrow">
+            <a:avLst/>
+          </a:prstGeom>
+          <a:solidFill>
+            <a:schemeClr val="accent3"/>
+          </a:solidFill>
+          <a:ln w="12700">
+            <a:solidFill>
+              <a:schemeClr val="tx1"/>
+            </a:solidFill>
+          </a:ln>
+        </p:spPr>
+        <p:style>
+          <a:lnRef idx="2">
+            <a:schemeClr val="accent1">
+              <a:shade val="50000"/>
+            </a:schemeClr>
+          </a:lnRef>
+          <a:fillRef idx="1">
+            <a:schemeClr val="accent1"/>
+          </a:fillRef>
+          <a:effectRef idx="0">
+            <a:schemeClr val="accent1"/>
+          </a:effectRef>
+          <a:fontRef idx="minor">
+            <a:schemeClr val="lt1"/>
+          </a:fontRef>
+        </p:style>
+        <p:txBody>
+          <a:bodyPr rot="0" spcFirstLastPara="0" vertOverflow="overflow" horzOverflow="overflow" vert="horz" wrap="square" lIns="91440" tIns="45720" rIns="91440" bIns="45720" numCol="1" spcCol="0" rtlCol="0" fromWordArt="0" anchor="ctr" anchorCtr="0" forceAA="0" compatLnSpc="1">
+            <a:prstTxWarp prst="textNoShape">
+              <a:avLst/>
+            </a:prstTxWarp>
+            <a:noAutofit/>
+          </a:bodyPr>
+          <a:lstStyle/>
+          <a:p>
+            <a:pPr algn="ctr"/>
+            <a:endParaRPr lang="en-US" sz="1200"/>
+          </a:p>
+        </p:txBody>
+      </p:sp>
+      <p:sp>
+        <p:nvSpPr>
+          <p:cNvPr id="65" name="Right Arrow 64">
+            <a:extLst>
+              <a:ext uri="{FF2B5EF4-FFF2-40B4-BE49-F238E27FC236}">
+                <a16:creationId xmlns:a16="http://schemas.microsoft.com/office/drawing/2014/main" id="{4C9A1BCB-7D35-EC4F-B1CE-7EA9EE3160ED}"/>
+              </a:ext>
+            </a:extLst>
+          </p:cNvPr>
+          <p:cNvSpPr/>
+          <p:nvPr/>
+        </p:nvSpPr>
+        <p:spPr>
+          <a:xfrm rot="20447920">
+            <a:off x="2880727" y="4281299"/>
+            <a:ext cx="457200" cy="211866"/>
+          </a:xfrm>
+          <a:prstGeom prst="rightArrow">
+            <a:avLst/>
+          </a:prstGeom>
+          <a:solidFill>
+            <a:schemeClr val="accent3"/>
+          </a:solidFill>
+          <a:ln w="12700">
+            <a:solidFill>
+              <a:schemeClr val="tx1"/>
+            </a:solidFill>
+          </a:ln>
+        </p:spPr>
+        <p:style>
+          <a:lnRef idx="2">
+            <a:schemeClr val="accent1">
+              <a:shade val="50000"/>
+            </a:schemeClr>
+          </a:lnRef>
+          <a:fillRef idx="1">
+            <a:schemeClr val="accent1"/>
+          </a:fillRef>
+          <a:effectRef idx="0">
+            <a:schemeClr val="accent1"/>
+          </a:effectRef>
+          <a:fontRef idx="minor">
+            <a:schemeClr val="lt1"/>
+          </a:fontRef>
+        </p:style>
+        <p:txBody>
+          <a:bodyPr rot="0" spcFirstLastPara="0" vertOverflow="overflow" horzOverflow="overflow" vert="horz" wrap="square" lIns="91440" tIns="45720" rIns="91440" bIns="45720" numCol="1" spcCol="0" rtlCol="0" fromWordArt="0" anchor="ctr" anchorCtr="0" forceAA="0" compatLnSpc="1">
+            <a:prstTxWarp prst="textNoShape">
+              <a:avLst/>
+            </a:prstTxWarp>
+            <a:noAutofit/>
+          </a:bodyPr>
+          <a:lstStyle/>
+          <a:p>
+            <a:pPr algn="ctr"/>
+            <a:endParaRPr lang="en-US" sz="1200"/>
+          </a:p>
+        </p:txBody>
+      </p:sp>
+      <p:sp>
+        <p:nvSpPr>
+          <p:cNvPr id="69" name="Right Arrow 68">
+            <a:extLst>
+              <a:ext uri="{FF2B5EF4-FFF2-40B4-BE49-F238E27FC236}">
+                <a16:creationId xmlns:a16="http://schemas.microsoft.com/office/drawing/2014/main" id="{73AEE29B-5922-DA4A-984E-7D2B1801099B}"/>
+              </a:ext>
+            </a:extLst>
+          </p:cNvPr>
+          <p:cNvSpPr/>
+          <p:nvPr/>
+        </p:nvSpPr>
+        <p:spPr>
+          <a:xfrm>
+            <a:off x="1350782" y="8633186"/>
+            <a:ext cx="457200" cy="211866"/>
+          </a:xfrm>
+          <a:prstGeom prst="rightArrow">
+            <a:avLst/>
+          </a:prstGeom>
+          <a:solidFill>
+            <a:srgbClr val="C00000"/>
+          </a:solidFill>
+          <a:ln w="12700">
+            <a:solidFill>
+              <a:schemeClr val="tx1"/>
+            </a:solidFill>
+          </a:ln>
+        </p:spPr>
+        <p:style>
+          <a:lnRef idx="2">
+            <a:schemeClr val="accent1">
+              <a:shade val="50000"/>
+            </a:schemeClr>
+          </a:lnRef>
+          <a:fillRef idx="1">
+            <a:schemeClr val="accent1"/>
+          </a:fillRef>
+          <a:effectRef idx="0">
+            <a:schemeClr val="accent1"/>
+          </a:effectRef>
+          <a:fontRef idx="minor">
+            <a:schemeClr val="lt1"/>
+          </a:fontRef>
+        </p:style>
+        <p:txBody>
+          <a:bodyPr rot="0" spcFirstLastPara="0" vertOverflow="overflow" horzOverflow="overflow" vert="horz" wrap="square" lIns="91440" tIns="45720" rIns="91440" bIns="45720" numCol="1" spcCol="0" rtlCol="0" fromWordArt="0" anchor="ctr" anchorCtr="0" forceAA="0" compatLnSpc="1">
+            <a:prstTxWarp prst="textNoShape">
+              <a:avLst/>
+            </a:prstTxWarp>
+            <a:noAutofit/>
+          </a:bodyPr>
+          <a:lstStyle/>
+          <a:p>
+            <a:pPr algn="ctr"/>
+            <a:endParaRPr lang="en-US" sz="1200"/>
+          </a:p>
+        </p:txBody>
+      </p:sp>
+      <p:sp>
+        <p:nvSpPr>
+          <p:cNvPr id="70" name="TextBox 69">
+            <a:extLst>
+              <a:ext uri="{FF2B5EF4-FFF2-40B4-BE49-F238E27FC236}">
+                <a16:creationId xmlns:a16="http://schemas.microsoft.com/office/drawing/2014/main" id="{0298C352-FE8D-F648-9F6F-F2740DE81DB1}"/>
+              </a:ext>
+            </a:extLst>
+          </p:cNvPr>
+          <p:cNvSpPr txBox="1"/>
+          <p:nvPr/>
+        </p:nvSpPr>
+        <p:spPr>
+          <a:xfrm>
+            <a:off x="144386" y="8419165"/>
+            <a:ext cx="1155309" cy="646331"/>
+          </a:xfrm>
+          <a:prstGeom prst="rect">
+            <a:avLst/>
+          </a:prstGeom>
+          <a:solidFill>
+            <a:schemeClr val="bg1"/>
+          </a:solidFill>
+          <a:ln w="3175">
+            <a:solidFill>
+              <a:schemeClr val="tx1"/>
+            </a:solidFill>
+          </a:ln>
+        </p:spPr>
+        <p:txBody>
+          <a:bodyPr wrap="square" rtlCol="0">
+            <a:spAutoFit/>
+          </a:bodyPr>
+          <a:lstStyle/>
+          <a:p>
+            <a:pPr algn="ctr"/>
+            <a:r>
+              <a:rPr lang="en-US" sz="1200" i="1" dirty="0"/>
+              <a:t>Model-derived Indices</a:t>
+            </a:r>
+          </a:p>
+          <a:p>
+            <a:pPr algn="ctr"/>
+            <a:r>
+              <a:rPr lang="en-US" sz="1200" b="1" dirty="0"/>
+              <a:t>Upwelling</a:t>
+            </a:r>
+          </a:p>
+        </p:txBody>
+      </p:sp>
+      <p:sp>
+        <p:nvSpPr>
+          <p:cNvPr id="72" name="Right Arrow 71">
+            <a:extLst>
+              <a:ext uri="{FF2B5EF4-FFF2-40B4-BE49-F238E27FC236}">
+                <a16:creationId xmlns:a16="http://schemas.microsoft.com/office/drawing/2014/main" id="{0A254E0C-8275-1140-96E6-E13D78508311}"/>
+              </a:ext>
+            </a:extLst>
+          </p:cNvPr>
+          <p:cNvSpPr/>
+          <p:nvPr/>
+        </p:nvSpPr>
+        <p:spPr>
+          <a:xfrm rot="16200000">
+            <a:off x="887576" y="6823491"/>
+            <a:ext cx="997469" cy="203349"/>
+          </a:xfrm>
+          <a:prstGeom prst="rightArrow">
+            <a:avLst/>
+          </a:prstGeom>
+          <a:solidFill>
+            <a:schemeClr val="accent3"/>
+          </a:solidFill>
+          <a:ln w="12700">
+            <a:solidFill>
+              <a:schemeClr val="tx1"/>
+            </a:solidFill>
+          </a:ln>
+        </p:spPr>
+        <p:style>
+          <a:lnRef idx="2">
+            <a:schemeClr val="accent1">
+              <a:shade val="50000"/>
+            </a:schemeClr>
+          </a:lnRef>
+          <a:fillRef idx="1">
+            <a:schemeClr val="accent1"/>
+          </a:fillRef>
+          <a:effectRef idx="0">
+            <a:schemeClr val="accent1"/>
+          </a:effectRef>
+          <a:fontRef idx="minor">
+            <a:schemeClr val="lt1"/>
+          </a:fontRef>
+        </p:style>
+        <p:txBody>
+          <a:bodyPr rot="0" spcFirstLastPara="0" vertOverflow="overflow" horzOverflow="overflow" vert="horz" wrap="square" lIns="91440" tIns="45720" rIns="91440" bIns="45720" numCol="1" spcCol="0" rtlCol="0" fromWordArt="0" anchor="ctr" anchorCtr="0" forceAA="0" compatLnSpc="1">
+            <a:prstTxWarp prst="textNoShape">
+              <a:avLst/>
+            </a:prstTxWarp>
+            <a:noAutofit/>
+          </a:bodyPr>
+          <a:lstStyle/>
+          <a:p>
+            <a:pPr algn="ctr"/>
+            <a:endParaRPr lang="en-US" sz="1200"/>
+          </a:p>
+        </p:txBody>
+      </p:sp>
+      <p:sp>
+        <p:nvSpPr>
+          <p:cNvPr id="74" name="Right Arrow 73">
+            <a:extLst>
+              <a:ext uri="{FF2B5EF4-FFF2-40B4-BE49-F238E27FC236}">
+                <a16:creationId xmlns:a16="http://schemas.microsoft.com/office/drawing/2014/main" id="{4ECEE4D9-F3B6-944A-AE71-65469B6ADF20}"/>
+              </a:ext>
+            </a:extLst>
+          </p:cNvPr>
+          <p:cNvSpPr/>
+          <p:nvPr/>
+        </p:nvSpPr>
+        <p:spPr>
+          <a:xfrm rot="14838732">
+            <a:off x="1690746" y="5700928"/>
+            <a:ext cx="1534388" cy="205249"/>
+          </a:xfrm>
+          <a:prstGeom prst="rightArrow">
+            <a:avLst/>
+          </a:prstGeom>
+          <a:solidFill>
+            <a:schemeClr val="accent3"/>
+          </a:solidFill>
+          <a:ln w="12700">
+            <a:solidFill>
+              <a:schemeClr val="tx1"/>
+            </a:solidFill>
+          </a:ln>
+        </p:spPr>
+        <p:style>
+          <a:lnRef idx="2">
+            <a:schemeClr val="accent1">
+              <a:shade val="50000"/>
+            </a:schemeClr>
+          </a:lnRef>
+          <a:fillRef idx="1">
+            <a:schemeClr val="accent1"/>
+          </a:fillRef>
+          <a:effectRef idx="0">
+            <a:schemeClr val="accent1"/>
+          </a:effectRef>
+          <a:fontRef idx="minor">
+            <a:schemeClr val="lt1"/>
+          </a:fontRef>
+        </p:style>
+        <p:txBody>
+          <a:bodyPr rot="0" spcFirstLastPara="0" vertOverflow="overflow" horzOverflow="overflow" vert="horz" wrap="square" lIns="91440" tIns="45720" rIns="91440" bIns="45720" numCol="1" spcCol="0" rtlCol="0" fromWordArt="0" anchor="ctr" anchorCtr="0" forceAA="0" compatLnSpc="1">
+            <a:prstTxWarp prst="textNoShape">
+              <a:avLst/>
+            </a:prstTxWarp>
+            <a:noAutofit/>
+          </a:bodyPr>
+          <a:lstStyle/>
+          <a:p>
+            <a:pPr algn="ctr"/>
+            <a:endParaRPr lang="en-US" sz="1200"/>
+          </a:p>
+        </p:txBody>
+      </p:sp>
+      <p:sp>
+        <p:nvSpPr>
+          <p:cNvPr id="77" name="Right Arrow 76">
+            <a:extLst>
+              <a:ext uri="{FF2B5EF4-FFF2-40B4-BE49-F238E27FC236}">
+                <a16:creationId xmlns:a16="http://schemas.microsoft.com/office/drawing/2014/main" id="{A27D4CF8-DA3F-BD4E-89F7-80CC6DB043F2}"/>
+              </a:ext>
+            </a:extLst>
+          </p:cNvPr>
+          <p:cNvSpPr/>
+          <p:nvPr/>
+        </p:nvSpPr>
+        <p:spPr>
+          <a:xfrm rot="16200000">
+            <a:off x="1727409" y="8114118"/>
+            <a:ext cx="462248" cy="211864"/>
+          </a:xfrm>
+          <a:prstGeom prst="rightArrow">
+            <a:avLst/>
+          </a:prstGeom>
+          <a:solidFill>
+            <a:schemeClr val="accent3"/>
+          </a:solidFill>
+          <a:ln w="12700">
+            <a:solidFill>
+              <a:schemeClr val="tx1"/>
+            </a:solidFill>
+          </a:ln>
+        </p:spPr>
+        <p:style>
+          <a:lnRef idx="2">
+            <a:schemeClr val="accent1">
+              <a:shade val="50000"/>
+            </a:schemeClr>
+          </a:lnRef>
+          <a:fillRef idx="1">
+            <a:schemeClr val="accent1"/>
+          </a:fillRef>
+          <a:effectRef idx="0">
+            <a:schemeClr val="accent1"/>
+          </a:effectRef>
+          <a:fontRef idx="minor">
+            <a:schemeClr val="lt1"/>
+          </a:fontRef>
+        </p:style>
+        <p:txBody>
+          <a:bodyPr rot="0" spcFirstLastPara="0" vertOverflow="overflow" horzOverflow="overflow" vert="horz" wrap="square" lIns="91440" tIns="45720" rIns="91440" bIns="45720" numCol="1" spcCol="0" rtlCol="0" fromWordArt="0" anchor="ctr" anchorCtr="0" forceAA="0" compatLnSpc="1">
+            <a:prstTxWarp prst="textNoShape">
+              <a:avLst/>
+            </a:prstTxWarp>
+            <a:noAutofit/>
+          </a:bodyPr>
+          <a:lstStyle/>
+          <a:p>
+            <a:pPr algn="ctr"/>
+            <a:endParaRPr lang="en-US" sz="1200"/>
+          </a:p>
+        </p:txBody>
+      </p:sp>
+      <p:sp>
+        <p:nvSpPr>
+          <p:cNvPr id="78" name="Right Arrow 77">
+            <a:extLst>
+              <a:ext uri="{FF2B5EF4-FFF2-40B4-BE49-F238E27FC236}">
+                <a16:creationId xmlns:a16="http://schemas.microsoft.com/office/drawing/2014/main" id="{F91D16E0-BD53-2244-BA91-571D327688AB}"/>
+              </a:ext>
+            </a:extLst>
+          </p:cNvPr>
+          <p:cNvSpPr/>
+          <p:nvPr/>
+        </p:nvSpPr>
+        <p:spPr>
+          <a:xfrm rot="12879335">
+            <a:off x="4861027" y="4536519"/>
+            <a:ext cx="687232" cy="211866"/>
+          </a:xfrm>
+          <a:prstGeom prst="rightArrow">
+            <a:avLst/>
+          </a:prstGeom>
+          <a:solidFill>
+            <a:schemeClr val="accent3"/>
+          </a:solidFill>
+          <a:ln w="12700">
+            <a:solidFill>
+              <a:schemeClr val="tx1"/>
+            </a:solidFill>
+          </a:ln>
+        </p:spPr>
+        <p:style>
+          <a:lnRef idx="2">
+            <a:schemeClr val="accent1">
+              <a:shade val="50000"/>
+            </a:schemeClr>
+          </a:lnRef>
+          <a:fillRef idx="1">
+            <a:schemeClr val="accent1"/>
+          </a:fillRef>
+          <a:effectRef idx="0">
+            <a:schemeClr val="accent1"/>
+          </a:effectRef>
+          <a:fontRef idx="minor">
+            <a:schemeClr val="lt1"/>
+          </a:fontRef>
+        </p:style>
+        <p:txBody>
+          <a:bodyPr rot="0" spcFirstLastPara="0" vertOverflow="overflow" horzOverflow="overflow" vert="horz" wrap="square" lIns="91440" tIns="45720" rIns="91440" bIns="45720" numCol="1" spcCol="0" rtlCol="0" fromWordArt="0" anchor="ctr" anchorCtr="0" forceAA="0" compatLnSpc="1">
+            <a:prstTxWarp prst="textNoShape">
+              <a:avLst/>
+            </a:prstTxWarp>
+            <a:noAutofit/>
+          </a:bodyPr>
+          <a:lstStyle/>
+          <a:p>
+            <a:pPr algn="ctr"/>
+            <a:endParaRPr lang="en-US" sz="1200"/>
+          </a:p>
+        </p:txBody>
+      </p:sp>
+      <p:sp>
+        <p:nvSpPr>
+          <p:cNvPr id="84" name="Right Arrow 83">
+            <a:extLst>
+              <a:ext uri="{FF2B5EF4-FFF2-40B4-BE49-F238E27FC236}">
+                <a16:creationId xmlns:a16="http://schemas.microsoft.com/office/drawing/2014/main" id="{05899772-67B5-164A-8F7E-43B83D7FF8DE}"/>
+              </a:ext>
+            </a:extLst>
+          </p:cNvPr>
+          <p:cNvSpPr/>
+          <p:nvPr/>
+        </p:nvSpPr>
+        <p:spPr>
+          <a:xfrm rot="18884777">
+            <a:off x="1993807" y="7065219"/>
+            <a:ext cx="640080" cy="211866"/>
+          </a:xfrm>
+          <a:prstGeom prst="rightArrow">
+            <a:avLst/>
+          </a:prstGeom>
+          <a:solidFill>
+            <a:schemeClr val="accent3"/>
+          </a:solidFill>
+          <a:ln w="12700">
+            <a:solidFill>
+              <a:schemeClr val="tx1"/>
+            </a:solidFill>
+          </a:ln>
+        </p:spPr>
+        <p:style>
+          <a:lnRef idx="2">
+            <a:schemeClr val="accent1">
+              <a:shade val="50000"/>
+            </a:schemeClr>
+          </a:lnRef>
+          <a:fillRef idx="1">
+            <a:schemeClr val="accent1"/>
+          </a:fillRef>
+          <a:effectRef idx="0">
+            <a:schemeClr val="accent1"/>
+          </a:effectRef>
+          <a:fontRef idx="minor">
+            <a:schemeClr val="lt1"/>
+          </a:fontRef>
+        </p:style>
+        <p:txBody>
+          <a:bodyPr rot="0" spcFirstLastPara="0" vertOverflow="overflow" horzOverflow="overflow" vert="horz" wrap="square" lIns="91440" tIns="45720" rIns="91440" bIns="45720" numCol="1" spcCol="0" rtlCol="0" fromWordArt="0" anchor="ctr" anchorCtr="0" forceAA="0" compatLnSpc="1">
+            <a:prstTxWarp prst="textNoShape">
+              <a:avLst/>
+            </a:prstTxWarp>
+            <a:noAutofit/>
+          </a:bodyPr>
+          <a:lstStyle/>
+          <a:p>
+            <a:pPr algn="ctr"/>
+            <a:endParaRPr lang="en-US" sz="1200"/>
+          </a:p>
+        </p:txBody>
+      </p:sp>
+      <p:sp>
+        <p:nvSpPr>
+          <p:cNvPr id="54" name="TextBox 53">
+            <a:extLst>
+              <a:ext uri="{FF2B5EF4-FFF2-40B4-BE49-F238E27FC236}">
+                <a16:creationId xmlns:a16="http://schemas.microsoft.com/office/drawing/2014/main" id="{32BD79E0-F1F1-FC41-BBFE-073FC2C339BC}"/>
+              </a:ext>
+            </a:extLst>
+          </p:cNvPr>
+          <p:cNvSpPr txBox="1"/>
+          <p:nvPr/>
+        </p:nvSpPr>
+        <p:spPr>
+          <a:xfrm>
+            <a:off x="3568299" y="186748"/>
+            <a:ext cx="1890433" cy="400110"/>
+          </a:xfrm>
+          <a:prstGeom prst="rect">
+            <a:avLst/>
+          </a:prstGeom>
+          <a:noFill/>
+          <a:ln w="3175">
+            <a:noFill/>
+          </a:ln>
+        </p:spPr>
+        <p:txBody>
+          <a:bodyPr wrap="square" rtlCol="0">
+            <a:spAutoFit/>
+          </a:bodyPr>
+          <a:lstStyle/>
+          <a:p>
+            <a:r>
+              <a:rPr lang="en-US" sz="2000" dirty="0"/>
+              <a:t>The Food Web</a:t>
+            </a:r>
+          </a:p>
+        </p:txBody>
+      </p:sp>
+      <p:sp>
+        <p:nvSpPr>
+          <p:cNvPr id="43" name="Right Arrow 42">
+            <a:extLst>
+              <a:ext uri="{FF2B5EF4-FFF2-40B4-BE49-F238E27FC236}">
+                <a16:creationId xmlns:a16="http://schemas.microsoft.com/office/drawing/2014/main" id="{DC35D6DA-69A9-6B4F-B76D-87507CCC9F13}"/>
+              </a:ext>
+            </a:extLst>
+          </p:cNvPr>
+          <p:cNvSpPr/>
+          <p:nvPr/>
+        </p:nvSpPr>
+        <p:spPr>
+          <a:xfrm rot="16200000">
+            <a:off x="2431812" y="7659474"/>
+            <a:ext cx="1355028" cy="211866"/>
+          </a:xfrm>
+          <a:prstGeom prst="rightArrow">
+            <a:avLst/>
+          </a:prstGeom>
+          <a:solidFill>
+            <a:schemeClr val="accent3"/>
+          </a:solidFill>
+          <a:ln w="12700">
+            <a:solidFill>
+              <a:schemeClr val="tx1"/>
+            </a:solidFill>
+          </a:ln>
+        </p:spPr>
+        <p:style>
+          <a:lnRef idx="2">
+            <a:schemeClr val="accent1">
+              <a:shade val="50000"/>
+            </a:schemeClr>
+          </a:lnRef>
+          <a:fillRef idx="1">
+            <a:schemeClr val="accent1"/>
+          </a:fillRef>
+          <a:effectRef idx="0">
+            <a:schemeClr val="accent1"/>
+          </a:effectRef>
+          <a:fontRef idx="minor">
+            <a:schemeClr val="lt1"/>
+          </a:fontRef>
+        </p:style>
+        <p:txBody>
+          <a:bodyPr rot="0" spcFirstLastPara="0" vertOverflow="overflow" horzOverflow="overflow" vert="horz" wrap="square" lIns="91440" tIns="45720" rIns="91440" bIns="45720" numCol="1" spcCol="0" rtlCol="0" fromWordArt="0" anchor="ctr" anchorCtr="0" forceAA="0" compatLnSpc="1">
+            <a:prstTxWarp prst="textNoShape">
+              <a:avLst/>
+            </a:prstTxWarp>
+            <a:noAutofit/>
+          </a:bodyPr>
+          <a:lstStyle/>
+          <a:p>
+            <a:pPr algn="ctr"/>
+            <a:endParaRPr lang="en-US" sz="1200"/>
+          </a:p>
+        </p:txBody>
+      </p:sp>
+      <p:sp>
+        <p:nvSpPr>
+          <p:cNvPr id="47" name="Right Arrow 46">
+            <a:extLst>
+              <a:ext uri="{FF2B5EF4-FFF2-40B4-BE49-F238E27FC236}">
+                <a16:creationId xmlns:a16="http://schemas.microsoft.com/office/drawing/2014/main" id="{86794E7B-D453-0C4B-BD3E-64E560B9EBAD}"/>
+              </a:ext>
+            </a:extLst>
+          </p:cNvPr>
+          <p:cNvSpPr/>
+          <p:nvPr/>
+        </p:nvSpPr>
+        <p:spPr>
+          <a:xfrm rot="16200000">
+            <a:off x="3986016" y="7681412"/>
+            <a:ext cx="1355028" cy="211866"/>
+          </a:xfrm>
+          <a:prstGeom prst="rightArrow">
+            <a:avLst/>
+          </a:prstGeom>
+          <a:solidFill>
+            <a:schemeClr val="accent3"/>
+          </a:solidFill>
+          <a:ln w="12700">
+            <a:solidFill>
+              <a:schemeClr val="tx1"/>
+            </a:solidFill>
+          </a:ln>
+        </p:spPr>
+        <p:style>
+          <a:lnRef idx="2">
+            <a:schemeClr val="accent1">
+              <a:shade val="50000"/>
+            </a:schemeClr>
+          </a:lnRef>
+          <a:fillRef idx="1">
+            <a:schemeClr val="accent1"/>
+          </a:fillRef>
+          <a:effectRef idx="0">
+            <a:schemeClr val="accent1"/>
+          </a:effectRef>
+          <a:fontRef idx="minor">
+            <a:schemeClr val="lt1"/>
+          </a:fontRef>
+        </p:style>
+        <p:txBody>
+          <a:bodyPr rot="0" spcFirstLastPara="0" vertOverflow="overflow" horzOverflow="overflow" vert="horz" wrap="square" lIns="91440" tIns="45720" rIns="91440" bIns="45720" numCol="1" spcCol="0" rtlCol="0" fromWordArt="0" anchor="ctr" anchorCtr="0" forceAA="0" compatLnSpc="1">
+            <a:prstTxWarp prst="textNoShape">
+              <a:avLst/>
+            </a:prstTxWarp>
+            <a:noAutofit/>
+          </a:bodyPr>
+          <a:lstStyle/>
+          <a:p>
+            <a:pPr algn="ctr"/>
+            <a:endParaRPr lang="en-US" sz="1200"/>
+          </a:p>
+        </p:txBody>
+      </p:sp>
+      <p:sp>
+        <p:nvSpPr>
+          <p:cNvPr id="49" name="Right Arrow 48">
+            <a:extLst>
+              <a:ext uri="{FF2B5EF4-FFF2-40B4-BE49-F238E27FC236}">
+                <a16:creationId xmlns:a16="http://schemas.microsoft.com/office/drawing/2014/main" id="{E8E9C4CB-0B75-8B46-82AB-2725E18AEEE0}"/>
+              </a:ext>
+            </a:extLst>
+          </p:cNvPr>
+          <p:cNvSpPr/>
+          <p:nvPr/>
+        </p:nvSpPr>
+        <p:spPr>
+          <a:xfrm rot="18145210">
+            <a:off x="5013034" y="5781167"/>
+            <a:ext cx="640080" cy="211866"/>
+          </a:xfrm>
+          <a:prstGeom prst="rightArrow">
+            <a:avLst/>
+          </a:prstGeom>
+          <a:solidFill>
+            <a:schemeClr val="accent3"/>
+          </a:solidFill>
+          <a:ln w="12700">
+            <a:solidFill>
+              <a:schemeClr val="tx1"/>
+            </a:solidFill>
+          </a:ln>
+        </p:spPr>
+        <p:style>
+          <a:lnRef idx="2">
+            <a:schemeClr val="accent1">
+              <a:shade val="50000"/>
+            </a:schemeClr>
+          </a:lnRef>
+          <a:fillRef idx="1">
+            <a:schemeClr val="accent1"/>
+          </a:fillRef>
+          <a:effectRef idx="0">
+            <a:schemeClr val="accent1"/>
+          </a:effectRef>
+          <a:fontRef idx="minor">
+            <a:schemeClr val="lt1"/>
+          </a:fontRef>
+        </p:style>
+        <p:txBody>
+          <a:bodyPr rot="0" spcFirstLastPara="0" vertOverflow="overflow" horzOverflow="overflow" vert="horz" wrap="square" lIns="91440" tIns="45720" rIns="91440" bIns="45720" numCol="1" spcCol="0" rtlCol="0" fromWordArt="0" anchor="ctr" anchorCtr="0" forceAA="0" compatLnSpc="1">
+            <a:prstTxWarp prst="textNoShape">
+              <a:avLst/>
+            </a:prstTxWarp>
+            <a:noAutofit/>
+          </a:bodyPr>
+          <a:lstStyle/>
+          <a:p>
+            <a:pPr algn="ctr"/>
+            <a:endParaRPr lang="en-US" sz="1200"/>
+          </a:p>
+        </p:txBody>
+      </p:sp>
+      <p:sp>
+        <p:nvSpPr>
+          <p:cNvPr id="50" name="Right Arrow 49">
+            <a:extLst>
+              <a:ext uri="{FF2B5EF4-FFF2-40B4-BE49-F238E27FC236}">
+                <a16:creationId xmlns:a16="http://schemas.microsoft.com/office/drawing/2014/main" id="{24C6E985-1CF2-E345-9CC1-5E5EB463F7BE}"/>
+              </a:ext>
+            </a:extLst>
+          </p:cNvPr>
+          <p:cNvSpPr/>
+          <p:nvPr/>
+        </p:nvSpPr>
+        <p:spPr>
+          <a:xfrm rot="9068587" flipH="1">
+            <a:off x="3016261" y="5843186"/>
+            <a:ext cx="2288945" cy="172182"/>
+          </a:xfrm>
+          <a:prstGeom prst="rightArrow">
+            <a:avLst/>
+          </a:prstGeom>
+          <a:solidFill>
+            <a:schemeClr val="accent3"/>
+          </a:solidFill>
+          <a:ln w="12700">
+            <a:solidFill>
+              <a:schemeClr val="tx1"/>
+            </a:solidFill>
+          </a:ln>
+        </p:spPr>
+        <p:style>
+          <a:lnRef idx="2">
+            <a:schemeClr val="accent1">
+              <a:shade val="50000"/>
+            </a:schemeClr>
+          </a:lnRef>
+          <a:fillRef idx="1">
+            <a:schemeClr val="accent1"/>
+          </a:fillRef>
+          <a:effectRef idx="0">
+            <a:schemeClr val="accent1"/>
+          </a:effectRef>
+          <a:fontRef idx="minor">
+            <a:schemeClr val="lt1"/>
+          </a:fontRef>
+        </p:style>
+        <p:txBody>
+          <a:bodyPr rot="0" spcFirstLastPara="0" vertOverflow="overflow" horzOverflow="overflow" vert="horz" wrap="square" lIns="91440" tIns="45720" rIns="91440" bIns="45720" numCol="1" spcCol="0" rtlCol="0" fromWordArt="0" anchor="ctr" anchorCtr="0" forceAA="0" compatLnSpc="1">
+            <a:prstTxWarp prst="textNoShape">
+              <a:avLst/>
+            </a:prstTxWarp>
+            <a:noAutofit/>
+          </a:bodyPr>
+          <a:lstStyle/>
+          <a:p>
+            <a:pPr algn="ctr"/>
+            <a:endParaRPr lang="en-US" sz="1200"/>
+          </a:p>
+        </p:txBody>
+      </p:sp>
+      <p:sp>
+        <p:nvSpPr>
+          <p:cNvPr id="52" name="Right Arrow 51">
+            <a:extLst>
+              <a:ext uri="{FF2B5EF4-FFF2-40B4-BE49-F238E27FC236}">
+                <a16:creationId xmlns:a16="http://schemas.microsoft.com/office/drawing/2014/main" id="{08AFE05C-09E6-E740-B401-D5666D4183B1}"/>
+              </a:ext>
+            </a:extLst>
+          </p:cNvPr>
+          <p:cNvSpPr/>
+          <p:nvPr/>
+        </p:nvSpPr>
+        <p:spPr>
+          <a:xfrm rot="16200000">
+            <a:off x="3525499" y="5284412"/>
+            <a:ext cx="1593720" cy="227119"/>
+          </a:xfrm>
+          <a:prstGeom prst="rightArrow">
+            <a:avLst/>
+          </a:prstGeom>
+          <a:solidFill>
+            <a:schemeClr val="accent3"/>
+          </a:solidFill>
+          <a:ln w="12700">
+            <a:solidFill>
+              <a:schemeClr val="tx1"/>
+            </a:solidFill>
+          </a:ln>
+        </p:spPr>
+        <p:style>
+          <a:lnRef idx="2">
+            <a:schemeClr val="accent1">
+              <a:shade val="50000"/>
+            </a:schemeClr>
+          </a:lnRef>
+          <a:fillRef idx="1">
+            <a:schemeClr val="accent1"/>
+          </a:fillRef>
+          <a:effectRef idx="0">
+            <a:schemeClr val="accent1"/>
+          </a:effectRef>
+          <a:fontRef idx="minor">
+            <a:schemeClr val="lt1"/>
+          </a:fontRef>
+        </p:style>
+        <p:txBody>
+          <a:bodyPr rot="0" spcFirstLastPara="0" vertOverflow="overflow" horzOverflow="overflow" vert="horz" wrap="square" lIns="91440" tIns="45720" rIns="91440" bIns="45720" numCol="1" spcCol="0" rtlCol="0" fromWordArt="0" anchor="ctr" anchorCtr="0" forceAA="0" compatLnSpc="1">
+            <a:prstTxWarp prst="textNoShape">
+              <a:avLst/>
+            </a:prstTxWarp>
+            <a:noAutofit/>
+          </a:bodyPr>
+          <a:lstStyle/>
+          <a:p>
+            <a:pPr algn="ctr"/>
+            <a:endParaRPr lang="en-US" sz="1200"/>
+          </a:p>
+        </p:txBody>
+      </p:sp>
+      <p:sp>
+        <p:nvSpPr>
+          <p:cNvPr id="53" name="Right Arrow 52">
+            <a:extLst>
+              <a:ext uri="{FF2B5EF4-FFF2-40B4-BE49-F238E27FC236}">
+                <a16:creationId xmlns:a16="http://schemas.microsoft.com/office/drawing/2014/main" id="{BA0C31D1-2C09-DE49-8F9D-E51AA1600CE9}"/>
+              </a:ext>
+            </a:extLst>
+          </p:cNvPr>
+          <p:cNvSpPr/>
+          <p:nvPr/>
+        </p:nvSpPr>
+        <p:spPr>
+          <a:xfrm rot="16200000">
+            <a:off x="2572956" y="5448904"/>
+            <a:ext cx="1950049" cy="237960"/>
+          </a:xfrm>
+          <a:prstGeom prst="rightArrow">
+            <a:avLst/>
+          </a:prstGeom>
+          <a:solidFill>
+            <a:schemeClr val="accent3"/>
+          </a:solidFill>
+          <a:ln w="12700">
+            <a:solidFill>
+              <a:schemeClr val="tx1"/>
+            </a:solidFill>
+          </a:ln>
+        </p:spPr>
+        <p:style>
+          <a:lnRef idx="2">
+            <a:schemeClr val="accent1">
+              <a:shade val="50000"/>
+            </a:schemeClr>
+          </a:lnRef>
+          <a:fillRef idx="1">
+            <a:schemeClr val="accent1"/>
+          </a:fillRef>
+          <a:effectRef idx="0">
+            <a:schemeClr val="accent1"/>
+          </a:effectRef>
+          <a:fontRef idx="minor">
+            <a:schemeClr val="lt1"/>
+          </a:fontRef>
+        </p:style>
+        <p:txBody>
+          <a:bodyPr rot="0" spcFirstLastPara="0" vertOverflow="overflow" horzOverflow="overflow" vert="horz" wrap="square" lIns="91440" tIns="45720" rIns="91440" bIns="45720" numCol="1" spcCol="0" rtlCol="0" fromWordArt="0" anchor="ctr" anchorCtr="0" forceAA="0" compatLnSpc="1">
+            <a:prstTxWarp prst="textNoShape">
+              <a:avLst/>
+            </a:prstTxWarp>
+            <a:noAutofit/>
+          </a:bodyPr>
+          <a:lstStyle/>
+          <a:p>
+            <a:pPr algn="ctr"/>
+            <a:endParaRPr lang="en-US" sz="1200"/>
+          </a:p>
+        </p:txBody>
+      </p:sp>
+      <p:sp>
+        <p:nvSpPr>
+          <p:cNvPr id="55" name="Right Arrow 54">
+            <a:extLst>
+              <a:ext uri="{FF2B5EF4-FFF2-40B4-BE49-F238E27FC236}">
+                <a16:creationId xmlns:a16="http://schemas.microsoft.com/office/drawing/2014/main" id="{66122925-AD32-B84B-89D9-DB93182D7741}"/>
+              </a:ext>
+            </a:extLst>
+          </p:cNvPr>
+          <p:cNvSpPr/>
+          <p:nvPr/>
+        </p:nvSpPr>
+        <p:spPr>
+          <a:xfrm rot="16200000">
+            <a:off x="1419485" y="5286134"/>
+            <a:ext cx="626172" cy="182121"/>
+          </a:xfrm>
+          <a:prstGeom prst="rightArrow">
+            <a:avLst/>
+          </a:prstGeom>
+          <a:solidFill>
+            <a:schemeClr val="accent3"/>
+          </a:solidFill>
+          <a:ln w="12700">
+            <a:solidFill>
+              <a:schemeClr val="tx1"/>
+            </a:solidFill>
+          </a:ln>
+        </p:spPr>
+        <p:style>
+          <a:lnRef idx="2">
+            <a:schemeClr val="accent1">
+              <a:shade val="50000"/>
+            </a:schemeClr>
+          </a:lnRef>
+          <a:fillRef idx="1">
+            <a:schemeClr val="accent1"/>
+          </a:fillRef>
+          <a:effectRef idx="0">
+            <a:schemeClr val="accent1"/>
+          </a:effectRef>
+          <a:fontRef idx="minor">
+            <a:schemeClr val="lt1"/>
+          </a:fontRef>
+        </p:style>
+        <p:txBody>
+          <a:bodyPr rot="0" spcFirstLastPara="0" vertOverflow="overflow" horzOverflow="overflow" vert="horz" wrap="square" lIns="91440" tIns="45720" rIns="91440" bIns="45720" numCol="1" spcCol="0" rtlCol="0" fromWordArt="0" anchor="ctr" anchorCtr="0" forceAA="0" compatLnSpc="1">
+            <a:prstTxWarp prst="textNoShape">
+              <a:avLst/>
+            </a:prstTxWarp>
+            <a:noAutofit/>
+          </a:bodyPr>
+          <a:lstStyle/>
+          <a:p>
+            <a:pPr algn="ctr"/>
+            <a:endParaRPr lang="en-US" sz="1200"/>
+          </a:p>
+        </p:txBody>
+      </p:sp>
+      <p:sp>
+        <p:nvSpPr>
+          <p:cNvPr id="56" name="Right Arrow 55">
+            <a:extLst>
+              <a:ext uri="{FF2B5EF4-FFF2-40B4-BE49-F238E27FC236}">
+                <a16:creationId xmlns:a16="http://schemas.microsoft.com/office/drawing/2014/main" id="{C28F04A8-6F37-8749-970C-D973B97EF2A1}"/>
+              </a:ext>
+            </a:extLst>
+          </p:cNvPr>
+          <p:cNvSpPr/>
+          <p:nvPr/>
+        </p:nvSpPr>
+        <p:spPr>
+          <a:xfrm rot="9068587" flipH="1">
+            <a:off x="1860235" y="5114747"/>
+            <a:ext cx="2288945" cy="218868"/>
+          </a:xfrm>
+          <a:prstGeom prst="rightArrow">
+            <a:avLst/>
+          </a:prstGeom>
+          <a:solidFill>
+            <a:schemeClr val="accent3"/>
+          </a:solidFill>
+          <a:ln w="12700">
+            <a:solidFill>
+              <a:schemeClr val="tx1"/>
+            </a:solidFill>
+          </a:ln>
+        </p:spPr>
+        <p:style>
+          <a:lnRef idx="2">
+            <a:schemeClr val="accent1">
+              <a:shade val="50000"/>
+            </a:schemeClr>
+          </a:lnRef>
+          <a:fillRef idx="1">
+            <a:schemeClr val="accent1"/>
+          </a:fillRef>
+          <a:effectRef idx="0">
+            <a:schemeClr val="accent1"/>
+          </a:effectRef>
+          <a:fontRef idx="minor">
+            <a:schemeClr val="lt1"/>
+          </a:fontRef>
+        </p:style>
+        <p:txBody>
+          <a:bodyPr rot="0" spcFirstLastPara="0" vertOverflow="overflow" horzOverflow="overflow" vert="horz" wrap="square" lIns="91440" tIns="45720" rIns="91440" bIns="45720" numCol="1" spcCol="0" rtlCol="0" fromWordArt="0" anchor="ctr" anchorCtr="0" forceAA="0" compatLnSpc="1">
+            <a:prstTxWarp prst="textNoShape">
+              <a:avLst/>
+            </a:prstTxWarp>
+            <a:noAutofit/>
+          </a:bodyPr>
+          <a:lstStyle/>
+          <a:p>
+            <a:pPr algn="ctr"/>
+            <a:endParaRPr lang="en-US" sz="1200"/>
+          </a:p>
+        </p:txBody>
+      </p:sp>
+      <p:sp>
+        <p:nvSpPr>
+          <p:cNvPr id="57" name="Right Arrow 56">
+            <a:extLst>
+              <a:ext uri="{FF2B5EF4-FFF2-40B4-BE49-F238E27FC236}">
+                <a16:creationId xmlns:a16="http://schemas.microsoft.com/office/drawing/2014/main" id="{46C4081A-10C8-FF45-90E3-31F1E6AB6D4E}"/>
+              </a:ext>
+            </a:extLst>
+          </p:cNvPr>
+          <p:cNvSpPr/>
+          <p:nvPr/>
+        </p:nvSpPr>
+        <p:spPr>
+          <a:xfrm rot="14838732">
+            <a:off x="4841982" y="3944001"/>
+            <a:ext cx="1534388" cy="205249"/>
+          </a:xfrm>
+          <a:prstGeom prst="rightArrow">
+            <a:avLst/>
+          </a:prstGeom>
+          <a:solidFill>
+            <a:schemeClr val="accent3"/>
+          </a:solidFill>
+          <a:ln w="12700">
+            <a:solidFill>
+              <a:schemeClr val="tx1"/>
+            </a:solidFill>
+          </a:ln>
+        </p:spPr>
+        <p:style>
+          <a:lnRef idx="2">
+            <a:schemeClr val="accent1">
+              <a:shade val="50000"/>
+            </a:schemeClr>
+          </a:lnRef>
+          <a:fillRef idx="1">
+            <a:schemeClr val="accent1"/>
+          </a:fillRef>
+          <a:effectRef idx="0">
+            <a:schemeClr val="accent1"/>
+          </a:effectRef>
+          <a:fontRef idx="minor">
+            <a:schemeClr val="lt1"/>
+          </a:fontRef>
+        </p:style>
+        <p:txBody>
+          <a:bodyPr rot="0" spcFirstLastPara="0" vertOverflow="overflow" horzOverflow="overflow" vert="horz" wrap="square" lIns="91440" tIns="45720" rIns="91440" bIns="45720" numCol="1" spcCol="0" rtlCol="0" fromWordArt="0" anchor="ctr" anchorCtr="0" forceAA="0" compatLnSpc="1">
+            <a:prstTxWarp prst="textNoShape">
+              <a:avLst/>
+            </a:prstTxWarp>
+            <a:noAutofit/>
+          </a:bodyPr>
+          <a:lstStyle/>
+          <a:p>
+            <a:pPr algn="ctr"/>
+            <a:endParaRPr lang="en-US" sz="1200"/>
+          </a:p>
+        </p:txBody>
+      </p:sp>
+    </p:spTree>
+    <p:extLst>
+      <p:ext uri="{BB962C8B-B14F-4D97-AF65-F5344CB8AC3E}">
+        <p14:creationId xmlns:p14="http://schemas.microsoft.com/office/powerpoint/2010/main" val="1195933829"/>
+      </p:ext>
+    </p:extLst>
+  </p:cSld>
+  <p:clrMapOvr>
+    <a:masterClrMapping/>
+  </p:clrMapOvr>
+</p:sld>
+</file>
+
+<file path=ppt/slides/slide4.xml><?xml version="1.0" encoding="utf-8"?>
+<p:sld xmlns:a="http://schemas.openxmlformats.org/drawingml/2006/main" xmlns:r="http://schemas.openxmlformats.org/officeDocument/2006/relationships" xmlns:p="http://schemas.openxmlformats.org/presentationml/2006/main">
+  <p:cSld>
+    <p:spTree>
+      <p:nvGrpSpPr>
+        <p:cNvPr id="1" name=""/>
+        <p:cNvGrpSpPr/>
+        <p:nvPr/>
+      </p:nvGrpSpPr>
+      <p:grpSpPr>
+        <a:xfrm>
+          <a:off x="0" y="0"/>
+          <a:ext cx="0" cy="0"/>
+          <a:chOff x="0" y="0"/>
+          <a:chExt cx="0" cy="0"/>
+        </a:xfrm>
+      </p:grpSpPr>
+      <p:grpSp>
+        <p:nvGrpSpPr>
+          <p:cNvPr id="5" name="Group 4">
+            <a:extLst>
+              <a:ext uri="{FF2B5EF4-FFF2-40B4-BE49-F238E27FC236}">
+                <a16:creationId xmlns:a16="http://schemas.microsoft.com/office/drawing/2014/main" id="{B4BBCA8D-7ADA-FA42-BFBD-18617420A328}"/>
+              </a:ext>
+            </a:extLst>
+          </p:cNvPr>
+          <p:cNvGrpSpPr/>
+          <p:nvPr/>
+        </p:nvGrpSpPr>
+        <p:grpSpPr>
+          <a:xfrm>
+            <a:off x="208611" y="3173348"/>
+            <a:ext cx="1693102" cy="1563678"/>
+            <a:chOff x="462404" y="3126231"/>
+            <a:chExt cx="1693102" cy="1563678"/>
+          </a:xfrm>
+        </p:grpSpPr>
+        <p:sp>
+          <p:nvSpPr>
+            <p:cNvPr id="3" name="Rounded Rectangle 2">
+              <a:extLst>
+                <a:ext uri="{FF2B5EF4-FFF2-40B4-BE49-F238E27FC236}">
+                  <a16:creationId xmlns:a16="http://schemas.microsoft.com/office/drawing/2014/main" id="{648BDF2B-8405-5F4E-A10F-23E433471D74}"/>
+                </a:ext>
+              </a:extLst>
+            </p:cNvPr>
+            <p:cNvSpPr/>
+            <p:nvPr/>
+          </p:nvSpPr>
+          <p:spPr>
+            <a:xfrm>
+              <a:off x="462404" y="3126231"/>
+              <a:ext cx="1693102" cy="1563678"/>
+            </a:xfrm>
+            <a:prstGeom prst="roundRect">
+              <a:avLst/>
+            </a:prstGeom>
+            <a:solidFill>
+              <a:schemeClr val="accent6">
+                <a:alpha val="49000"/>
+              </a:schemeClr>
+            </a:solidFill>
+            <a:ln>
+              <a:solidFill>
+                <a:schemeClr val="accent6">
+                  <a:lumMod val="50000"/>
+                </a:schemeClr>
+              </a:solidFill>
+            </a:ln>
+          </p:spPr>
+          <p:style>
+            <a:lnRef idx="2">
+              <a:schemeClr val="accent1">
+                <a:shade val="50000"/>
+              </a:schemeClr>
+            </a:lnRef>
+            <a:fillRef idx="1">
+              <a:schemeClr val="accent1"/>
+            </a:fillRef>
+            <a:effectRef idx="0">
+              <a:schemeClr val="accent1"/>
+            </a:effectRef>
+            <a:fontRef idx="minor">
+              <a:schemeClr val="lt1"/>
+            </a:fontRef>
+          </p:style>
+          <p:txBody>
+            <a:bodyPr rtlCol="0" anchor="ctr"/>
+            <a:lstStyle/>
+            <a:p>
+              <a:pPr algn="ctr"/>
+              <a:endParaRPr lang="en-US"/>
+            </a:p>
+          </p:txBody>
+        </p:sp>
+        <p:sp>
+          <p:nvSpPr>
+            <p:cNvPr id="28" name="TextBox 27">
+              <a:extLst>
+                <a:ext uri="{FF2B5EF4-FFF2-40B4-BE49-F238E27FC236}">
+                  <a16:creationId xmlns:a16="http://schemas.microsoft.com/office/drawing/2014/main" id="{188A1222-267D-514E-BDC8-1E2C165B807C}"/>
+                </a:ext>
+              </a:extLst>
+            </p:cNvPr>
+            <p:cNvSpPr txBox="1"/>
+            <p:nvPr/>
+          </p:nvSpPr>
+          <p:spPr>
+            <a:xfrm>
+              <a:off x="536495" y="3235394"/>
+              <a:ext cx="1537136" cy="830997"/>
+            </a:xfrm>
+            <a:prstGeom prst="rect">
+              <a:avLst/>
+            </a:prstGeom>
+            <a:solidFill>
+              <a:schemeClr val="bg1"/>
+            </a:solidFill>
+            <a:ln w="3175">
+              <a:solidFill>
+                <a:schemeClr val="tx1"/>
+              </a:solidFill>
+            </a:ln>
+          </p:spPr>
+          <p:txBody>
+            <a:bodyPr wrap="square" rtlCol="0">
+              <a:spAutoFit/>
+            </a:bodyPr>
+            <a:lstStyle/>
+            <a:p>
+              <a:pPr algn="ctr"/>
+              <a:r>
+                <a:rPr lang="en-US" sz="1200" i="1" dirty="0"/>
+                <a:t>CCES, PRS/PWCC</a:t>
+              </a:r>
+            </a:p>
+            <a:p>
+              <a:pPr algn="ctr"/>
+              <a:r>
+                <a:rPr lang="en-US" sz="1200" b="1" dirty="0"/>
+                <a:t>Forage fishes (anchovy, sardine, herring, smelt, shad)</a:t>
+              </a:r>
+            </a:p>
+          </p:txBody>
+        </p:sp>
+        <p:sp>
+          <p:nvSpPr>
+            <p:cNvPr id="32" name="TextBox 31">
+              <a:extLst>
+                <a:ext uri="{FF2B5EF4-FFF2-40B4-BE49-F238E27FC236}">
+                  <a16:creationId xmlns:a16="http://schemas.microsoft.com/office/drawing/2014/main" id="{1777F9CE-A489-984F-A723-3795520C155A}"/>
+                </a:ext>
+              </a:extLst>
+            </p:cNvPr>
+            <p:cNvSpPr txBox="1"/>
+            <p:nvPr/>
+          </p:nvSpPr>
+          <p:spPr>
+            <a:xfrm>
+              <a:off x="616014" y="4121142"/>
+              <a:ext cx="1405110" cy="461665"/>
+            </a:xfrm>
+            <a:prstGeom prst="rect">
+              <a:avLst/>
+            </a:prstGeom>
+            <a:solidFill>
+              <a:schemeClr val="bg1"/>
+            </a:solidFill>
+            <a:ln w="38100">
+              <a:solidFill>
+                <a:schemeClr val="accent1"/>
+              </a:solidFill>
+            </a:ln>
+          </p:spPr>
+          <p:txBody>
+            <a:bodyPr wrap="square" rtlCol="0">
+              <a:spAutoFit/>
+            </a:bodyPr>
+            <a:lstStyle/>
+            <a:p>
+              <a:pPr algn="ctr"/>
+              <a:r>
+                <a:rPr lang="en-US" sz="1200" i="1" dirty="0"/>
+                <a:t>JSOES</a:t>
+              </a:r>
+            </a:p>
+            <a:p>
+              <a:pPr algn="ctr"/>
+              <a:r>
+                <a:rPr lang="en-US" sz="1200" b="1" dirty="0"/>
+                <a:t>Juvenile salmon</a:t>
+              </a:r>
+            </a:p>
+          </p:txBody>
+        </p:sp>
+      </p:grpSp>
+      <p:sp>
+        <p:nvSpPr>
+          <p:cNvPr id="75" name="Right Arrow 74">
+            <a:extLst>
+              <a:ext uri="{FF2B5EF4-FFF2-40B4-BE49-F238E27FC236}">
+                <a16:creationId xmlns:a16="http://schemas.microsoft.com/office/drawing/2014/main" id="{24610F51-CC2D-AE4F-92A6-29BF3D27C1AE}"/>
+              </a:ext>
+            </a:extLst>
+          </p:cNvPr>
+          <p:cNvSpPr/>
+          <p:nvPr/>
+        </p:nvSpPr>
+        <p:spPr>
+          <a:xfrm rot="9831852" flipH="1">
+            <a:off x="1990969" y="5030582"/>
+            <a:ext cx="1325880" cy="211866"/>
+          </a:xfrm>
+          <a:prstGeom prst="rightArrow">
+            <a:avLst/>
+          </a:prstGeom>
+          <a:solidFill>
+            <a:schemeClr val="tx1"/>
+          </a:solidFill>
+          <a:ln w="12700">
+            <a:solidFill>
+              <a:schemeClr val="tx1"/>
+            </a:solidFill>
+          </a:ln>
+        </p:spPr>
+        <p:style>
+          <a:lnRef idx="2">
+            <a:schemeClr val="accent1">
+              <a:shade val="50000"/>
+            </a:schemeClr>
+          </a:lnRef>
+          <a:fillRef idx="1">
+            <a:schemeClr val="accent1"/>
+          </a:fillRef>
+          <a:effectRef idx="0">
+            <a:schemeClr val="accent1"/>
+          </a:effectRef>
+          <a:fontRef idx="minor">
+            <a:schemeClr val="lt1"/>
+          </a:fontRef>
+        </p:style>
+        <p:txBody>
+          <a:bodyPr rot="0" spcFirstLastPara="0" vertOverflow="overflow" horzOverflow="overflow" vert="horz" wrap="square" lIns="91440" tIns="45720" rIns="91440" bIns="45720" numCol="1" spcCol="0" rtlCol="0" fromWordArt="0" anchor="ctr" anchorCtr="0" forceAA="0" compatLnSpc="1">
+            <a:prstTxWarp prst="textNoShape">
+              <a:avLst/>
+            </a:prstTxWarp>
+            <a:noAutofit/>
+          </a:bodyPr>
+          <a:lstStyle/>
+          <a:p>
+            <a:pPr algn="ctr"/>
+            <a:endParaRPr lang="en-US" sz="1200"/>
+          </a:p>
+        </p:txBody>
+      </p:sp>
+      <p:sp>
+        <p:nvSpPr>
+          <p:cNvPr id="89" name="TextBox 88">
+            <a:extLst>
+              <a:ext uri="{FF2B5EF4-FFF2-40B4-BE49-F238E27FC236}">
+                <a16:creationId xmlns:a16="http://schemas.microsoft.com/office/drawing/2014/main" id="{C866C7F6-40A9-ED44-A8CD-248ACBB1BE9E}"/>
+              </a:ext>
+            </a:extLst>
+          </p:cNvPr>
+          <p:cNvSpPr txBox="1"/>
+          <p:nvPr/>
+        </p:nvSpPr>
+        <p:spPr>
+          <a:xfrm>
+            <a:off x="2481128" y="31461"/>
+            <a:ext cx="1890433" cy="400110"/>
+          </a:xfrm>
+          <a:prstGeom prst="rect">
+            <a:avLst/>
+          </a:prstGeom>
+          <a:noFill/>
+          <a:ln w="3175">
+            <a:noFill/>
+          </a:ln>
+        </p:spPr>
+        <p:txBody>
+          <a:bodyPr wrap="square" rtlCol="0">
+            <a:spAutoFit/>
+          </a:bodyPr>
+          <a:lstStyle/>
+          <a:p>
+            <a:r>
+              <a:rPr lang="en-US" sz="2000" dirty="0"/>
+              <a:t>The model DAG</a:t>
+            </a:r>
+          </a:p>
+        </p:txBody>
+      </p:sp>
+      <p:sp>
+        <p:nvSpPr>
+          <p:cNvPr id="4" name="TextBox 3">
+            <a:extLst>
+              <a:ext uri="{FF2B5EF4-FFF2-40B4-BE49-F238E27FC236}">
+                <a16:creationId xmlns:a16="http://schemas.microsoft.com/office/drawing/2014/main" id="{4ED04F93-9986-1049-8C3D-F22433FFEFCE}"/>
+              </a:ext>
+            </a:extLst>
+          </p:cNvPr>
+          <p:cNvSpPr txBox="1"/>
+          <p:nvPr/>
+        </p:nvSpPr>
+        <p:spPr>
+          <a:xfrm>
+            <a:off x="3390398" y="3889451"/>
+            <a:ext cx="1902619" cy="1200329"/>
+          </a:xfrm>
+          <a:prstGeom prst="rect">
+            <a:avLst/>
+          </a:prstGeom>
+          <a:noFill/>
+          <a:ln>
+            <a:solidFill>
+              <a:schemeClr val="tx1"/>
+            </a:solidFill>
+          </a:ln>
+        </p:spPr>
+        <p:txBody>
+          <a:bodyPr wrap="square" rtlCol="0">
+            <a:spAutoFit/>
+          </a:bodyPr>
+          <a:lstStyle/>
+          <a:p>
+            <a:pPr algn="ctr"/>
+            <a:r>
+              <a:rPr lang="en-US" b="1" dirty="0"/>
+              <a:t>Adult returns at Bonneville Dam, lagged by ocean age</a:t>
+            </a:r>
+          </a:p>
+        </p:txBody>
+      </p:sp>
+      <p:grpSp>
+        <p:nvGrpSpPr>
+          <p:cNvPr id="29" name="Group 28">
+            <a:extLst>
+              <a:ext uri="{FF2B5EF4-FFF2-40B4-BE49-F238E27FC236}">
+                <a16:creationId xmlns:a16="http://schemas.microsoft.com/office/drawing/2014/main" id="{74706BD6-ED91-244F-9A0F-40222DC0C459}"/>
+              </a:ext>
+            </a:extLst>
+          </p:cNvPr>
+          <p:cNvGrpSpPr/>
+          <p:nvPr/>
+        </p:nvGrpSpPr>
+        <p:grpSpPr>
+          <a:xfrm>
+            <a:off x="1927884" y="1021474"/>
+            <a:ext cx="1815476" cy="1563678"/>
+            <a:chOff x="462404" y="3126231"/>
+            <a:chExt cx="1815476" cy="1563678"/>
+          </a:xfrm>
+        </p:grpSpPr>
+        <p:sp>
+          <p:nvSpPr>
+            <p:cNvPr id="30" name="Rounded Rectangle 29">
+              <a:extLst>
+                <a:ext uri="{FF2B5EF4-FFF2-40B4-BE49-F238E27FC236}">
+                  <a16:creationId xmlns:a16="http://schemas.microsoft.com/office/drawing/2014/main" id="{EF7C08D0-1353-3F49-B1A3-1380B8E690AE}"/>
+                </a:ext>
+              </a:extLst>
+            </p:cNvPr>
+            <p:cNvSpPr/>
+            <p:nvPr/>
+          </p:nvSpPr>
+          <p:spPr>
+            <a:xfrm>
+              <a:off x="462404" y="3126231"/>
+              <a:ext cx="1815476" cy="1563678"/>
+            </a:xfrm>
+            <a:prstGeom prst="roundRect">
+              <a:avLst/>
+            </a:prstGeom>
+            <a:solidFill>
+              <a:srgbClr val="FF0000">
+                <a:alpha val="49000"/>
+              </a:srgbClr>
+            </a:solidFill>
+            <a:ln>
+              <a:solidFill>
+                <a:schemeClr val="accent6">
+                  <a:lumMod val="50000"/>
+                </a:schemeClr>
+              </a:solidFill>
+            </a:ln>
+          </p:spPr>
+          <p:style>
+            <a:lnRef idx="2">
+              <a:schemeClr val="accent1">
+                <a:shade val="50000"/>
+              </a:schemeClr>
+            </a:lnRef>
+            <a:fillRef idx="1">
+              <a:schemeClr val="accent1"/>
+            </a:fillRef>
+            <a:effectRef idx="0">
+              <a:schemeClr val="accent1"/>
+            </a:effectRef>
+            <a:fontRef idx="minor">
+              <a:schemeClr val="lt1"/>
+            </a:fontRef>
+          </p:style>
+          <p:txBody>
+            <a:bodyPr rtlCol="0" anchor="ctr"/>
+            <a:lstStyle/>
+            <a:p>
+              <a:pPr algn="ctr"/>
+              <a:endParaRPr lang="en-US"/>
+            </a:p>
+          </p:txBody>
+        </p:sp>
+        <p:sp>
+          <p:nvSpPr>
+            <p:cNvPr id="31" name="TextBox 30">
+              <a:extLst>
+                <a:ext uri="{FF2B5EF4-FFF2-40B4-BE49-F238E27FC236}">
+                  <a16:creationId xmlns:a16="http://schemas.microsoft.com/office/drawing/2014/main" id="{6ABC26A2-1E2C-EE40-BD52-F8D745C33ADF}"/>
+                </a:ext>
+              </a:extLst>
+            </p:cNvPr>
+            <p:cNvSpPr txBox="1"/>
+            <p:nvPr/>
+          </p:nvSpPr>
+          <p:spPr>
+            <a:xfrm>
+              <a:off x="567920" y="3246232"/>
+              <a:ext cx="1619011" cy="830997"/>
+            </a:xfrm>
+            <a:prstGeom prst="rect">
+              <a:avLst/>
+            </a:prstGeom>
+            <a:solidFill>
+              <a:schemeClr val="bg1"/>
+            </a:solidFill>
+            <a:ln w="3175">
+              <a:solidFill>
+                <a:schemeClr val="tx1"/>
+              </a:solidFill>
+            </a:ln>
+          </p:spPr>
+          <p:txBody>
+            <a:bodyPr wrap="square" rtlCol="0">
+              <a:spAutoFit/>
+            </a:bodyPr>
+            <a:lstStyle/>
+            <a:p>
+              <a:pPr algn="ctr"/>
+              <a:r>
+                <a:rPr lang="en-US" sz="1200" i="1" dirty="0"/>
+                <a:t>Hake, CCES</a:t>
+              </a:r>
+            </a:p>
+            <a:p>
+              <a:pPr algn="ctr"/>
+              <a:r>
+                <a:rPr lang="en-US" sz="1200" b="1" dirty="0"/>
+                <a:t>Piscivorous fishes (hake, chub mackerel, jack mackerel)</a:t>
+              </a:r>
+            </a:p>
+          </p:txBody>
+        </p:sp>
+        <p:sp>
+          <p:nvSpPr>
+            <p:cNvPr id="35" name="TextBox 34">
+              <a:extLst>
+                <a:ext uri="{FF2B5EF4-FFF2-40B4-BE49-F238E27FC236}">
+                  <a16:creationId xmlns:a16="http://schemas.microsoft.com/office/drawing/2014/main" id="{0EA8843E-4EAE-DE47-9909-9E002C2C42C3}"/>
+                </a:ext>
+              </a:extLst>
+            </p:cNvPr>
+            <p:cNvSpPr txBox="1"/>
+            <p:nvPr/>
+          </p:nvSpPr>
+          <p:spPr>
+            <a:xfrm>
+              <a:off x="684485" y="4123082"/>
+              <a:ext cx="1405110" cy="461665"/>
+            </a:xfrm>
+            <a:prstGeom prst="rect">
+              <a:avLst/>
+            </a:prstGeom>
+            <a:solidFill>
+              <a:schemeClr val="bg1"/>
+            </a:solidFill>
+            <a:ln w="38100">
+              <a:solidFill>
+                <a:schemeClr val="accent1"/>
+              </a:solidFill>
+            </a:ln>
+          </p:spPr>
+          <p:txBody>
+            <a:bodyPr wrap="square" rtlCol="0">
+              <a:spAutoFit/>
+            </a:bodyPr>
+            <a:lstStyle/>
+            <a:p>
+              <a:pPr algn="ctr"/>
+              <a:r>
+                <a:rPr lang="en-US" sz="1200" i="1" dirty="0"/>
+                <a:t>JSOES</a:t>
+              </a:r>
+            </a:p>
+            <a:p>
+              <a:pPr algn="ctr"/>
+              <a:r>
+                <a:rPr lang="en-US" sz="1200" b="1" dirty="0"/>
+                <a:t>Juvenile salmon</a:t>
+              </a:r>
+            </a:p>
+          </p:txBody>
+        </p:sp>
+      </p:grpSp>
+      <p:grpSp>
+        <p:nvGrpSpPr>
+          <p:cNvPr id="36" name="Group 35">
+            <a:extLst>
+              <a:ext uri="{FF2B5EF4-FFF2-40B4-BE49-F238E27FC236}">
+                <a16:creationId xmlns:a16="http://schemas.microsoft.com/office/drawing/2014/main" id="{F25D2361-BE22-CA4D-BA41-910CD0E26B30}"/>
+              </a:ext>
+            </a:extLst>
+          </p:cNvPr>
+          <p:cNvGrpSpPr/>
+          <p:nvPr/>
+        </p:nvGrpSpPr>
+        <p:grpSpPr>
+          <a:xfrm>
+            <a:off x="1881260" y="7327263"/>
+            <a:ext cx="1693102" cy="1563678"/>
+            <a:chOff x="462404" y="3126231"/>
+            <a:chExt cx="1693102" cy="1563678"/>
+          </a:xfrm>
+        </p:grpSpPr>
+        <p:sp>
+          <p:nvSpPr>
+            <p:cNvPr id="38" name="Rounded Rectangle 37">
+              <a:extLst>
+                <a:ext uri="{FF2B5EF4-FFF2-40B4-BE49-F238E27FC236}">
+                  <a16:creationId xmlns:a16="http://schemas.microsoft.com/office/drawing/2014/main" id="{AAF48B04-4D91-A04E-B669-BF21D433BB17}"/>
+                </a:ext>
+              </a:extLst>
+            </p:cNvPr>
+            <p:cNvSpPr/>
+            <p:nvPr/>
+          </p:nvSpPr>
+          <p:spPr>
+            <a:xfrm>
+              <a:off x="462404" y="3126231"/>
+              <a:ext cx="1693102" cy="1563678"/>
+            </a:xfrm>
+            <a:prstGeom prst="roundRect">
+              <a:avLst/>
+            </a:prstGeom>
+            <a:solidFill>
+              <a:schemeClr val="accent6">
+                <a:alpha val="49000"/>
+              </a:schemeClr>
+            </a:solidFill>
+            <a:ln>
+              <a:solidFill>
+                <a:schemeClr val="accent6">
+                  <a:lumMod val="50000"/>
+                </a:schemeClr>
+              </a:solidFill>
+            </a:ln>
+          </p:spPr>
+          <p:style>
+            <a:lnRef idx="2">
+              <a:schemeClr val="accent1">
+                <a:shade val="50000"/>
+              </a:schemeClr>
+            </a:lnRef>
+            <a:fillRef idx="1">
+              <a:schemeClr val="accent1"/>
+            </a:fillRef>
+            <a:effectRef idx="0">
+              <a:schemeClr val="accent1"/>
+            </a:effectRef>
+            <a:fontRef idx="minor">
+              <a:schemeClr val="lt1"/>
+            </a:fontRef>
+          </p:style>
+          <p:txBody>
+            <a:bodyPr rtlCol="0" anchor="ctr"/>
+            <a:lstStyle/>
+            <a:p>
+              <a:pPr algn="ctr"/>
+              <a:endParaRPr lang="en-US"/>
+            </a:p>
+          </p:txBody>
+        </p:sp>
+        <p:sp>
+          <p:nvSpPr>
+            <p:cNvPr id="41" name="TextBox 40">
+              <a:extLst>
+                <a:ext uri="{FF2B5EF4-FFF2-40B4-BE49-F238E27FC236}">
+                  <a16:creationId xmlns:a16="http://schemas.microsoft.com/office/drawing/2014/main" id="{E3C8D90D-EEB5-EE41-B667-4FACDFE6724D}"/>
+                </a:ext>
+              </a:extLst>
+            </p:cNvPr>
+            <p:cNvSpPr txBox="1"/>
+            <p:nvPr/>
+          </p:nvSpPr>
+          <p:spPr>
+            <a:xfrm>
+              <a:off x="536495" y="3235394"/>
+              <a:ext cx="1537136" cy="830997"/>
+            </a:xfrm>
+            <a:prstGeom prst="rect">
+              <a:avLst/>
+            </a:prstGeom>
+            <a:solidFill>
+              <a:schemeClr val="bg1"/>
+            </a:solidFill>
+            <a:ln w="3175">
+              <a:solidFill>
+                <a:schemeClr val="tx1"/>
+              </a:solidFill>
+            </a:ln>
+          </p:spPr>
+          <p:txBody>
+            <a:bodyPr wrap="square" rtlCol="0">
+              <a:spAutoFit/>
+            </a:bodyPr>
+            <a:lstStyle/>
+            <a:p>
+              <a:pPr algn="ctr"/>
+              <a:r>
+                <a:rPr lang="en-US" sz="1200" i="1" dirty="0"/>
+                <a:t>JSOES, PRS</a:t>
+              </a:r>
+            </a:p>
+            <a:p>
+              <a:pPr algn="ctr"/>
+              <a:r>
+                <a:rPr lang="en-US" sz="1200" b="1" dirty="0"/>
+                <a:t>Large zooplankton (copepods, decapod larvae)</a:t>
+              </a:r>
+            </a:p>
+          </p:txBody>
+        </p:sp>
+        <p:sp>
+          <p:nvSpPr>
+            <p:cNvPr id="42" name="TextBox 41">
+              <a:extLst>
+                <a:ext uri="{FF2B5EF4-FFF2-40B4-BE49-F238E27FC236}">
+                  <a16:creationId xmlns:a16="http://schemas.microsoft.com/office/drawing/2014/main" id="{8C428ADD-07F9-CB47-8A23-5C1743B60C90}"/>
+                </a:ext>
+              </a:extLst>
+            </p:cNvPr>
+            <p:cNvSpPr txBox="1"/>
+            <p:nvPr/>
+          </p:nvSpPr>
+          <p:spPr>
+            <a:xfrm>
+              <a:off x="616014" y="4121142"/>
+              <a:ext cx="1405110" cy="461665"/>
+            </a:xfrm>
+            <a:prstGeom prst="rect">
+              <a:avLst/>
+            </a:prstGeom>
+            <a:solidFill>
+              <a:schemeClr val="bg1"/>
+            </a:solidFill>
+            <a:ln w="38100">
+              <a:solidFill>
+                <a:schemeClr val="accent1"/>
+              </a:solidFill>
+            </a:ln>
+          </p:spPr>
+          <p:txBody>
+            <a:bodyPr wrap="square" rtlCol="0">
+              <a:spAutoFit/>
+            </a:bodyPr>
+            <a:lstStyle/>
+            <a:p>
+              <a:pPr algn="ctr"/>
+              <a:r>
+                <a:rPr lang="en-US" sz="1200" i="1" dirty="0"/>
+                <a:t>JSOES</a:t>
+              </a:r>
+            </a:p>
+            <a:p>
+              <a:pPr algn="ctr"/>
+              <a:r>
+                <a:rPr lang="en-US" sz="1200" b="1" dirty="0"/>
+                <a:t>Juvenile salmon</a:t>
+              </a:r>
+            </a:p>
+          </p:txBody>
+        </p:sp>
+      </p:grpSp>
+      <p:grpSp>
+        <p:nvGrpSpPr>
+          <p:cNvPr id="7" name="Group 6">
+            <a:extLst>
+              <a:ext uri="{FF2B5EF4-FFF2-40B4-BE49-F238E27FC236}">
+                <a16:creationId xmlns:a16="http://schemas.microsoft.com/office/drawing/2014/main" id="{F8481E9F-AA93-2C46-90CE-BC8ABFF60AF9}"/>
+              </a:ext>
+            </a:extLst>
+          </p:cNvPr>
+          <p:cNvGrpSpPr/>
+          <p:nvPr/>
+        </p:nvGrpSpPr>
+        <p:grpSpPr>
+          <a:xfrm>
+            <a:off x="3780847" y="1267485"/>
+            <a:ext cx="1815476" cy="1195094"/>
+            <a:chOff x="44017" y="5266299"/>
+            <a:chExt cx="1815476" cy="1195094"/>
+          </a:xfrm>
+        </p:grpSpPr>
+        <p:sp>
+          <p:nvSpPr>
+            <p:cNvPr id="45" name="Rounded Rectangle 44">
+              <a:extLst>
+                <a:ext uri="{FF2B5EF4-FFF2-40B4-BE49-F238E27FC236}">
+                  <a16:creationId xmlns:a16="http://schemas.microsoft.com/office/drawing/2014/main" id="{CFA57F99-B362-504E-BBB6-469F7628CF5C}"/>
+                </a:ext>
+              </a:extLst>
+            </p:cNvPr>
+            <p:cNvSpPr/>
+            <p:nvPr/>
+          </p:nvSpPr>
+          <p:spPr>
+            <a:xfrm>
+              <a:off x="44017" y="5266299"/>
+              <a:ext cx="1815476" cy="1195094"/>
+            </a:xfrm>
+            <a:prstGeom prst="roundRect">
+              <a:avLst/>
+            </a:prstGeom>
+            <a:solidFill>
+              <a:srgbClr val="FF0000">
+                <a:alpha val="49000"/>
+              </a:srgbClr>
+            </a:solidFill>
+            <a:ln>
+              <a:solidFill>
+                <a:schemeClr val="accent6">
+                  <a:lumMod val="50000"/>
+                </a:schemeClr>
+              </a:solidFill>
+            </a:ln>
+          </p:spPr>
+          <p:style>
+            <a:lnRef idx="2">
+              <a:schemeClr val="accent1">
+                <a:shade val="50000"/>
+              </a:schemeClr>
+            </a:lnRef>
+            <a:fillRef idx="1">
+              <a:schemeClr val="accent1"/>
+            </a:fillRef>
+            <a:effectRef idx="0">
+              <a:schemeClr val="accent1"/>
+            </a:effectRef>
+            <a:fontRef idx="minor">
+              <a:schemeClr val="lt1"/>
+            </a:fontRef>
+          </p:style>
+          <p:txBody>
+            <a:bodyPr rtlCol="0" anchor="ctr"/>
+            <a:lstStyle/>
+            <a:p>
+              <a:pPr algn="ctr"/>
+              <a:endParaRPr lang="en-US" dirty="0"/>
+            </a:p>
+          </p:txBody>
+        </p:sp>
+        <p:sp>
+          <p:nvSpPr>
+            <p:cNvPr id="48" name="TextBox 47">
+              <a:extLst>
+                <a:ext uri="{FF2B5EF4-FFF2-40B4-BE49-F238E27FC236}">
+                  <a16:creationId xmlns:a16="http://schemas.microsoft.com/office/drawing/2014/main" id="{0F928012-80CE-8348-9A02-0FAB78DD3247}"/>
+                </a:ext>
+              </a:extLst>
+            </p:cNvPr>
+            <p:cNvSpPr txBox="1"/>
+            <p:nvPr/>
+          </p:nvSpPr>
+          <p:spPr>
+            <a:xfrm>
+              <a:off x="288318" y="5871094"/>
+              <a:ext cx="1405110" cy="461665"/>
+            </a:xfrm>
+            <a:prstGeom prst="rect">
+              <a:avLst/>
+            </a:prstGeom>
+            <a:solidFill>
+              <a:schemeClr val="bg1"/>
+            </a:solidFill>
+            <a:ln w="38100">
+              <a:solidFill>
+                <a:schemeClr val="accent1"/>
+              </a:solidFill>
+            </a:ln>
+          </p:spPr>
+          <p:txBody>
+            <a:bodyPr wrap="square" rtlCol="0">
+              <a:spAutoFit/>
+            </a:bodyPr>
+            <a:lstStyle/>
+            <a:p>
+              <a:pPr algn="ctr"/>
+              <a:r>
+                <a:rPr lang="en-US" sz="1200" i="1" dirty="0"/>
+                <a:t>JSOES</a:t>
+              </a:r>
+            </a:p>
+            <a:p>
+              <a:pPr algn="ctr"/>
+              <a:r>
+                <a:rPr lang="en-US" sz="1200" b="1" dirty="0"/>
+                <a:t>Juvenile salmon</a:t>
+              </a:r>
+            </a:p>
+          </p:txBody>
+        </p:sp>
+        <p:sp>
+          <p:nvSpPr>
+            <p:cNvPr id="46" name="TextBox 45">
+              <a:extLst>
+                <a:ext uri="{FF2B5EF4-FFF2-40B4-BE49-F238E27FC236}">
+                  <a16:creationId xmlns:a16="http://schemas.microsoft.com/office/drawing/2014/main" id="{5561BB60-F056-2343-9450-00BB1A1460CB}"/>
+                </a:ext>
+              </a:extLst>
+            </p:cNvPr>
+            <p:cNvSpPr txBox="1"/>
+            <p:nvPr/>
+          </p:nvSpPr>
+          <p:spPr>
+            <a:xfrm>
+              <a:off x="288364" y="5373316"/>
+              <a:ext cx="1405110" cy="461665"/>
+            </a:xfrm>
+            <a:prstGeom prst="rect">
+              <a:avLst/>
+            </a:prstGeom>
+            <a:solidFill>
+              <a:schemeClr val="bg1"/>
+            </a:solidFill>
+            <a:ln w="3175">
+              <a:solidFill>
+                <a:schemeClr val="tx1"/>
+              </a:solidFill>
+            </a:ln>
+          </p:spPr>
+          <p:txBody>
+            <a:bodyPr wrap="square" rtlCol="0">
+              <a:spAutoFit/>
+            </a:bodyPr>
+            <a:lstStyle/>
+            <a:p>
+              <a:pPr algn="ctr"/>
+              <a:r>
+                <a:rPr lang="en-US" sz="1200" i="1" dirty="0"/>
+                <a:t>JSOES</a:t>
+              </a:r>
+            </a:p>
+            <a:p>
+              <a:pPr algn="ctr"/>
+              <a:r>
+                <a:rPr lang="en-US" sz="1200" b="1" dirty="0"/>
+                <a:t>Seabirds</a:t>
+              </a:r>
+            </a:p>
+          </p:txBody>
+        </p:sp>
+      </p:grpSp>
+      <p:grpSp>
+        <p:nvGrpSpPr>
+          <p:cNvPr id="6" name="Group 5">
+            <a:extLst>
+              <a:ext uri="{FF2B5EF4-FFF2-40B4-BE49-F238E27FC236}">
+                <a16:creationId xmlns:a16="http://schemas.microsoft.com/office/drawing/2014/main" id="{B11C243D-4BDC-C14C-8AB8-DA65E8BA34DF}"/>
+              </a:ext>
+            </a:extLst>
+          </p:cNvPr>
+          <p:cNvGrpSpPr/>
+          <p:nvPr/>
+        </p:nvGrpSpPr>
+        <p:grpSpPr>
+          <a:xfrm>
+            <a:off x="581302" y="6018794"/>
+            <a:ext cx="1693102" cy="1282835"/>
+            <a:chOff x="3203615" y="2126436"/>
+            <a:chExt cx="1693102" cy="1282835"/>
+          </a:xfrm>
+        </p:grpSpPr>
+        <p:sp>
+          <p:nvSpPr>
+            <p:cNvPr id="53" name="Rounded Rectangle 52">
+              <a:extLst>
+                <a:ext uri="{FF2B5EF4-FFF2-40B4-BE49-F238E27FC236}">
+                  <a16:creationId xmlns:a16="http://schemas.microsoft.com/office/drawing/2014/main" id="{F1FDFC62-A918-4C4A-925F-A582094B174E}"/>
+                </a:ext>
+              </a:extLst>
+            </p:cNvPr>
+            <p:cNvSpPr/>
+            <p:nvPr/>
+          </p:nvSpPr>
+          <p:spPr>
+            <a:xfrm>
+              <a:off x="3203615" y="2126436"/>
+              <a:ext cx="1693102" cy="1282835"/>
+            </a:xfrm>
+            <a:prstGeom prst="roundRect">
+              <a:avLst/>
+            </a:prstGeom>
+            <a:solidFill>
+              <a:schemeClr val="accent6">
+                <a:alpha val="49000"/>
+              </a:schemeClr>
+            </a:solidFill>
+            <a:ln>
+              <a:solidFill>
+                <a:schemeClr val="accent6">
+                  <a:lumMod val="50000"/>
+                </a:schemeClr>
+              </a:solidFill>
+            </a:ln>
+          </p:spPr>
+          <p:style>
+            <a:lnRef idx="2">
+              <a:schemeClr val="accent1">
+                <a:shade val="50000"/>
+              </a:schemeClr>
+            </a:lnRef>
+            <a:fillRef idx="1">
+              <a:schemeClr val="accent1"/>
+            </a:fillRef>
+            <a:effectRef idx="0">
+              <a:schemeClr val="accent1"/>
+            </a:effectRef>
+            <a:fontRef idx="minor">
+              <a:schemeClr val="lt1"/>
+            </a:fontRef>
+          </p:style>
+          <p:txBody>
+            <a:bodyPr rtlCol="0" anchor="ctr"/>
+            <a:lstStyle/>
+            <a:p>
+              <a:pPr algn="ctr"/>
+              <a:endParaRPr lang="en-US"/>
+            </a:p>
+          </p:txBody>
+        </p:sp>
+        <p:sp>
+          <p:nvSpPr>
+            <p:cNvPr id="55" name="TextBox 54">
+              <a:extLst>
+                <a:ext uri="{FF2B5EF4-FFF2-40B4-BE49-F238E27FC236}">
+                  <a16:creationId xmlns:a16="http://schemas.microsoft.com/office/drawing/2014/main" id="{E5FB18EA-A38C-B143-9C31-2350BB0DAA64}"/>
+                </a:ext>
+              </a:extLst>
+            </p:cNvPr>
+            <p:cNvSpPr txBox="1"/>
+            <p:nvPr/>
+          </p:nvSpPr>
+          <p:spPr>
+            <a:xfrm>
+              <a:off x="3357225" y="2895099"/>
+              <a:ext cx="1405110" cy="461665"/>
+            </a:xfrm>
+            <a:prstGeom prst="rect">
+              <a:avLst/>
+            </a:prstGeom>
+            <a:solidFill>
+              <a:schemeClr val="bg1"/>
+            </a:solidFill>
+            <a:ln w="38100">
+              <a:solidFill>
+                <a:schemeClr val="accent1"/>
+              </a:solidFill>
+            </a:ln>
+          </p:spPr>
+          <p:txBody>
+            <a:bodyPr wrap="square" rtlCol="0">
+              <a:spAutoFit/>
+            </a:bodyPr>
+            <a:lstStyle/>
+            <a:p>
+              <a:pPr algn="ctr"/>
+              <a:r>
+                <a:rPr lang="en-US" sz="1200" i="1" dirty="0"/>
+                <a:t>JSOES</a:t>
+              </a:r>
+            </a:p>
+            <a:p>
+              <a:pPr algn="ctr"/>
+              <a:r>
+                <a:rPr lang="en-US" sz="1200" b="1" dirty="0"/>
+                <a:t>Juvenile salmon</a:t>
+              </a:r>
+            </a:p>
+          </p:txBody>
+        </p:sp>
+        <p:sp>
+          <p:nvSpPr>
+            <p:cNvPr id="37" name="TextBox 36">
+              <a:extLst>
+                <a:ext uri="{FF2B5EF4-FFF2-40B4-BE49-F238E27FC236}">
+                  <a16:creationId xmlns:a16="http://schemas.microsoft.com/office/drawing/2014/main" id="{99AACD76-CF12-0E4D-BDA9-9FD2149CE98B}"/>
+                </a:ext>
+              </a:extLst>
+            </p:cNvPr>
+            <p:cNvSpPr txBox="1"/>
+            <p:nvPr/>
+          </p:nvSpPr>
+          <p:spPr>
+            <a:xfrm>
+              <a:off x="3356151" y="2189497"/>
+              <a:ext cx="1405110" cy="646331"/>
+            </a:xfrm>
+            <a:prstGeom prst="rect">
+              <a:avLst/>
+            </a:prstGeom>
+            <a:solidFill>
+              <a:schemeClr val="bg1"/>
+            </a:solidFill>
+            <a:ln w="3175">
+              <a:solidFill>
+                <a:schemeClr val="tx1"/>
+              </a:solidFill>
+            </a:ln>
+          </p:spPr>
+          <p:txBody>
+            <a:bodyPr wrap="square" rtlCol="0">
+              <a:spAutoFit/>
+            </a:bodyPr>
+            <a:lstStyle/>
+            <a:p>
+              <a:pPr algn="ctr"/>
+              <a:r>
+                <a:rPr lang="en-US" sz="1200" i="1" dirty="0"/>
+                <a:t>PRS</a:t>
+              </a:r>
+            </a:p>
+            <a:p>
+              <a:pPr algn="ctr"/>
+              <a:r>
+                <a:rPr lang="en-US" sz="1200" b="1" dirty="0"/>
+                <a:t>Larval/juvenile rockfishes</a:t>
+              </a:r>
+            </a:p>
+          </p:txBody>
+        </p:sp>
+      </p:grpSp>
+      <p:grpSp>
+        <p:nvGrpSpPr>
+          <p:cNvPr id="57" name="Group 56">
+            <a:extLst>
+              <a:ext uri="{FF2B5EF4-FFF2-40B4-BE49-F238E27FC236}">
+                <a16:creationId xmlns:a16="http://schemas.microsoft.com/office/drawing/2014/main" id="{72DA78B8-AF80-3B40-850B-A1C4CD9439D5}"/>
+              </a:ext>
+            </a:extLst>
+          </p:cNvPr>
+          <p:cNvGrpSpPr/>
+          <p:nvPr/>
+        </p:nvGrpSpPr>
+        <p:grpSpPr>
+          <a:xfrm>
+            <a:off x="157038" y="4785168"/>
+            <a:ext cx="1815476" cy="1195094"/>
+            <a:chOff x="44017" y="5266299"/>
+            <a:chExt cx="1815476" cy="1195094"/>
+          </a:xfrm>
+        </p:grpSpPr>
+        <p:sp>
+          <p:nvSpPr>
+            <p:cNvPr id="58" name="Rounded Rectangle 57">
+              <a:extLst>
+                <a:ext uri="{FF2B5EF4-FFF2-40B4-BE49-F238E27FC236}">
+                  <a16:creationId xmlns:a16="http://schemas.microsoft.com/office/drawing/2014/main" id="{F304AB10-CEDE-494F-98DB-BBDE8F779CA5}"/>
+                </a:ext>
+              </a:extLst>
+            </p:cNvPr>
+            <p:cNvSpPr/>
+            <p:nvPr/>
+          </p:nvSpPr>
+          <p:spPr>
+            <a:xfrm>
+              <a:off x="44017" y="5266299"/>
+              <a:ext cx="1815476" cy="1195094"/>
+            </a:xfrm>
+            <a:prstGeom prst="roundRect">
+              <a:avLst/>
+            </a:prstGeom>
+            <a:solidFill>
+              <a:schemeClr val="accent6">
+                <a:alpha val="49000"/>
+              </a:schemeClr>
+            </a:solidFill>
+            <a:ln>
+              <a:solidFill>
+                <a:schemeClr val="accent6">
+                  <a:lumMod val="50000"/>
+                </a:schemeClr>
+              </a:solidFill>
+            </a:ln>
+          </p:spPr>
+          <p:style>
+            <a:lnRef idx="2">
+              <a:schemeClr val="accent1">
+                <a:shade val="50000"/>
+              </a:schemeClr>
+            </a:lnRef>
+            <a:fillRef idx="1">
+              <a:schemeClr val="accent1"/>
+            </a:fillRef>
+            <a:effectRef idx="0">
+              <a:schemeClr val="accent1"/>
+            </a:effectRef>
+            <a:fontRef idx="minor">
+              <a:schemeClr val="lt1"/>
+            </a:fontRef>
+          </p:style>
+          <p:txBody>
+            <a:bodyPr rtlCol="0" anchor="ctr"/>
+            <a:lstStyle/>
+            <a:p>
+              <a:pPr algn="ctr"/>
+              <a:endParaRPr lang="en-US" dirty="0"/>
+            </a:p>
+          </p:txBody>
+        </p:sp>
+        <p:sp>
+          <p:nvSpPr>
+            <p:cNvPr id="59" name="TextBox 58">
+              <a:extLst>
+                <a:ext uri="{FF2B5EF4-FFF2-40B4-BE49-F238E27FC236}">
+                  <a16:creationId xmlns:a16="http://schemas.microsoft.com/office/drawing/2014/main" id="{B4E70321-F5B3-1C40-AB6E-63CD9124C316}"/>
+                </a:ext>
+              </a:extLst>
+            </p:cNvPr>
+            <p:cNvSpPr txBox="1"/>
+            <p:nvPr/>
+          </p:nvSpPr>
+          <p:spPr>
+            <a:xfrm>
+              <a:off x="288318" y="5871094"/>
+              <a:ext cx="1405110" cy="461665"/>
+            </a:xfrm>
+            <a:prstGeom prst="rect">
+              <a:avLst/>
+            </a:prstGeom>
+            <a:solidFill>
+              <a:schemeClr val="bg1"/>
+            </a:solidFill>
+            <a:ln w="38100">
+              <a:solidFill>
+                <a:schemeClr val="accent1"/>
+              </a:solidFill>
+            </a:ln>
+          </p:spPr>
+          <p:txBody>
+            <a:bodyPr wrap="square" rtlCol="0">
+              <a:spAutoFit/>
+            </a:bodyPr>
+            <a:lstStyle/>
+            <a:p>
+              <a:pPr algn="ctr"/>
+              <a:r>
+                <a:rPr lang="en-US" sz="1200" i="1" dirty="0"/>
+                <a:t>JSOES</a:t>
+              </a:r>
+            </a:p>
+            <a:p>
+              <a:pPr algn="ctr"/>
+              <a:r>
+                <a:rPr lang="en-US" sz="1200" b="1" dirty="0"/>
+                <a:t>Juvenile salmon</a:t>
+              </a:r>
+            </a:p>
+          </p:txBody>
+        </p:sp>
+        <p:sp>
+          <p:nvSpPr>
+            <p:cNvPr id="60" name="TextBox 59">
+              <a:extLst>
+                <a:ext uri="{FF2B5EF4-FFF2-40B4-BE49-F238E27FC236}">
+                  <a16:creationId xmlns:a16="http://schemas.microsoft.com/office/drawing/2014/main" id="{5DF3EDFD-45E5-1348-B5A1-89BFECB4CB9E}"/>
+                </a:ext>
+              </a:extLst>
+            </p:cNvPr>
+            <p:cNvSpPr txBox="1"/>
+            <p:nvPr/>
+          </p:nvSpPr>
+          <p:spPr>
+            <a:xfrm>
+              <a:off x="288364" y="5373316"/>
+              <a:ext cx="1405110" cy="461665"/>
+            </a:xfrm>
+            <a:prstGeom prst="rect">
+              <a:avLst/>
+            </a:prstGeom>
+            <a:solidFill>
+              <a:schemeClr val="bg1"/>
+            </a:solidFill>
+            <a:ln w="3175">
+              <a:solidFill>
+                <a:schemeClr val="tx1"/>
+              </a:solidFill>
+            </a:ln>
+          </p:spPr>
+          <p:txBody>
+            <a:bodyPr wrap="square" rtlCol="0">
+              <a:spAutoFit/>
+            </a:bodyPr>
+            <a:lstStyle/>
+            <a:p>
+              <a:pPr algn="ctr"/>
+              <a:r>
+                <a:rPr lang="en-US" sz="1200" i="1" dirty="0"/>
+                <a:t>Hake, PRS</a:t>
+              </a:r>
+            </a:p>
+            <a:p>
+              <a:pPr algn="ctr"/>
+              <a:r>
+                <a:rPr lang="en-US" sz="1200" b="1" dirty="0"/>
+                <a:t>Euphausiids</a:t>
+              </a:r>
+            </a:p>
+          </p:txBody>
+        </p:sp>
+      </p:grpSp>
+      <p:grpSp>
+        <p:nvGrpSpPr>
+          <p:cNvPr id="61" name="Group 60">
+            <a:extLst>
+              <a:ext uri="{FF2B5EF4-FFF2-40B4-BE49-F238E27FC236}">
+                <a16:creationId xmlns:a16="http://schemas.microsoft.com/office/drawing/2014/main" id="{F6FE679E-1075-114E-BB65-4483BF0D2C48}"/>
+              </a:ext>
+            </a:extLst>
+          </p:cNvPr>
+          <p:cNvGrpSpPr/>
+          <p:nvPr/>
+        </p:nvGrpSpPr>
+        <p:grpSpPr>
+          <a:xfrm>
+            <a:off x="200071" y="1842371"/>
+            <a:ext cx="1693102" cy="1282835"/>
+            <a:chOff x="3203615" y="2126436"/>
+            <a:chExt cx="1693102" cy="1282835"/>
+          </a:xfrm>
+        </p:grpSpPr>
+        <p:sp>
+          <p:nvSpPr>
+            <p:cNvPr id="63" name="Rounded Rectangle 62">
+              <a:extLst>
+                <a:ext uri="{FF2B5EF4-FFF2-40B4-BE49-F238E27FC236}">
+                  <a16:creationId xmlns:a16="http://schemas.microsoft.com/office/drawing/2014/main" id="{2A6007A4-4517-1440-8A82-C4DE6ABF3C2E}"/>
+                </a:ext>
+              </a:extLst>
+            </p:cNvPr>
+            <p:cNvSpPr/>
+            <p:nvPr/>
+          </p:nvSpPr>
+          <p:spPr>
+            <a:xfrm>
+              <a:off x="3203615" y="2126436"/>
+              <a:ext cx="1693102" cy="1282835"/>
+            </a:xfrm>
+            <a:prstGeom prst="roundRect">
+              <a:avLst/>
+            </a:prstGeom>
+            <a:solidFill>
+              <a:srgbClr val="FF0000">
+                <a:alpha val="49000"/>
+              </a:srgbClr>
+            </a:solidFill>
+            <a:ln>
+              <a:solidFill>
+                <a:schemeClr val="accent6">
+                  <a:lumMod val="50000"/>
+                </a:schemeClr>
+              </a:solidFill>
+            </a:ln>
+          </p:spPr>
+          <p:style>
+            <a:lnRef idx="2">
+              <a:schemeClr val="accent1">
+                <a:shade val="50000"/>
+              </a:schemeClr>
+            </a:lnRef>
+            <a:fillRef idx="1">
+              <a:schemeClr val="accent1"/>
+            </a:fillRef>
+            <a:effectRef idx="0">
+              <a:schemeClr val="accent1"/>
+            </a:effectRef>
+            <a:fontRef idx="minor">
+              <a:schemeClr val="lt1"/>
+            </a:fontRef>
+          </p:style>
+          <p:txBody>
+            <a:bodyPr rtlCol="0" anchor="ctr"/>
+            <a:lstStyle/>
+            <a:p>
+              <a:pPr algn="ctr"/>
+              <a:endParaRPr lang="en-US"/>
+            </a:p>
+          </p:txBody>
+        </p:sp>
+        <p:sp>
+          <p:nvSpPr>
+            <p:cNvPr id="64" name="TextBox 63">
+              <a:extLst>
+                <a:ext uri="{FF2B5EF4-FFF2-40B4-BE49-F238E27FC236}">
+                  <a16:creationId xmlns:a16="http://schemas.microsoft.com/office/drawing/2014/main" id="{F2619B0A-022C-E843-9136-0A1D4B46F622}"/>
+                </a:ext>
+              </a:extLst>
+            </p:cNvPr>
+            <p:cNvSpPr txBox="1"/>
+            <p:nvPr/>
+          </p:nvSpPr>
+          <p:spPr>
+            <a:xfrm>
+              <a:off x="3357225" y="2895099"/>
+              <a:ext cx="1405110" cy="461665"/>
+            </a:xfrm>
+            <a:prstGeom prst="rect">
+              <a:avLst/>
+            </a:prstGeom>
+            <a:solidFill>
+              <a:schemeClr val="bg1"/>
+            </a:solidFill>
+            <a:ln w="38100">
+              <a:solidFill>
+                <a:schemeClr val="accent1"/>
+              </a:solidFill>
+            </a:ln>
+          </p:spPr>
+          <p:txBody>
+            <a:bodyPr wrap="square" rtlCol="0">
+              <a:spAutoFit/>
+            </a:bodyPr>
+            <a:lstStyle/>
+            <a:p>
+              <a:pPr algn="ctr"/>
+              <a:r>
+                <a:rPr lang="en-US" sz="1200" i="1" dirty="0"/>
+                <a:t>JSOES</a:t>
+              </a:r>
+            </a:p>
+            <a:p>
+              <a:pPr algn="ctr"/>
+              <a:r>
+                <a:rPr lang="en-US" sz="1200" b="1" dirty="0"/>
+                <a:t>Juvenile salmon</a:t>
+              </a:r>
+            </a:p>
+          </p:txBody>
+        </p:sp>
+        <p:sp>
+          <p:nvSpPr>
+            <p:cNvPr id="66" name="TextBox 65">
+              <a:extLst>
+                <a:ext uri="{FF2B5EF4-FFF2-40B4-BE49-F238E27FC236}">
+                  <a16:creationId xmlns:a16="http://schemas.microsoft.com/office/drawing/2014/main" id="{DA3437DF-FB68-4A4B-BDB2-260288ED9549}"/>
+                </a:ext>
+              </a:extLst>
+            </p:cNvPr>
+            <p:cNvSpPr txBox="1"/>
+            <p:nvPr/>
+          </p:nvSpPr>
+          <p:spPr>
+            <a:xfrm>
+              <a:off x="3356151" y="2189497"/>
+              <a:ext cx="1405110" cy="646331"/>
+            </a:xfrm>
+            <a:prstGeom prst="rect">
+              <a:avLst/>
+            </a:prstGeom>
+            <a:solidFill>
+              <a:schemeClr val="bg1"/>
+            </a:solidFill>
+            <a:ln w="3175">
+              <a:solidFill>
+                <a:schemeClr val="tx1"/>
+              </a:solidFill>
+            </a:ln>
+          </p:spPr>
+          <p:txBody>
+            <a:bodyPr wrap="square" rtlCol="0">
+              <a:spAutoFit/>
+            </a:bodyPr>
+            <a:lstStyle/>
+            <a:p>
+              <a:pPr algn="ctr"/>
+              <a:r>
+                <a:rPr lang="en-US" sz="1200" i="1" dirty="0"/>
+                <a:t>JSOES, PRS</a:t>
+              </a:r>
+            </a:p>
+            <a:p>
+              <a:pPr algn="ctr"/>
+              <a:r>
+                <a:rPr lang="en-US" sz="1200" b="1" dirty="0"/>
+                <a:t>Gelatinous zooplankton</a:t>
+              </a:r>
+            </a:p>
+          </p:txBody>
+        </p:sp>
+      </p:grpSp>
+      <p:grpSp>
+        <p:nvGrpSpPr>
+          <p:cNvPr id="77" name="Group 76">
+            <a:extLst>
+              <a:ext uri="{FF2B5EF4-FFF2-40B4-BE49-F238E27FC236}">
+                <a16:creationId xmlns:a16="http://schemas.microsoft.com/office/drawing/2014/main" id="{9A0191D6-2339-F746-9F33-44F6C26E85CD}"/>
+              </a:ext>
+            </a:extLst>
+          </p:cNvPr>
+          <p:cNvGrpSpPr/>
+          <p:nvPr/>
+        </p:nvGrpSpPr>
+        <p:grpSpPr>
+          <a:xfrm>
+            <a:off x="3646097" y="7467684"/>
+            <a:ext cx="1693102" cy="1282835"/>
+            <a:chOff x="3203615" y="2126436"/>
+            <a:chExt cx="1693102" cy="1282835"/>
+          </a:xfrm>
+        </p:grpSpPr>
+        <p:sp>
+          <p:nvSpPr>
+            <p:cNvPr id="78" name="Rounded Rectangle 77">
+              <a:extLst>
+                <a:ext uri="{FF2B5EF4-FFF2-40B4-BE49-F238E27FC236}">
+                  <a16:creationId xmlns:a16="http://schemas.microsoft.com/office/drawing/2014/main" id="{C4ADC00B-1988-1A4E-A162-C1753B0277E5}"/>
+                </a:ext>
+              </a:extLst>
+            </p:cNvPr>
+            <p:cNvSpPr/>
+            <p:nvPr/>
+          </p:nvSpPr>
+          <p:spPr>
+            <a:xfrm>
+              <a:off x="3203615" y="2126436"/>
+              <a:ext cx="1693102" cy="1282835"/>
+            </a:xfrm>
+            <a:prstGeom prst="roundRect">
+              <a:avLst/>
+            </a:prstGeom>
+            <a:solidFill>
+              <a:schemeClr val="accent6">
+                <a:alpha val="49000"/>
+              </a:schemeClr>
+            </a:solidFill>
+            <a:ln>
+              <a:solidFill>
+                <a:schemeClr val="accent6">
+                  <a:lumMod val="50000"/>
+                </a:schemeClr>
+              </a:solidFill>
+            </a:ln>
+          </p:spPr>
+          <p:style>
+            <a:lnRef idx="2">
+              <a:schemeClr val="accent1">
+                <a:shade val="50000"/>
+              </a:schemeClr>
+            </a:lnRef>
+            <a:fillRef idx="1">
+              <a:schemeClr val="accent1"/>
+            </a:fillRef>
+            <a:effectRef idx="0">
+              <a:schemeClr val="accent1"/>
+            </a:effectRef>
+            <a:fontRef idx="minor">
+              <a:schemeClr val="lt1"/>
+            </a:fontRef>
+          </p:style>
+          <p:txBody>
+            <a:bodyPr rtlCol="0" anchor="ctr"/>
+            <a:lstStyle/>
+            <a:p>
+              <a:pPr algn="ctr"/>
+              <a:endParaRPr lang="en-US"/>
+            </a:p>
+          </p:txBody>
+        </p:sp>
+        <p:sp>
+          <p:nvSpPr>
+            <p:cNvPr id="79" name="TextBox 78">
+              <a:extLst>
+                <a:ext uri="{FF2B5EF4-FFF2-40B4-BE49-F238E27FC236}">
+                  <a16:creationId xmlns:a16="http://schemas.microsoft.com/office/drawing/2014/main" id="{AD583EB4-A780-E544-9DB4-28406AFBC5E8}"/>
+                </a:ext>
+              </a:extLst>
+            </p:cNvPr>
+            <p:cNvSpPr txBox="1"/>
+            <p:nvPr/>
+          </p:nvSpPr>
+          <p:spPr>
+            <a:xfrm>
+              <a:off x="3357225" y="2895099"/>
+              <a:ext cx="1405110" cy="461665"/>
+            </a:xfrm>
+            <a:prstGeom prst="rect">
+              <a:avLst/>
+            </a:prstGeom>
+            <a:solidFill>
+              <a:schemeClr val="bg1"/>
+            </a:solidFill>
+            <a:ln w="38100">
+              <a:solidFill>
+                <a:schemeClr val="accent1"/>
+              </a:solidFill>
+            </a:ln>
+          </p:spPr>
+          <p:txBody>
+            <a:bodyPr wrap="square" rtlCol="0">
+              <a:spAutoFit/>
+            </a:bodyPr>
+            <a:lstStyle/>
+            <a:p>
+              <a:pPr algn="ctr"/>
+              <a:r>
+                <a:rPr lang="en-US" sz="1200" i="1" dirty="0"/>
+                <a:t>JSOES</a:t>
+              </a:r>
+            </a:p>
+            <a:p>
+              <a:pPr algn="ctr"/>
+              <a:r>
+                <a:rPr lang="en-US" sz="1200" b="1" dirty="0"/>
+                <a:t>Juvenile salmon</a:t>
+              </a:r>
+            </a:p>
+          </p:txBody>
+        </p:sp>
+        <p:sp>
+          <p:nvSpPr>
+            <p:cNvPr id="80" name="TextBox 79">
+              <a:extLst>
+                <a:ext uri="{FF2B5EF4-FFF2-40B4-BE49-F238E27FC236}">
+                  <a16:creationId xmlns:a16="http://schemas.microsoft.com/office/drawing/2014/main" id="{9661983D-9B74-6D45-B7AF-9A7C8A2D106C}"/>
+                </a:ext>
+              </a:extLst>
+            </p:cNvPr>
+            <p:cNvSpPr txBox="1"/>
+            <p:nvPr/>
+          </p:nvSpPr>
+          <p:spPr>
+            <a:xfrm>
+              <a:off x="3356151" y="2189497"/>
+              <a:ext cx="1405110" cy="646331"/>
+            </a:xfrm>
+            <a:prstGeom prst="rect">
+              <a:avLst/>
+            </a:prstGeom>
+            <a:solidFill>
+              <a:schemeClr val="bg1"/>
+            </a:solidFill>
+            <a:ln w="3175">
+              <a:solidFill>
+                <a:schemeClr val="tx1"/>
+              </a:solidFill>
+            </a:ln>
+          </p:spPr>
+          <p:txBody>
+            <a:bodyPr wrap="square" rtlCol="0">
+              <a:spAutoFit/>
+            </a:bodyPr>
+            <a:lstStyle/>
+            <a:p>
+              <a:pPr algn="ctr"/>
+              <a:r>
+                <a:rPr lang="en-US" sz="1200" i="1" dirty="0"/>
+                <a:t>JSOES, PRS, Satellite</a:t>
+              </a:r>
+            </a:p>
+            <a:p>
+              <a:pPr algn="ctr"/>
+              <a:r>
+                <a:rPr lang="en-US" sz="1200" b="1" dirty="0"/>
+                <a:t>Phytoplankton</a:t>
+              </a:r>
+            </a:p>
+          </p:txBody>
+        </p:sp>
+      </p:grpSp>
+      <p:sp>
+        <p:nvSpPr>
+          <p:cNvPr id="81" name="Right Arrow 80">
+            <a:extLst>
+              <a:ext uri="{FF2B5EF4-FFF2-40B4-BE49-F238E27FC236}">
+                <a16:creationId xmlns:a16="http://schemas.microsoft.com/office/drawing/2014/main" id="{C777965D-B749-094F-850D-52350A9DD839}"/>
+              </a:ext>
+            </a:extLst>
+          </p:cNvPr>
+          <p:cNvSpPr/>
+          <p:nvPr/>
+        </p:nvSpPr>
+        <p:spPr>
+          <a:xfrm rot="10800000" flipH="1">
+            <a:off x="1987646" y="4133671"/>
+            <a:ext cx="1325880" cy="211866"/>
+          </a:xfrm>
+          <a:prstGeom prst="rightArrow">
+            <a:avLst/>
+          </a:prstGeom>
+          <a:solidFill>
+            <a:schemeClr val="tx1"/>
+          </a:solidFill>
+          <a:ln w="12700">
+            <a:solidFill>
+              <a:schemeClr val="tx1"/>
+            </a:solidFill>
+          </a:ln>
+        </p:spPr>
+        <p:style>
+          <a:lnRef idx="2">
+            <a:schemeClr val="accent1">
+              <a:shade val="50000"/>
+            </a:schemeClr>
+          </a:lnRef>
+          <a:fillRef idx="1">
+            <a:schemeClr val="accent1"/>
+          </a:fillRef>
+          <a:effectRef idx="0">
+            <a:schemeClr val="accent1"/>
+          </a:effectRef>
+          <a:fontRef idx="minor">
+            <a:schemeClr val="lt1"/>
+          </a:fontRef>
+        </p:style>
+        <p:txBody>
+          <a:bodyPr rot="0" spcFirstLastPara="0" vertOverflow="overflow" horzOverflow="overflow" vert="horz" wrap="square" lIns="91440" tIns="45720" rIns="91440" bIns="45720" numCol="1" spcCol="0" rtlCol="0" fromWordArt="0" anchor="ctr" anchorCtr="0" forceAA="0" compatLnSpc="1">
+            <a:prstTxWarp prst="textNoShape">
+              <a:avLst/>
+            </a:prstTxWarp>
+            <a:noAutofit/>
+          </a:bodyPr>
+          <a:lstStyle/>
+          <a:p>
+            <a:pPr algn="ctr"/>
+            <a:endParaRPr lang="en-US" sz="1200"/>
+          </a:p>
+        </p:txBody>
+      </p:sp>
+      <p:sp>
+        <p:nvSpPr>
+          <p:cNvPr id="82" name="Right Arrow 81">
+            <a:extLst>
+              <a:ext uri="{FF2B5EF4-FFF2-40B4-BE49-F238E27FC236}">
+                <a16:creationId xmlns:a16="http://schemas.microsoft.com/office/drawing/2014/main" id="{BB46D112-C627-3D46-B52C-70CB7BBC1486}"/>
+              </a:ext>
+            </a:extLst>
+          </p:cNvPr>
+          <p:cNvSpPr/>
+          <p:nvPr/>
+        </p:nvSpPr>
+        <p:spPr>
+          <a:xfrm rot="12855277" flipH="1">
+            <a:off x="1793638" y="3384817"/>
+            <a:ext cx="1693832" cy="209253"/>
+          </a:xfrm>
+          <a:prstGeom prst="rightArrow">
+            <a:avLst/>
+          </a:prstGeom>
+          <a:solidFill>
+            <a:schemeClr val="tx1"/>
+          </a:solidFill>
+          <a:ln w="12700">
+            <a:solidFill>
+              <a:schemeClr val="tx1"/>
+            </a:solidFill>
+          </a:ln>
+        </p:spPr>
+        <p:style>
+          <a:lnRef idx="2">
+            <a:schemeClr val="accent1">
+              <a:shade val="50000"/>
+            </a:schemeClr>
+          </a:lnRef>
+          <a:fillRef idx="1">
+            <a:schemeClr val="accent1"/>
+          </a:fillRef>
+          <a:effectRef idx="0">
+            <a:schemeClr val="accent1"/>
+          </a:effectRef>
+          <a:fontRef idx="minor">
+            <a:schemeClr val="lt1"/>
+          </a:fontRef>
+        </p:style>
+        <p:txBody>
+          <a:bodyPr rot="0" spcFirstLastPara="0" vertOverflow="overflow" horzOverflow="overflow" vert="horz" wrap="square" lIns="91440" tIns="45720" rIns="91440" bIns="45720" numCol="1" spcCol="0" rtlCol="0" fromWordArt="0" anchor="ctr" anchorCtr="0" forceAA="0" compatLnSpc="1">
+            <a:prstTxWarp prst="textNoShape">
+              <a:avLst/>
+            </a:prstTxWarp>
+            <a:noAutofit/>
+          </a:bodyPr>
+          <a:lstStyle/>
+          <a:p>
+            <a:pPr algn="ctr"/>
+            <a:endParaRPr lang="en-US" sz="1200"/>
+          </a:p>
+        </p:txBody>
+      </p:sp>
+      <p:sp>
+        <p:nvSpPr>
+          <p:cNvPr id="83" name="Right Arrow 82">
+            <a:extLst>
+              <a:ext uri="{FF2B5EF4-FFF2-40B4-BE49-F238E27FC236}">
+                <a16:creationId xmlns:a16="http://schemas.microsoft.com/office/drawing/2014/main" id="{00A1A859-1FA9-CB40-90E3-AD07574AEE8E}"/>
+              </a:ext>
+            </a:extLst>
+          </p:cNvPr>
+          <p:cNvSpPr/>
+          <p:nvPr/>
+        </p:nvSpPr>
+        <p:spPr>
+          <a:xfrm rot="8347912" flipH="1">
+            <a:off x="2166965" y="5616029"/>
+            <a:ext cx="1693832" cy="209253"/>
+          </a:xfrm>
+          <a:prstGeom prst="rightArrow">
+            <a:avLst/>
+          </a:prstGeom>
+          <a:solidFill>
+            <a:schemeClr val="tx1"/>
+          </a:solidFill>
+          <a:ln w="12700">
+            <a:solidFill>
+              <a:schemeClr val="tx1"/>
+            </a:solidFill>
+          </a:ln>
+        </p:spPr>
+        <p:style>
+          <a:lnRef idx="2">
+            <a:schemeClr val="accent1">
+              <a:shade val="50000"/>
+            </a:schemeClr>
+          </a:lnRef>
+          <a:fillRef idx="1">
+            <a:schemeClr val="accent1"/>
+          </a:fillRef>
+          <a:effectRef idx="0">
+            <a:schemeClr val="accent1"/>
+          </a:effectRef>
+          <a:fontRef idx="minor">
+            <a:schemeClr val="lt1"/>
+          </a:fontRef>
+        </p:style>
+        <p:txBody>
+          <a:bodyPr rot="0" spcFirstLastPara="0" vertOverflow="overflow" horzOverflow="overflow" vert="horz" wrap="square" lIns="91440" tIns="45720" rIns="91440" bIns="45720" numCol="1" spcCol="0" rtlCol="0" fromWordArt="0" anchor="ctr" anchorCtr="0" forceAA="0" compatLnSpc="1">
+            <a:prstTxWarp prst="textNoShape">
+              <a:avLst/>
+            </a:prstTxWarp>
+            <a:noAutofit/>
+          </a:bodyPr>
+          <a:lstStyle/>
+          <a:p>
+            <a:pPr algn="ctr"/>
+            <a:endParaRPr lang="en-US" sz="1200"/>
+          </a:p>
+        </p:txBody>
+      </p:sp>
+      <p:sp>
+        <p:nvSpPr>
+          <p:cNvPr id="84" name="Right Arrow 83">
+            <a:extLst>
+              <a:ext uri="{FF2B5EF4-FFF2-40B4-BE49-F238E27FC236}">
+                <a16:creationId xmlns:a16="http://schemas.microsoft.com/office/drawing/2014/main" id="{07C10C93-E6B7-754B-B89E-53C3D57F4385}"/>
+              </a:ext>
+            </a:extLst>
+          </p:cNvPr>
+          <p:cNvSpPr/>
+          <p:nvPr/>
+        </p:nvSpPr>
+        <p:spPr>
+          <a:xfrm rot="6826011" flipH="1">
+            <a:off x="2528924" y="6118039"/>
+            <a:ext cx="2247409" cy="211691"/>
+          </a:xfrm>
+          <a:prstGeom prst="rightArrow">
+            <a:avLst/>
+          </a:prstGeom>
+          <a:solidFill>
+            <a:schemeClr val="tx1"/>
+          </a:solidFill>
+          <a:ln w="12700">
+            <a:solidFill>
+              <a:schemeClr val="tx1"/>
+            </a:solidFill>
+          </a:ln>
+        </p:spPr>
+        <p:style>
+          <a:lnRef idx="2">
+            <a:schemeClr val="accent1">
+              <a:shade val="50000"/>
+            </a:schemeClr>
+          </a:lnRef>
+          <a:fillRef idx="1">
+            <a:schemeClr val="accent1"/>
+          </a:fillRef>
+          <a:effectRef idx="0">
+            <a:schemeClr val="accent1"/>
+          </a:effectRef>
+          <a:fontRef idx="minor">
+            <a:schemeClr val="lt1"/>
+          </a:fontRef>
+        </p:style>
+        <p:txBody>
+          <a:bodyPr rot="0" spcFirstLastPara="0" vertOverflow="overflow" horzOverflow="overflow" vert="horz" wrap="square" lIns="91440" tIns="45720" rIns="91440" bIns="45720" numCol="1" spcCol="0" rtlCol="0" fromWordArt="0" anchor="ctr" anchorCtr="0" forceAA="0" compatLnSpc="1">
+            <a:prstTxWarp prst="textNoShape">
+              <a:avLst/>
+            </a:prstTxWarp>
+            <a:noAutofit/>
+          </a:bodyPr>
+          <a:lstStyle/>
+          <a:p>
+            <a:pPr algn="ctr"/>
+            <a:endParaRPr lang="en-US" sz="1200"/>
+          </a:p>
+        </p:txBody>
+      </p:sp>
+      <p:sp>
+        <p:nvSpPr>
+          <p:cNvPr id="85" name="Right Arrow 84">
+            <a:extLst>
+              <a:ext uri="{FF2B5EF4-FFF2-40B4-BE49-F238E27FC236}">
+                <a16:creationId xmlns:a16="http://schemas.microsoft.com/office/drawing/2014/main" id="{610A1CE2-A728-1C49-8324-ACA9A147AACA}"/>
+              </a:ext>
+            </a:extLst>
+          </p:cNvPr>
+          <p:cNvSpPr/>
+          <p:nvPr/>
+        </p:nvSpPr>
+        <p:spPr>
+          <a:xfrm rot="5400000" flipH="1">
+            <a:off x="3321727" y="6196477"/>
+            <a:ext cx="2247409" cy="211691"/>
+          </a:xfrm>
+          <a:prstGeom prst="rightArrow">
+            <a:avLst/>
+          </a:prstGeom>
+          <a:solidFill>
+            <a:schemeClr val="tx1"/>
+          </a:solidFill>
+          <a:ln w="12700">
+            <a:solidFill>
+              <a:schemeClr val="tx1"/>
+            </a:solidFill>
+          </a:ln>
+        </p:spPr>
+        <p:style>
+          <a:lnRef idx="2">
+            <a:schemeClr val="accent1">
+              <a:shade val="50000"/>
+            </a:schemeClr>
+          </a:lnRef>
+          <a:fillRef idx="1">
+            <a:schemeClr val="accent1"/>
+          </a:fillRef>
+          <a:effectRef idx="0">
+            <a:schemeClr val="accent1"/>
+          </a:effectRef>
+          <a:fontRef idx="minor">
+            <a:schemeClr val="lt1"/>
+          </a:fontRef>
+        </p:style>
+        <p:txBody>
+          <a:bodyPr rot="0" spcFirstLastPara="0" vertOverflow="overflow" horzOverflow="overflow" vert="horz" wrap="square" lIns="91440" tIns="45720" rIns="91440" bIns="45720" numCol="1" spcCol="0" rtlCol="0" fromWordArt="0" anchor="ctr" anchorCtr="0" forceAA="0" compatLnSpc="1">
+            <a:prstTxWarp prst="textNoShape">
+              <a:avLst/>
+            </a:prstTxWarp>
+            <a:noAutofit/>
+          </a:bodyPr>
+          <a:lstStyle/>
+          <a:p>
+            <a:pPr algn="ctr"/>
+            <a:endParaRPr lang="en-US" sz="1200"/>
+          </a:p>
+        </p:txBody>
+      </p:sp>
+      <p:sp>
+        <p:nvSpPr>
+          <p:cNvPr id="86" name="Right Arrow 85">
+            <a:extLst>
+              <a:ext uri="{FF2B5EF4-FFF2-40B4-BE49-F238E27FC236}">
+                <a16:creationId xmlns:a16="http://schemas.microsoft.com/office/drawing/2014/main" id="{8F3F62D5-9FB0-C54B-A213-7D267FAF25FC}"/>
+              </a:ext>
+            </a:extLst>
+          </p:cNvPr>
+          <p:cNvSpPr/>
+          <p:nvPr/>
+        </p:nvSpPr>
+        <p:spPr>
+          <a:xfrm rot="14227185" flipH="1">
+            <a:off x="2989688" y="3123913"/>
+            <a:ext cx="1325880" cy="211866"/>
+          </a:xfrm>
+          <a:prstGeom prst="rightArrow">
+            <a:avLst/>
+          </a:prstGeom>
+          <a:solidFill>
+            <a:schemeClr val="tx1"/>
+          </a:solidFill>
+          <a:ln w="12700">
+            <a:solidFill>
+              <a:schemeClr val="tx1"/>
+            </a:solidFill>
+          </a:ln>
+        </p:spPr>
+        <p:style>
+          <a:lnRef idx="2">
+            <a:schemeClr val="accent1">
+              <a:shade val="50000"/>
+            </a:schemeClr>
+          </a:lnRef>
+          <a:fillRef idx="1">
+            <a:schemeClr val="accent1"/>
+          </a:fillRef>
+          <a:effectRef idx="0">
+            <a:schemeClr val="accent1"/>
+          </a:effectRef>
+          <a:fontRef idx="minor">
+            <a:schemeClr val="lt1"/>
+          </a:fontRef>
+        </p:style>
+        <p:txBody>
+          <a:bodyPr rot="0" spcFirstLastPara="0" vertOverflow="overflow" horzOverflow="overflow" vert="horz" wrap="square" lIns="91440" tIns="45720" rIns="91440" bIns="45720" numCol="1" spcCol="0" rtlCol="0" fromWordArt="0" anchor="ctr" anchorCtr="0" forceAA="0" compatLnSpc="1">
+            <a:prstTxWarp prst="textNoShape">
+              <a:avLst/>
+            </a:prstTxWarp>
+            <a:noAutofit/>
+          </a:bodyPr>
+          <a:lstStyle/>
+          <a:p>
+            <a:pPr algn="ctr"/>
+            <a:endParaRPr lang="en-US" sz="1200"/>
+          </a:p>
+        </p:txBody>
+      </p:sp>
+      <p:sp>
+        <p:nvSpPr>
+          <p:cNvPr id="87" name="Right Arrow 86">
+            <a:extLst>
+              <a:ext uri="{FF2B5EF4-FFF2-40B4-BE49-F238E27FC236}">
+                <a16:creationId xmlns:a16="http://schemas.microsoft.com/office/drawing/2014/main" id="{7E20D9FA-505D-BB4C-84B8-5CE767F4BC8F}"/>
+              </a:ext>
+            </a:extLst>
+          </p:cNvPr>
+          <p:cNvSpPr/>
+          <p:nvPr/>
+        </p:nvSpPr>
+        <p:spPr>
+          <a:xfrm rot="16200000" flipH="1">
+            <a:off x="3929780" y="3042262"/>
+            <a:ext cx="1325880" cy="211866"/>
+          </a:xfrm>
+          <a:prstGeom prst="rightArrow">
+            <a:avLst/>
+          </a:prstGeom>
+          <a:solidFill>
+            <a:schemeClr val="tx1"/>
+          </a:solidFill>
+          <a:ln w="12700">
+            <a:solidFill>
+              <a:schemeClr val="tx1"/>
+            </a:solidFill>
+          </a:ln>
+        </p:spPr>
+        <p:style>
+          <a:lnRef idx="2">
+            <a:schemeClr val="accent1">
+              <a:shade val="50000"/>
+            </a:schemeClr>
+          </a:lnRef>
+          <a:fillRef idx="1">
+            <a:schemeClr val="accent1"/>
+          </a:fillRef>
+          <a:effectRef idx="0">
+            <a:schemeClr val="accent1"/>
+          </a:effectRef>
+          <a:fontRef idx="minor">
+            <a:schemeClr val="lt1"/>
+          </a:fontRef>
+        </p:style>
+        <p:txBody>
+          <a:bodyPr rot="0" spcFirstLastPara="0" vertOverflow="overflow" horzOverflow="overflow" vert="horz" wrap="square" lIns="91440" tIns="45720" rIns="91440" bIns="45720" numCol="1" spcCol="0" rtlCol="0" fromWordArt="0" anchor="ctr" anchorCtr="0" forceAA="0" compatLnSpc="1">
+            <a:prstTxWarp prst="textNoShape">
+              <a:avLst/>
+            </a:prstTxWarp>
+            <a:noAutofit/>
+          </a:bodyPr>
+          <a:lstStyle/>
+          <a:p>
+            <a:pPr algn="ctr"/>
+            <a:endParaRPr lang="en-US" sz="1200"/>
+          </a:p>
+        </p:txBody>
+      </p:sp>
+    </p:spTree>
+    <p:extLst>
+      <p:ext uri="{BB962C8B-B14F-4D97-AF65-F5344CB8AC3E}">
+        <p14:creationId xmlns:p14="http://schemas.microsoft.com/office/powerpoint/2010/main" val="3371865982"/>
       </p:ext>
     </p:extLst>
   </p:cSld>

</xml_diff>

<commit_message>
lots of website updates
</commit_message>
<xml_diff>
--- a/docs/model_dag.pptx
+++ b/docs/model_dag.pptx
@@ -246,7 +246,7 @@
           <a:p>
             <a:fld id="{4E348793-E847-104E-A4BF-895FFE80E6AE}" type="datetimeFigureOut">
               <a:rPr lang="en-US" smtClean="0"/>
-              <a:t>1/15/25</a:t>
+              <a:t>1/23/25</a:t>
             </a:fld>
             <a:endParaRPr lang="en-US"/>
           </a:p>
@@ -416,7 +416,7 @@
           <a:p>
             <a:fld id="{4E348793-E847-104E-A4BF-895FFE80E6AE}" type="datetimeFigureOut">
               <a:rPr lang="en-US" smtClean="0"/>
-              <a:t>1/15/25</a:t>
+              <a:t>1/23/25</a:t>
             </a:fld>
             <a:endParaRPr lang="en-US"/>
           </a:p>
@@ -596,7 +596,7 @@
           <a:p>
             <a:fld id="{4E348793-E847-104E-A4BF-895FFE80E6AE}" type="datetimeFigureOut">
               <a:rPr lang="en-US" smtClean="0"/>
-              <a:t>1/15/25</a:t>
+              <a:t>1/23/25</a:t>
             </a:fld>
             <a:endParaRPr lang="en-US"/>
           </a:p>
@@ -766,7 +766,7 @@
           <a:p>
             <a:fld id="{4E348793-E847-104E-A4BF-895FFE80E6AE}" type="datetimeFigureOut">
               <a:rPr lang="en-US" smtClean="0"/>
-              <a:t>1/15/25</a:t>
+              <a:t>1/23/25</a:t>
             </a:fld>
             <a:endParaRPr lang="en-US"/>
           </a:p>
@@ -1010,7 +1010,7 @@
           <a:p>
             <a:fld id="{4E348793-E847-104E-A4BF-895FFE80E6AE}" type="datetimeFigureOut">
               <a:rPr lang="en-US" smtClean="0"/>
-              <a:t>1/15/25</a:t>
+              <a:t>1/23/25</a:t>
             </a:fld>
             <a:endParaRPr lang="en-US"/>
           </a:p>
@@ -1242,7 +1242,7 @@
           <a:p>
             <a:fld id="{4E348793-E847-104E-A4BF-895FFE80E6AE}" type="datetimeFigureOut">
               <a:rPr lang="en-US" smtClean="0"/>
-              <a:t>1/15/25</a:t>
+              <a:t>1/23/25</a:t>
             </a:fld>
             <a:endParaRPr lang="en-US"/>
           </a:p>
@@ -1609,7 +1609,7 @@
           <a:p>
             <a:fld id="{4E348793-E847-104E-A4BF-895FFE80E6AE}" type="datetimeFigureOut">
               <a:rPr lang="en-US" smtClean="0"/>
-              <a:t>1/15/25</a:t>
+              <a:t>1/23/25</a:t>
             </a:fld>
             <a:endParaRPr lang="en-US"/>
           </a:p>
@@ -1727,7 +1727,7 @@
           <a:p>
             <a:fld id="{4E348793-E847-104E-A4BF-895FFE80E6AE}" type="datetimeFigureOut">
               <a:rPr lang="en-US" smtClean="0"/>
-              <a:t>1/15/25</a:t>
+              <a:t>1/23/25</a:t>
             </a:fld>
             <a:endParaRPr lang="en-US"/>
           </a:p>
@@ -1822,7 +1822,7 @@
           <a:p>
             <a:fld id="{4E348793-E847-104E-A4BF-895FFE80E6AE}" type="datetimeFigureOut">
               <a:rPr lang="en-US" smtClean="0"/>
-              <a:t>1/15/25</a:t>
+              <a:t>1/23/25</a:t>
             </a:fld>
             <a:endParaRPr lang="en-US"/>
           </a:p>
@@ -2099,7 +2099,7 @@
           <a:p>
             <a:fld id="{4E348793-E847-104E-A4BF-895FFE80E6AE}" type="datetimeFigureOut">
               <a:rPr lang="en-US" smtClean="0"/>
-              <a:t>1/15/25</a:t>
+              <a:t>1/23/25</a:t>
             </a:fld>
             <a:endParaRPr lang="en-US"/>
           </a:p>
@@ -2356,7 +2356,7 @@
           <a:p>
             <a:fld id="{4E348793-E847-104E-A4BF-895FFE80E6AE}" type="datetimeFigureOut">
               <a:rPr lang="en-US" smtClean="0"/>
-              <a:t>1/15/25</a:t>
+              <a:t>1/23/25</a:t>
             </a:fld>
             <a:endParaRPr lang="en-US"/>
           </a:p>
@@ -2569,7 +2569,7 @@
           <a:p>
             <a:fld id="{4E348793-E847-104E-A4BF-895FFE80E6AE}" type="datetimeFigureOut">
               <a:rPr lang="en-US" smtClean="0"/>
-              <a:t>1/15/25</a:t>
+              <a:t>1/23/25</a:t>
             </a:fld>
             <a:endParaRPr lang="en-US"/>
           </a:p>
@@ -8455,185 +8455,222 @@
           <a:chExt cx="0" cy="0"/>
         </a:xfrm>
       </p:grpSpPr>
-      <p:grpSp>
-        <p:nvGrpSpPr>
-          <p:cNvPr id="5" name="Group 4">
-            <a:extLst>
-              <a:ext uri="{FF2B5EF4-FFF2-40B4-BE49-F238E27FC236}">
-                <a16:creationId xmlns:a16="http://schemas.microsoft.com/office/drawing/2014/main" id="{B4BBCA8D-7ADA-FA42-BFBD-18617420A328}"/>
-              </a:ext>
-            </a:extLst>
-          </p:cNvPr>
-          <p:cNvGrpSpPr/>
-          <p:nvPr/>
-        </p:nvGrpSpPr>
-        <p:grpSpPr>
+      <p:sp>
+        <p:nvSpPr>
+          <p:cNvPr id="47" name="Rounded Rectangle 46">
+            <a:extLst>
+              <a:ext uri="{FF2B5EF4-FFF2-40B4-BE49-F238E27FC236}">
+                <a16:creationId xmlns:a16="http://schemas.microsoft.com/office/drawing/2014/main" id="{A125D975-44A0-9249-9123-5BEC0E53A1D4}"/>
+              </a:ext>
+            </a:extLst>
+          </p:cNvPr>
+          <p:cNvSpPr/>
+          <p:nvPr/>
+        </p:nvSpPr>
+        <p:spPr>
+          <a:xfrm>
+            <a:off x="802671" y="3173348"/>
+            <a:ext cx="1097280" cy="1563678"/>
+          </a:xfrm>
+          <a:prstGeom prst="roundRect">
+            <a:avLst/>
+          </a:prstGeom>
+          <a:solidFill>
+            <a:srgbClr val="FF0000">
+              <a:alpha val="49000"/>
+            </a:srgbClr>
+          </a:solidFill>
+          <a:ln>
+            <a:solidFill>
+              <a:schemeClr val="accent6">
+                <a:lumMod val="50000"/>
+              </a:schemeClr>
+            </a:solidFill>
+          </a:ln>
+        </p:spPr>
+        <p:style>
+          <a:lnRef idx="2">
+            <a:schemeClr val="accent1">
+              <a:shade val="50000"/>
+            </a:schemeClr>
+          </a:lnRef>
+          <a:fillRef idx="1">
+            <a:schemeClr val="accent1"/>
+          </a:fillRef>
+          <a:effectRef idx="0">
+            <a:schemeClr val="accent1"/>
+          </a:effectRef>
+          <a:fontRef idx="minor">
+            <a:schemeClr val="lt1"/>
+          </a:fontRef>
+        </p:style>
+        <p:txBody>
+          <a:bodyPr rtlCol="0" anchor="ctr"/>
+          <a:lstStyle/>
+          <a:p>
+            <a:pPr algn="ctr"/>
+            <a:endParaRPr lang="en-US"/>
+          </a:p>
+        </p:txBody>
+      </p:sp>
+      <p:sp>
+        <p:nvSpPr>
+          <p:cNvPr id="3" name="Rounded Rectangle 2">
+            <a:extLst>
+              <a:ext uri="{FF2B5EF4-FFF2-40B4-BE49-F238E27FC236}">
+                <a16:creationId xmlns:a16="http://schemas.microsoft.com/office/drawing/2014/main" id="{648BDF2B-8405-5F4E-A10F-23E433471D74}"/>
+              </a:ext>
+            </a:extLst>
+          </p:cNvPr>
+          <p:cNvSpPr/>
+          <p:nvPr/>
+        </p:nvSpPr>
+        <p:spPr>
           <a:xfrm>
             <a:off x="208611" y="3173348"/>
-            <a:ext cx="1693102" cy="1563678"/>
-            <a:chOff x="462404" y="3126231"/>
-            <a:chExt cx="1693102" cy="1563678"/>
-          </a:xfrm>
-        </p:grpSpPr>
-        <p:sp>
-          <p:nvSpPr>
-            <p:cNvPr id="3" name="Rounded Rectangle 2">
-              <a:extLst>
-                <a:ext uri="{FF2B5EF4-FFF2-40B4-BE49-F238E27FC236}">
-                  <a16:creationId xmlns:a16="http://schemas.microsoft.com/office/drawing/2014/main" id="{648BDF2B-8405-5F4E-A10F-23E433471D74}"/>
-                </a:ext>
-              </a:extLst>
-            </p:cNvPr>
-            <p:cNvSpPr/>
-            <p:nvPr/>
-          </p:nvSpPr>
-          <p:spPr>
-            <a:xfrm>
-              <a:off x="462404" y="3126231"/>
-              <a:ext cx="1693102" cy="1563678"/>
-            </a:xfrm>
-            <a:prstGeom prst="roundRect">
-              <a:avLst/>
-            </a:prstGeom>
+            <a:ext cx="1097280" cy="1563678"/>
+          </a:xfrm>
+          <a:prstGeom prst="roundRect">
+            <a:avLst/>
+          </a:prstGeom>
+          <a:solidFill>
+            <a:schemeClr val="accent6">
+              <a:alpha val="49000"/>
+            </a:schemeClr>
+          </a:solidFill>
+          <a:ln>
             <a:solidFill>
               <a:schemeClr val="accent6">
-                <a:alpha val="49000"/>
+                <a:lumMod val="50000"/>
               </a:schemeClr>
             </a:solidFill>
-            <a:ln>
-              <a:solidFill>
-                <a:schemeClr val="accent6">
-                  <a:lumMod val="50000"/>
-                </a:schemeClr>
-              </a:solidFill>
-            </a:ln>
-          </p:spPr>
-          <p:style>
-            <a:lnRef idx="2">
-              <a:schemeClr val="accent1">
-                <a:shade val="50000"/>
-              </a:schemeClr>
-            </a:lnRef>
-            <a:fillRef idx="1">
+          </a:ln>
+        </p:spPr>
+        <p:style>
+          <a:lnRef idx="2">
+            <a:schemeClr val="accent1">
+              <a:shade val="50000"/>
+            </a:schemeClr>
+          </a:lnRef>
+          <a:fillRef idx="1">
+            <a:schemeClr val="accent1"/>
+          </a:fillRef>
+          <a:effectRef idx="0">
+            <a:schemeClr val="accent1"/>
+          </a:effectRef>
+          <a:fontRef idx="minor">
+            <a:schemeClr val="lt1"/>
+          </a:fontRef>
+        </p:style>
+        <p:txBody>
+          <a:bodyPr rtlCol="0" anchor="ctr"/>
+          <a:lstStyle/>
+          <a:p>
+            <a:pPr algn="ctr"/>
+            <a:endParaRPr lang="en-US"/>
+          </a:p>
+        </p:txBody>
+      </p:sp>
+      <p:sp>
+        <p:nvSpPr>
+          <p:cNvPr id="28" name="TextBox 27">
+            <a:extLst>
+              <a:ext uri="{FF2B5EF4-FFF2-40B4-BE49-F238E27FC236}">
+                <a16:creationId xmlns:a16="http://schemas.microsoft.com/office/drawing/2014/main" id="{188A1222-267D-514E-BDC8-1E2C165B807C}"/>
+              </a:ext>
+            </a:extLst>
+          </p:cNvPr>
+          <p:cNvSpPr txBox="1"/>
+          <p:nvPr/>
+        </p:nvSpPr>
+        <p:spPr>
+          <a:xfrm>
+            <a:off x="282702" y="3282511"/>
+            <a:ext cx="1537136" cy="830997"/>
+          </a:xfrm>
+          <a:prstGeom prst="rect">
+            <a:avLst/>
+          </a:prstGeom>
+          <a:solidFill>
+            <a:schemeClr val="bg1"/>
+          </a:solidFill>
+          <a:ln w="3175">
+            <a:solidFill>
+              <a:schemeClr val="tx1"/>
+            </a:solidFill>
+          </a:ln>
+        </p:spPr>
+        <p:txBody>
+          <a:bodyPr wrap="square" rtlCol="0">
+            <a:spAutoFit/>
+          </a:bodyPr>
+          <a:lstStyle/>
+          <a:p>
+            <a:pPr algn="ctr"/>
+            <a:r>
+              <a:rPr lang="en-US" sz="1200" i="1" dirty="0"/>
+              <a:t>CCES, PRS/PWCC</a:t>
+            </a:r>
+          </a:p>
+          <a:p>
+            <a:pPr algn="ctr"/>
+            <a:r>
+              <a:rPr lang="en-US" sz="1200" b="1" dirty="0"/>
+              <a:t>Forage fishes (anchovy, sardine, herring, smelt, shad)</a:t>
+            </a:r>
+          </a:p>
+        </p:txBody>
+      </p:sp>
+      <p:sp>
+        <p:nvSpPr>
+          <p:cNvPr id="32" name="TextBox 31">
+            <a:extLst>
+              <a:ext uri="{FF2B5EF4-FFF2-40B4-BE49-F238E27FC236}">
+                <a16:creationId xmlns:a16="http://schemas.microsoft.com/office/drawing/2014/main" id="{1777F9CE-A489-984F-A723-3795520C155A}"/>
+              </a:ext>
+            </a:extLst>
+          </p:cNvPr>
+          <p:cNvSpPr txBox="1"/>
+          <p:nvPr/>
+        </p:nvSpPr>
+        <p:spPr>
+          <a:xfrm>
+            <a:off x="362221" y="4168259"/>
+            <a:ext cx="1405110" cy="461665"/>
+          </a:xfrm>
+          <a:prstGeom prst="rect">
+            <a:avLst/>
+          </a:prstGeom>
+          <a:solidFill>
+            <a:schemeClr val="bg1"/>
+          </a:solidFill>
+          <a:ln w="38100">
+            <a:solidFill>
               <a:schemeClr val="accent1"/>
-            </a:fillRef>
-            <a:effectRef idx="0">
-              <a:schemeClr val="accent1"/>
-            </a:effectRef>
-            <a:fontRef idx="minor">
-              <a:schemeClr val="lt1"/>
-            </a:fontRef>
-          </p:style>
-          <p:txBody>
-            <a:bodyPr rtlCol="0" anchor="ctr"/>
-            <a:lstStyle/>
-            <a:p>
-              <a:pPr algn="ctr"/>
-              <a:endParaRPr lang="en-US"/>
-            </a:p>
-          </p:txBody>
-        </p:sp>
-        <p:sp>
-          <p:nvSpPr>
-            <p:cNvPr id="28" name="TextBox 27">
-              <a:extLst>
-                <a:ext uri="{FF2B5EF4-FFF2-40B4-BE49-F238E27FC236}">
-                  <a16:creationId xmlns:a16="http://schemas.microsoft.com/office/drawing/2014/main" id="{188A1222-267D-514E-BDC8-1E2C165B807C}"/>
-                </a:ext>
-              </a:extLst>
-            </p:cNvPr>
-            <p:cNvSpPr txBox="1"/>
-            <p:nvPr/>
-          </p:nvSpPr>
-          <p:spPr>
-            <a:xfrm>
-              <a:off x="536495" y="3235394"/>
-              <a:ext cx="1537136" cy="830997"/>
-            </a:xfrm>
-            <a:prstGeom prst="rect">
-              <a:avLst/>
-            </a:prstGeom>
-            <a:solidFill>
-              <a:schemeClr val="bg1"/>
-            </a:solidFill>
-            <a:ln w="3175">
-              <a:solidFill>
-                <a:schemeClr val="tx1"/>
-              </a:solidFill>
-            </a:ln>
-          </p:spPr>
-          <p:txBody>
-            <a:bodyPr wrap="square" rtlCol="0">
-              <a:spAutoFit/>
-            </a:bodyPr>
-            <a:lstStyle/>
-            <a:p>
-              <a:pPr algn="ctr"/>
-              <a:r>
-                <a:rPr lang="en-US" sz="1200" i="1" dirty="0"/>
-                <a:t>CCES, PRS/PWCC</a:t>
-              </a:r>
-            </a:p>
-            <a:p>
-              <a:pPr algn="ctr"/>
-              <a:r>
-                <a:rPr lang="en-US" sz="1200" b="1" dirty="0"/>
-                <a:t>Forage fishes (anchovy, sardine, herring, smelt, shad)</a:t>
-              </a:r>
-            </a:p>
-          </p:txBody>
-        </p:sp>
-        <p:sp>
-          <p:nvSpPr>
-            <p:cNvPr id="32" name="TextBox 31">
-              <a:extLst>
-                <a:ext uri="{FF2B5EF4-FFF2-40B4-BE49-F238E27FC236}">
-                  <a16:creationId xmlns:a16="http://schemas.microsoft.com/office/drawing/2014/main" id="{1777F9CE-A489-984F-A723-3795520C155A}"/>
-                </a:ext>
-              </a:extLst>
-            </p:cNvPr>
-            <p:cNvSpPr txBox="1"/>
-            <p:nvPr/>
-          </p:nvSpPr>
-          <p:spPr>
-            <a:xfrm>
-              <a:off x="616014" y="4121142"/>
-              <a:ext cx="1405110" cy="461665"/>
-            </a:xfrm>
-            <a:prstGeom prst="rect">
-              <a:avLst/>
-            </a:prstGeom>
-            <a:solidFill>
-              <a:schemeClr val="bg1"/>
-            </a:solidFill>
-            <a:ln w="38100">
-              <a:solidFill>
-                <a:schemeClr val="accent1"/>
-              </a:solidFill>
-            </a:ln>
-          </p:spPr>
-          <p:txBody>
-            <a:bodyPr wrap="square" rtlCol="0">
-              <a:spAutoFit/>
-            </a:bodyPr>
-            <a:lstStyle/>
-            <a:p>
-              <a:pPr algn="ctr"/>
-              <a:r>
-                <a:rPr lang="en-US" sz="1200" i="1" dirty="0"/>
-                <a:t>JSOES</a:t>
-              </a:r>
-            </a:p>
-            <a:p>
-              <a:pPr algn="ctr"/>
-              <a:r>
-                <a:rPr lang="en-US" sz="1200" b="1" dirty="0"/>
-                <a:t>Juvenile salmon</a:t>
-              </a:r>
-            </a:p>
-          </p:txBody>
-        </p:sp>
-      </p:grpSp>
+            </a:solidFill>
+          </a:ln>
+        </p:spPr>
+        <p:txBody>
+          <a:bodyPr wrap="square" rtlCol="0">
+            <a:spAutoFit/>
+          </a:bodyPr>
+          <a:lstStyle/>
+          <a:p>
+            <a:pPr algn="ctr"/>
+            <a:r>
+              <a:rPr lang="en-US" sz="1200" i="1" dirty="0"/>
+              <a:t>JSOES</a:t>
+            </a:r>
+          </a:p>
+          <a:p>
+            <a:pPr algn="ctr"/>
+            <a:r>
+              <a:rPr lang="en-US" sz="1200" b="1" dirty="0"/>
+              <a:t>Juvenile salmon</a:t>
+            </a:r>
+          </a:p>
+        </p:txBody>
+      </p:sp>
       <p:sp>
         <p:nvSpPr>
           <p:cNvPr id="75" name="Right Arrow 74">

</xml_diff>